<commit_message>
28_11:Apresentação dos slides para N2
</commit_message>
<xml_diff>
--- a/documentos/Apresentação Banca.pptx
+++ b/documentos/Apresentação Banca.pptx
@@ -5,10 +5,10 @@
     <p:sldMasterId id="2147483649" r:id="rId1"/>
   </p:sldMasterIdLst>
   <p:notesMasterIdLst>
-    <p:notesMasterId r:id="rId26"/>
+    <p:notesMasterId r:id="rId34"/>
   </p:notesMasterIdLst>
   <p:handoutMasterIdLst>
-    <p:handoutMasterId r:id="rId27"/>
+    <p:handoutMasterId r:id="rId35"/>
   </p:handoutMasterIdLst>
   <p:sldIdLst>
     <p:sldId id="269" r:id="rId2"/>
@@ -29,12 +29,20 @@
     <p:sldId id="309" r:id="rId17"/>
     <p:sldId id="314" r:id="rId18"/>
     <p:sldId id="278" r:id="rId19"/>
-    <p:sldId id="279" r:id="rId20"/>
-    <p:sldId id="312" r:id="rId21"/>
-    <p:sldId id="280" r:id="rId22"/>
-    <p:sldId id="284" r:id="rId23"/>
-    <p:sldId id="310" r:id="rId24"/>
-    <p:sldId id="286" r:id="rId25"/>
+    <p:sldId id="280" r:id="rId20"/>
+    <p:sldId id="318" r:id="rId21"/>
+    <p:sldId id="316" r:id="rId22"/>
+    <p:sldId id="320" r:id="rId23"/>
+    <p:sldId id="319" r:id="rId24"/>
+    <p:sldId id="315" r:id="rId25"/>
+    <p:sldId id="321" r:id="rId26"/>
+    <p:sldId id="322" r:id="rId27"/>
+    <p:sldId id="279" r:id="rId28"/>
+    <p:sldId id="312" r:id="rId29"/>
+    <p:sldId id="284" r:id="rId30"/>
+    <p:sldId id="310" r:id="rId31"/>
+    <p:sldId id="286" r:id="rId32"/>
+    <p:sldId id="317" r:id="rId33"/>
   </p:sldIdLst>
   <p:sldSz cx="9144000" cy="6858000" type="screen4x3"/>
   <p:notesSz cx="6858000" cy="9144000"/>
@@ -294,7 +302,7 @@
               <a:pPr>
                 <a:defRPr/>
               </a:pPr>
-              <a:t>26/11/2014</a:t>
+              <a:t>28/11/2014</a:t>
             </a:fld>
             <a:endParaRPr lang="pt-BR"/>
           </a:p>
@@ -485,7 +493,7 @@
               <a:pPr>
                 <a:defRPr/>
               </a:pPr>
-              <a:t>26/11/2014</a:t>
+              <a:t>28/11/2014</a:t>
             </a:fld>
             <a:endParaRPr lang="pt-BR"/>
           </a:p>
@@ -4760,125 +4768,53 @@
           <a:p>
             <a:pPr algn="ctr"/>
             <a:r>
-              <a:rPr lang="pt-BR" sz="4000" b="1" dirty="0" smtClean="0">
-                <a:ln w="12700" cmpd="sng">
-                  <a:solidFill>
-                    <a:schemeClr val="accent4"/>
-                  </a:solidFill>
-                  <a:prstDash val="solid"/>
-                </a:ln>
-                <a:gradFill>
-                  <a:gsLst>
-                    <a:gs pos="0">
-                      <a:schemeClr val="accent4"/>
-                    </a:gs>
-                    <a:gs pos="4000">
-                      <a:schemeClr val="accent4">
-                        <a:lumMod val="60000"/>
-                        <a:lumOff val="40000"/>
-                      </a:schemeClr>
-                    </a:gs>
-                    <a:gs pos="87000">
-                      <a:schemeClr val="accent4">
-                        <a:lumMod val="20000"/>
-                        <a:lumOff val="80000"/>
-                      </a:schemeClr>
-                    </a:gs>
-                  </a:gsLst>
-                  <a:lin ang="5400000"/>
-                </a:gradFill>
+              <a:rPr lang="pt-BR" sz="4000" dirty="0" smtClean="0">
+                <a:ln w="0"/>
+                <a:effectLst>
+                  <a:outerShdw blurRad="38100" dist="19050" dir="2700000" algn="tl" rotWithShape="0">
+                    <a:schemeClr val="dk1">
+                      <a:alpha val="40000"/>
+                    </a:schemeClr>
+                  </a:outerShdw>
+                </a:effectLst>
               </a:rPr>
               <a:t>Desenvolvimento de uma aplicação </a:t>
             </a:r>
             <a:r>
-              <a:rPr lang="pt-BR" sz="4000" b="1" dirty="0" err="1" smtClean="0">
-                <a:ln w="12700" cmpd="sng">
-                  <a:solidFill>
-                    <a:schemeClr val="accent4"/>
-                  </a:solidFill>
-                  <a:prstDash val="solid"/>
-                </a:ln>
-                <a:gradFill>
-                  <a:gsLst>
-                    <a:gs pos="0">
-                      <a:schemeClr val="accent4"/>
-                    </a:gs>
-                    <a:gs pos="4000">
-                      <a:schemeClr val="accent4">
-                        <a:lumMod val="60000"/>
-                        <a:lumOff val="40000"/>
-                      </a:schemeClr>
-                    </a:gs>
-                    <a:gs pos="87000">
-                      <a:schemeClr val="accent4">
-                        <a:lumMod val="20000"/>
-                        <a:lumOff val="80000"/>
-                      </a:schemeClr>
-                    </a:gs>
-                  </a:gsLst>
-                  <a:lin ang="5400000"/>
-                </a:gradFill>
+              <a:rPr lang="pt-BR" sz="4000" dirty="0" err="1" smtClean="0">
+                <a:ln w="0"/>
+                <a:effectLst>
+                  <a:outerShdw blurRad="38100" dist="19050" dir="2700000" algn="tl" rotWithShape="0">
+                    <a:schemeClr val="dk1">
+                      <a:alpha val="40000"/>
+                    </a:schemeClr>
+                  </a:outerShdw>
+                </a:effectLst>
               </a:rPr>
               <a:t>multiplataforma</a:t>
             </a:r>
             <a:r>
-              <a:rPr lang="pt-BR" sz="4000" b="1" dirty="0" smtClean="0">
-                <a:ln w="12700" cmpd="sng">
-                  <a:solidFill>
-                    <a:schemeClr val="accent4"/>
-                  </a:solidFill>
-                  <a:prstDash val="solid"/>
-                </a:ln>
-                <a:gradFill>
-                  <a:gsLst>
-                    <a:gs pos="0">
-                      <a:schemeClr val="accent4"/>
-                    </a:gs>
-                    <a:gs pos="4000">
-                      <a:schemeClr val="accent4">
-                        <a:lumMod val="60000"/>
-                        <a:lumOff val="40000"/>
-                      </a:schemeClr>
-                    </a:gs>
-                    <a:gs pos="87000">
-                      <a:schemeClr val="accent4">
-                        <a:lumMod val="20000"/>
-                        <a:lumOff val="80000"/>
-                      </a:schemeClr>
-                    </a:gs>
-                  </a:gsLst>
-                  <a:lin ang="5400000"/>
-                </a:gradFill>
+              <a:rPr lang="pt-BR" sz="4000" dirty="0" smtClean="0">
+                <a:ln w="0"/>
+                <a:effectLst>
+                  <a:outerShdw blurRad="38100" dist="19050" dir="2700000" algn="tl" rotWithShape="0">
+                    <a:schemeClr val="dk1">
+                      <a:alpha val="40000"/>
+                    </a:schemeClr>
+                  </a:outerShdw>
+                </a:effectLst>
               </a:rPr>
               <a:t> utilizando Qt</a:t>
             </a:r>
-            <a:endParaRPr lang="pt-BR" sz="5400" b="1" dirty="0">
-              <a:ln w="12700" cmpd="sng">
-                <a:solidFill>
-                  <a:schemeClr val="accent4"/>
-                </a:solidFill>
-                <a:prstDash val="solid"/>
-              </a:ln>
-              <a:gradFill>
-                <a:gsLst>
-                  <a:gs pos="0">
-                    <a:schemeClr val="accent4"/>
-                  </a:gs>
-                  <a:gs pos="4000">
-                    <a:schemeClr val="accent4">
-                      <a:lumMod val="60000"/>
-                      <a:lumOff val="40000"/>
-                    </a:schemeClr>
-                  </a:gs>
-                  <a:gs pos="87000">
-                    <a:schemeClr val="accent4">
-                      <a:lumMod val="20000"/>
-                      <a:lumOff val="80000"/>
-                    </a:schemeClr>
-                  </a:gs>
-                </a:gsLst>
-                <a:lin ang="5400000"/>
-              </a:gradFill>
+            <a:endParaRPr lang="pt-BR" sz="5400" dirty="0">
+              <a:ln w="0"/>
+              <a:effectLst>
+                <a:outerShdw blurRad="38100" dist="19050" dir="2700000" algn="tl" rotWithShape="0">
+                  <a:schemeClr val="dk1">
+                    <a:alpha val="40000"/>
+                  </a:schemeClr>
+                </a:outerShdw>
+              </a:effectLst>
             </a:endParaRPr>
           </a:p>
         </p:txBody>
@@ -4989,11 +4925,17 @@
             <p:ph type="title"/>
           </p:nvPr>
         </p:nvSpPr>
-        <p:spPr/>
+        <p:spPr>
+          <a:xfrm>
+            <a:off x="2483768" y="274638"/>
+            <a:ext cx="5328592" cy="1143000"/>
+          </a:xfrm>
+        </p:spPr>
         <p:txBody>
           <a:bodyPr/>
           <a:lstStyle/>
           <a:p>
+            <a:pPr algn="ctr"/>
             <a:r>
               <a:rPr lang="pt-BR" dirty="0" err="1" smtClean="0"/>
               <a:t>Xamarin</a:t>
@@ -5092,7 +5034,7 @@
         </p:blipFill>
         <p:spPr bwMode="auto">
           <a:xfrm>
-            <a:off x="3059832" y="4293096"/>
+            <a:off x="1876425" y="4365104"/>
             <a:ext cx="5391150" cy="1457325"/>
           </a:xfrm>
           <a:prstGeom prst="rect">
@@ -5156,11 +5098,17 @@
             <p:ph type="title"/>
           </p:nvPr>
         </p:nvSpPr>
-        <p:spPr/>
+        <p:spPr>
+          <a:xfrm>
+            <a:off x="2483768" y="274638"/>
+            <a:ext cx="5328592" cy="1143000"/>
+          </a:xfrm>
+        </p:spPr>
         <p:txBody>
           <a:bodyPr/>
           <a:lstStyle/>
           <a:p>
+            <a:pPr algn="ctr"/>
             <a:r>
               <a:rPr lang="pt-BR" dirty="0" err="1" smtClean="0"/>
               <a:t>Xamarin</a:t>
@@ -5245,8 +5193,8 @@
         </p:blipFill>
         <p:spPr bwMode="auto">
           <a:xfrm>
-            <a:off x="894420" y="1514687"/>
-            <a:ext cx="7355160" cy="4592111"/>
+            <a:off x="714400" y="1316358"/>
+            <a:ext cx="7715200" cy="4816898"/>
           </a:xfrm>
           <a:prstGeom prst="rect">
             <a:avLst/>
@@ -5272,6 +5220,13 @@
   <p:transition>
     <p:fade/>
   </p:transition>
+  <p:timing>
+    <p:tnLst>
+      <p:par>
+        <p:cTn id="1" dur="indefinite" restart="never" nodeType="tmRoot"/>
+      </p:par>
+    </p:tnLst>
+  </p:timing>
 </p:sld>
 </file>
 
@@ -5302,11 +5257,17 @@
             <p:ph type="title"/>
           </p:nvPr>
         </p:nvSpPr>
-        <p:spPr/>
+        <p:spPr>
+          <a:xfrm>
+            <a:off x="2483768" y="274638"/>
+            <a:ext cx="5328592" cy="1143000"/>
+          </a:xfrm>
+        </p:spPr>
         <p:txBody>
           <a:bodyPr/>
           <a:lstStyle/>
           <a:p>
+            <a:pPr algn="ctr"/>
             <a:r>
               <a:rPr lang="pt-BR" dirty="0" err="1" smtClean="0"/>
               <a:t>Xamarin</a:t>
@@ -5367,7 +5328,7 @@
       </p:sp>
       <p:pic>
         <p:nvPicPr>
-          <p:cNvPr id="5" name="Picture 4"/>
+          <p:cNvPr id="6" name="Picture 5"/>
           <p:cNvPicPr/>
           <p:nvPr/>
         </p:nvPicPr>
@@ -5386,8 +5347,8 @@
         </p:blipFill>
         <p:spPr bwMode="auto">
           <a:xfrm>
-            <a:off x="917594" y="1575149"/>
-            <a:ext cx="7308812" cy="4576064"/>
+            <a:off x="714400" y="1316358"/>
+            <a:ext cx="7715200" cy="4830504"/>
           </a:xfrm>
           <a:prstGeom prst="rect">
             <a:avLst/>
@@ -5413,6 +5374,13 @@
   <p:transition>
     <p:fade/>
   </p:transition>
+  <p:timing>
+    <p:tnLst>
+      <p:par>
+        <p:cTn id="1" dur="indefinite" restart="never" nodeType="tmRoot"/>
+      </p:par>
+    </p:tnLst>
+  </p:timing>
 </p:sld>
 </file>
 
@@ -5443,11 +5411,17 @@
             <p:ph type="title"/>
           </p:nvPr>
         </p:nvSpPr>
-        <p:spPr/>
+        <p:spPr>
+          <a:xfrm>
+            <a:off x="2483768" y="274638"/>
+            <a:ext cx="5328592" cy="1143000"/>
+          </a:xfrm>
+        </p:spPr>
         <p:txBody>
           <a:bodyPr/>
           <a:lstStyle/>
           <a:p>
+            <a:pPr algn="ctr"/>
             <a:r>
               <a:rPr lang="pt-BR" dirty="0" smtClean="0"/>
               <a:t>Mono</a:t>
@@ -5810,6 +5784,13 @@
   <p:transition>
     <p:fade/>
   </p:transition>
+  <p:timing>
+    <p:tnLst>
+      <p:par>
+        <p:cTn id="1" dur="indefinite" restart="never" nodeType="tmRoot"/>
+      </p:par>
+    </p:tnLst>
+  </p:timing>
 </p:sld>
 </file>
 
@@ -5840,11 +5821,17 @@
             <p:ph type="title"/>
           </p:nvPr>
         </p:nvSpPr>
-        <p:spPr/>
+        <p:spPr>
+          <a:xfrm>
+            <a:off x="2483768" y="274638"/>
+            <a:ext cx="5328592" cy="1143000"/>
+          </a:xfrm>
+        </p:spPr>
         <p:txBody>
           <a:bodyPr/>
           <a:lstStyle/>
           <a:p>
+            <a:pPr algn="ctr"/>
             <a:r>
               <a:rPr lang="pt-BR" dirty="0" err="1" smtClean="0"/>
               <a:t>MonoDevelop</a:t>
@@ -5896,6 +5883,30 @@
           </a:p>
         </p:txBody>
       </p:sp>
+      <p:pic>
+        <p:nvPicPr>
+          <p:cNvPr id="7" name="Picture 6"/>
+          <p:cNvPicPr>
+            <a:picLocks noChangeAspect="1"/>
+          </p:cNvPicPr>
+          <p:nvPr/>
+        </p:nvPicPr>
+        <p:blipFill>
+          <a:blip r:embed="rId2"/>
+          <a:stretch>
+            <a:fillRect/>
+          </a:stretch>
+        </p:blipFill>
+        <p:spPr>
+          <a:xfrm>
+            <a:off x="1080157" y="1316358"/>
+            <a:ext cx="6983685" cy="4824607"/>
+          </a:xfrm>
+          <a:prstGeom prst="rect">
+            <a:avLst/>
+          </a:prstGeom>
+        </p:spPr>
+      </p:pic>
     </p:spTree>
     <p:extLst>
       <p:ext uri="{BB962C8B-B14F-4D97-AF65-F5344CB8AC3E}">
@@ -5909,6 +5920,13 @@
   <p:transition>
     <p:fade/>
   </p:transition>
+  <p:timing>
+    <p:tnLst>
+      <p:par>
+        <p:cTn id="1" dur="indefinite" restart="never" nodeType="tmRoot"/>
+      </p:par>
+    </p:tnLst>
+  </p:timing>
 </p:sld>
 </file>
 
@@ -5939,11 +5957,17 @@
             <p:ph type="title"/>
           </p:nvPr>
         </p:nvSpPr>
-        <p:spPr/>
+        <p:spPr>
+          <a:xfrm>
+            <a:off x="2483768" y="274638"/>
+            <a:ext cx="5328592" cy="1143000"/>
+          </a:xfrm>
+        </p:spPr>
         <p:txBody>
           <a:bodyPr/>
           <a:lstStyle/>
           <a:p>
+            <a:pPr algn="ctr"/>
             <a:r>
               <a:rPr lang="pt-BR" dirty="0" smtClean="0"/>
               <a:t>Java</a:t>
@@ -5967,6 +5991,53 @@
           <a:bodyPr/>
           <a:lstStyle/>
           <a:p>
+            <a:r>
+              <a:rPr lang="pt-BR" sz="2400" dirty="0" smtClean="0"/>
+              <a:t>97% dos computadores do mundo usam Java (DEITEL; DEITEL, 2009)</a:t>
+            </a:r>
+          </a:p>
+          <a:p>
+            <a:endParaRPr lang="pt-BR" sz="2400" dirty="0"/>
+          </a:p>
+          <a:p>
+            <a:r>
+              <a:rPr lang="pt-BR" sz="2400" dirty="0" smtClean="0"/>
+              <a:t>Aplicações executam em plataformas </a:t>
+            </a:r>
+          </a:p>
+          <a:p>
+            <a:pPr marL="0" indent="0">
+              <a:buNone/>
+            </a:pPr>
+            <a:r>
+              <a:rPr lang="pt-BR" sz="2400" dirty="0"/>
+              <a:t> </a:t>
+            </a:r>
+            <a:r>
+              <a:rPr lang="pt-BR" sz="2400" dirty="0" smtClean="0"/>
+              <a:t>   desktop, mobile e web</a:t>
+            </a:r>
+          </a:p>
+          <a:p>
+            <a:pPr marL="0" indent="0">
+              <a:buNone/>
+            </a:pPr>
+            <a:endParaRPr lang="pt-BR" sz="2400" dirty="0"/>
+          </a:p>
+          <a:p>
+            <a:r>
+              <a:rPr lang="pt-BR" sz="2400" dirty="0" smtClean="0"/>
+              <a:t>Aplicação não é executada diretamente</a:t>
+            </a:r>
+          </a:p>
+          <a:p>
+            <a:pPr marL="0" indent="0">
+              <a:buNone/>
+            </a:pPr>
+            <a:r>
+              <a:rPr lang="pt-BR" sz="2400" dirty="0" smtClean="0"/>
+              <a:t>    (Máquina Virtual - JVM)</a:t>
+            </a:r>
             <a:endParaRPr lang="pt-BR" sz="2400" dirty="0"/>
           </a:p>
         </p:txBody>
@@ -5995,6 +6066,35 @@
           </a:p>
         </p:txBody>
       </p:sp>
+      <p:pic>
+        <p:nvPicPr>
+          <p:cNvPr id="5" name="Picture 4"/>
+          <p:cNvPicPr>
+            <a:picLocks noChangeAspect="1"/>
+          </p:cNvPicPr>
+          <p:nvPr/>
+        </p:nvPicPr>
+        <p:blipFill rotWithShape="1">
+          <a:blip r:embed="rId2" cstate="print">
+            <a:extLst>
+              <a:ext uri="{28A0092B-C50C-407E-A947-70E740481C1C}">
+                <a14:useLocalDpi xmlns:a14="http://schemas.microsoft.com/office/drawing/2010/main" val="0"/>
+              </a:ext>
+            </a:extLst>
+          </a:blip>
+          <a:srcRect l="24915" r="24329"/>
+          <a:stretch/>
+        </p:blipFill>
+        <p:spPr>
+          <a:xfrm>
+            <a:off x="6732240" y="2692749"/>
+            <a:ext cx="1584176" cy="2340864"/>
+          </a:xfrm>
+          <a:prstGeom prst="rect">
+            <a:avLst/>
+          </a:prstGeom>
+        </p:spPr>
+      </p:pic>
     </p:spTree>
     <p:extLst>
       <p:ext uri="{BB962C8B-B14F-4D97-AF65-F5344CB8AC3E}">
@@ -6045,11 +6145,17 @@
             <p:ph type="title"/>
           </p:nvPr>
         </p:nvSpPr>
-        <p:spPr/>
+        <p:spPr>
+          <a:xfrm>
+            <a:off x="2483768" y="274638"/>
+            <a:ext cx="5328592" cy="1143000"/>
+          </a:xfrm>
+        </p:spPr>
         <p:txBody>
           <a:bodyPr/>
           <a:lstStyle/>
           <a:p>
+            <a:pPr algn="ctr"/>
             <a:r>
               <a:rPr lang="pt-BR" dirty="0" smtClean="0"/>
               <a:t>Eclipse</a:t>
@@ -6073,7 +6179,7 @@
           <a:bodyPr/>
           <a:lstStyle/>
           <a:p>
-            <a:endParaRPr lang="pt-BR"/>
+            <a:endParaRPr lang="pt-BR" dirty="0"/>
           </a:p>
         </p:txBody>
       </p:sp>
@@ -6101,6 +6207,47 @@
           </a:p>
         </p:txBody>
       </p:sp>
+      <p:pic>
+        <p:nvPicPr>
+          <p:cNvPr id="7" name="Picture 2" descr="http://data.nilzorblog.com/android-wp7/ide_eclipse.jpg"/>
+          <p:cNvPicPr>
+            <a:picLocks noChangeAspect="1" noChangeArrowheads="1"/>
+          </p:cNvPicPr>
+          <p:nvPr/>
+        </p:nvPicPr>
+        <p:blipFill>
+          <a:blip r:embed="rId2">
+            <a:extLst>
+              <a:ext uri="{28A0092B-C50C-407E-A947-70E740481C1C}">
+                <a14:useLocalDpi xmlns:a14="http://schemas.microsoft.com/office/drawing/2010/main" val="0"/>
+              </a:ext>
+            </a:extLst>
+          </a:blip>
+          <a:srcRect/>
+          <a:stretch>
+            <a:fillRect/>
+          </a:stretch>
+        </p:blipFill>
+        <p:spPr bwMode="auto">
+          <a:xfrm>
+            <a:off x="862860" y="1256283"/>
+            <a:ext cx="7418279" cy="4929411"/>
+          </a:xfrm>
+          <a:prstGeom prst="rect">
+            <a:avLst/>
+          </a:prstGeom>
+          <a:noFill/>
+          <a:extLst>
+            <a:ext uri="{909E8E84-426E-40DD-AFC4-6F175D3DCCD1}">
+              <a14:hiddenFill xmlns:a14="http://schemas.microsoft.com/office/drawing/2010/main">
+                <a:solidFill>
+                  <a:srgbClr val="FFFFFF"/>
+                </a:solidFill>
+              </a14:hiddenFill>
+            </a:ext>
+          </a:extLst>
+        </p:spPr>
+      </p:pic>
     </p:spTree>
     <p:extLst>
       <p:ext uri="{BB962C8B-B14F-4D97-AF65-F5344CB8AC3E}">
@@ -6114,6 +6261,13 @@
   <p:transition>
     <p:fade/>
   </p:transition>
+  <p:timing>
+    <p:tnLst>
+      <p:par>
+        <p:cTn id="1" dur="indefinite" restart="never" nodeType="tmRoot"/>
+      </p:par>
+    </p:tnLst>
+  </p:timing>
 </p:sld>
 </file>
 
@@ -6144,11 +6298,17 @@
             <p:ph type="title"/>
           </p:nvPr>
         </p:nvSpPr>
-        <p:spPr/>
+        <p:spPr>
+          <a:xfrm>
+            <a:off x="2483768" y="274638"/>
+            <a:ext cx="5328592" cy="1143000"/>
+          </a:xfrm>
+        </p:spPr>
         <p:txBody>
           <a:bodyPr/>
           <a:lstStyle/>
           <a:p>
+            <a:pPr algn="ctr"/>
             <a:r>
               <a:rPr lang="pt-BR" dirty="0" err="1" smtClean="0"/>
               <a:t>NetBeans</a:t>
@@ -6200,6 +6360,30 @@
           </a:p>
         </p:txBody>
       </p:sp>
+      <p:pic>
+        <p:nvPicPr>
+          <p:cNvPr id="5" name="Picture 4"/>
+          <p:cNvPicPr>
+            <a:picLocks noChangeAspect="1"/>
+          </p:cNvPicPr>
+          <p:nvPr/>
+        </p:nvPicPr>
+        <p:blipFill>
+          <a:blip r:embed="rId2"/>
+          <a:stretch>
+            <a:fillRect/>
+          </a:stretch>
+        </p:blipFill>
+        <p:spPr>
+          <a:xfrm>
+            <a:off x="470848" y="1597503"/>
+            <a:ext cx="8229600" cy="4385907"/>
+          </a:xfrm>
+          <a:prstGeom prst="rect">
+            <a:avLst/>
+          </a:prstGeom>
+        </p:spPr>
+      </p:pic>
     </p:spTree>
     <p:extLst>
       <p:ext uri="{BB962C8B-B14F-4D97-AF65-F5344CB8AC3E}">
@@ -6213,6 +6397,13 @@
   <p:transition>
     <p:fade/>
   </p:transition>
+  <p:timing>
+    <p:tnLst>
+      <p:par>
+        <p:cTn id="1" dur="indefinite" restart="never" nodeType="tmRoot"/>
+      </p:par>
+    </p:tnLst>
+  </p:timing>
 </p:sld>
 </file>
 
@@ -6243,11 +6434,17 @@
             <p:ph type="title"/>
           </p:nvPr>
         </p:nvSpPr>
-        <p:spPr/>
+        <p:spPr>
+          <a:xfrm>
+            <a:off x="2483768" y="274638"/>
+            <a:ext cx="5328592" cy="1143000"/>
+          </a:xfrm>
+        </p:spPr>
         <p:txBody>
           <a:bodyPr/>
           <a:lstStyle/>
           <a:p>
+            <a:pPr algn="ctr"/>
             <a:r>
               <a:rPr lang="pt-BR" dirty="0" smtClean="0"/>
               <a:t>Estudo de Caso</a:t>
@@ -6271,10 +6468,39 @@
           <a:bodyPr/>
           <a:lstStyle/>
           <a:p>
-            <a:pPr marL="0" indent="0">
-              <a:buNone/>
-            </a:pPr>
             <a:endParaRPr lang="pt-BR" sz="2400" dirty="0" smtClean="0"/>
+          </a:p>
+          <a:p>
+            <a:endParaRPr lang="pt-BR" sz="2400" dirty="0"/>
+          </a:p>
+          <a:p>
+            <a:r>
+              <a:rPr lang="pt-BR" sz="2400" dirty="0" smtClean="0"/>
+              <a:t>Aplicação Cliente (QTCC) – Qt</a:t>
+            </a:r>
+          </a:p>
+          <a:p>
+            <a:endParaRPr lang="pt-BR" sz="2400" dirty="0" smtClean="0"/>
+          </a:p>
+          <a:p>
+            <a:endParaRPr lang="pt-BR" sz="2400" dirty="0"/>
+          </a:p>
+          <a:p>
+            <a:endParaRPr lang="pt-BR" sz="2400" dirty="0" smtClean="0"/>
+          </a:p>
+          <a:p>
+            <a:r>
+              <a:rPr lang="pt-BR" sz="2400" dirty="0" smtClean="0"/>
+              <a:t>Aplicação Servidor (</a:t>
+            </a:r>
+            <a:r>
+              <a:rPr lang="pt-BR" sz="2400" dirty="0" err="1" smtClean="0"/>
+              <a:t>QTCC_Server</a:t>
+            </a:r>
+            <a:r>
+              <a:rPr lang="pt-BR" sz="2400" dirty="0" smtClean="0"/>
+              <a:t>) – Visual Studio</a:t>
+            </a:r>
           </a:p>
         </p:txBody>
       </p:sp>
@@ -6352,62 +6578,41 @@
             <p:ph type="title"/>
           </p:nvPr>
         </p:nvSpPr>
+        <p:spPr>
+          <a:xfrm>
+            <a:off x="2483768" y="274638"/>
+            <a:ext cx="5328592" cy="1143000"/>
+          </a:xfrm>
+        </p:spPr>
+        <p:txBody>
+          <a:bodyPr/>
+          <a:lstStyle/>
+          <a:p>
+            <a:pPr algn="ctr"/>
+            <a:r>
+              <a:rPr lang="pt-BR" dirty="0" smtClean="0"/>
+              <a:t>Arquitetura do Sistema</a:t>
+            </a:r>
+            <a:endParaRPr lang="pt-BR" dirty="0"/>
+          </a:p>
+        </p:txBody>
+      </p:sp>
+      <p:sp>
+        <p:nvSpPr>
+          <p:cNvPr id="6" name="Content Placeholder 5"/>
+          <p:cNvSpPr>
+            <a:spLocks noGrp="1"/>
+          </p:cNvSpPr>
+          <p:nvPr>
+            <p:ph idx="1"/>
+          </p:nvPr>
+        </p:nvSpPr>
         <p:spPr/>
         <p:txBody>
           <a:bodyPr/>
           <a:lstStyle/>
           <a:p>
-            <a:r>
-              <a:rPr lang="pt-BR" dirty="0" smtClean="0"/>
-              <a:t>Tecnologias Utilizadas</a:t>
-            </a:r>
             <a:endParaRPr lang="pt-BR" dirty="0"/>
-          </a:p>
-        </p:txBody>
-      </p:sp>
-      <p:sp>
-        <p:nvSpPr>
-          <p:cNvPr id="3" name="Espaço Reservado para Conteúdo 2"/>
-          <p:cNvSpPr>
-            <a:spLocks noGrp="1"/>
-          </p:cNvSpPr>
-          <p:nvPr>
-            <p:ph idx="1"/>
-          </p:nvPr>
-        </p:nvSpPr>
-        <p:spPr/>
-        <p:txBody>
-          <a:bodyPr numCol="2"/>
-          <a:lstStyle/>
-          <a:p>
-            <a:r>
-              <a:rPr lang="pt-BR" dirty="0" smtClean="0"/>
-              <a:t>Visual Studio 2013 (C#)</a:t>
-            </a:r>
-          </a:p>
-          <a:p>
-            <a:endParaRPr lang="pt-BR" dirty="0"/>
-          </a:p>
-          <a:p>
-            <a:endParaRPr lang="pt-BR" dirty="0" smtClean="0"/>
-          </a:p>
-          <a:p>
-            <a:endParaRPr lang="pt-BR" dirty="0"/>
-          </a:p>
-          <a:p>
-            <a:endParaRPr lang="pt-BR" dirty="0" smtClean="0"/>
-          </a:p>
-          <a:p>
-            <a:endParaRPr lang="pt-BR" dirty="0"/>
-          </a:p>
-          <a:p>
-            <a:endParaRPr lang="pt-BR" dirty="0" smtClean="0"/>
-          </a:p>
-          <a:p>
-            <a:r>
-              <a:rPr lang="pt-BR" dirty="0" smtClean="0"/>
-              <a:t>SQL Server 2012</a:t>
-            </a:r>
           </a:p>
         </p:txBody>
       </p:sp>
@@ -6437,10 +6642,8 @@
       </p:sp>
       <p:pic>
         <p:nvPicPr>
-          <p:cNvPr id="1026" name="Picture 2" descr="C:\Users\Guilherme\Videos\rfid\visual-studio-2013-logo.png"/>
-          <p:cNvPicPr>
-            <a:picLocks noChangeAspect="1" noChangeArrowheads="1"/>
-          </p:cNvPicPr>
+          <p:cNvPr id="5" name="Picture 4" descr="H:\Nova pasta\TCC\Modelo de Arquitetura Cliente Servidor.png"/>
+          <p:cNvPicPr/>
           <p:nvPr/>
         </p:nvPicPr>
         <p:blipFill>
@@ -6458,69 +6661,22 @@
         </p:blipFill>
         <p:spPr bwMode="auto">
           <a:xfrm>
-            <a:off x="683568" y="3356992"/>
-            <a:ext cx="3279670" cy="1886418"/>
+            <a:off x="1115616" y="1448551"/>
+            <a:ext cx="6912768" cy="4829259"/>
           </a:xfrm>
           <a:prstGeom prst="rect">
             <a:avLst/>
           </a:prstGeom>
           <a:noFill/>
-          <a:extLst>
-            <a:ext uri="{909E8E84-426E-40DD-AFC4-6F175D3DCCD1}">
-              <a14:hiddenFill xmlns:a14="http://schemas.microsoft.com/office/drawing/2010/main">
-                <a:solidFill>
-                  <a:srgbClr val="FFFFFF"/>
-                </a:solidFill>
-              </a14:hiddenFill>
-            </a:ext>
-          </a:extLst>
-        </p:spPr>
-      </p:pic>
-      <p:pic>
-        <p:nvPicPr>
-          <p:cNvPr id="1027" name="Picture 3" descr="C:\Users\Guilherme\Videos\rfid\1830.SQL12_v_rgb.png"/>
-          <p:cNvPicPr>
-            <a:picLocks noChangeAspect="1" noChangeArrowheads="1"/>
-          </p:cNvPicPr>
-          <p:nvPr/>
-        </p:nvPicPr>
-        <p:blipFill>
-          <a:blip r:embed="rId3" cstate="print">
-            <a:extLst>
-              <a:ext uri="{28A0092B-C50C-407E-A947-70E740481C1C}">
-                <a14:useLocalDpi xmlns:a14="http://schemas.microsoft.com/office/drawing/2010/main" val="0"/>
-              </a:ext>
-            </a:extLst>
-          </a:blip>
-          <a:srcRect/>
-          <a:stretch>
-            <a:fillRect/>
-          </a:stretch>
-        </p:blipFill>
-        <p:spPr bwMode="auto">
-          <a:xfrm>
-            <a:off x="4644008" y="2924944"/>
-            <a:ext cx="3693676" cy="2318466"/>
-          </a:xfrm>
-          <a:prstGeom prst="rect">
-            <a:avLst/>
-          </a:prstGeom>
-          <a:noFill/>
-          <a:extLst>
-            <a:ext uri="{909E8E84-426E-40DD-AFC4-6F175D3DCCD1}">
-              <a14:hiddenFill xmlns:a14="http://schemas.microsoft.com/office/drawing/2010/main">
-                <a:solidFill>
-                  <a:srgbClr val="FFFFFF"/>
-                </a:solidFill>
-              </a14:hiddenFill>
-            </a:ext>
-          </a:extLst>
+          <a:ln>
+            <a:noFill/>
+          </a:ln>
         </p:spPr>
       </p:pic>
     </p:spTree>
     <p:extLst>
       <p:ext uri="{BB962C8B-B14F-4D97-AF65-F5344CB8AC3E}">
-        <p14:creationId xmlns:p14="http://schemas.microsoft.com/office/powerpoint/2010/main" val="1336122015"/>
+        <p14:creationId xmlns:p14="http://schemas.microsoft.com/office/powerpoint/2010/main" val="3625565739"/>
       </p:ext>
     </p:extLst>
   </p:cSld>
@@ -6567,11 +6723,17 @@
             <p:ph type="title"/>
           </p:nvPr>
         </p:nvSpPr>
-        <p:spPr/>
+        <p:spPr>
+          <a:xfrm>
+            <a:off x="2483768" y="274638"/>
+            <a:ext cx="5328592" cy="1143000"/>
+          </a:xfrm>
+        </p:spPr>
         <p:txBody>
           <a:bodyPr/>
           <a:lstStyle/>
           <a:p>
+            <a:pPr algn="ctr"/>
             <a:r>
               <a:rPr lang="pt-BR" dirty="0" smtClean="0"/>
               <a:t>Agenda</a:t>
@@ -6601,64 +6763,70 @@
           <a:lstStyle/>
           <a:p>
             <a:r>
-              <a:rPr lang="pt-BR" sz="2400" dirty="0" smtClean="0"/>
+              <a:rPr lang="pt-BR" sz="2000" dirty="0" smtClean="0"/>
               <a:t>Introdução</a:t>
             </a:r>
           </a:p>
           <a:p>
             <a:r>
-              <a:rPr lang="pt-BR" sz="2400" dirty="0" smtClean="0"/>
+              <a:rPr lang="pt-BR" sz="2000" dirty="0" smtClean="0"/>
               <a:t>Metodologia</a:t>
             </a:r>
           </a:p>
           <a:p>
             <a:r>
-              <a:rPr lang="pt-BR" sz="2400" dirty="0" smtClean="0"/>
+              <a:rPr lang="pt-BR" sz="2000" dirty="0" smtClean="0"/>
               <a:t>Qt</a:t>
             </a:r>
           </a:p>
           <a:p>
             <a:r>
-              <a:rPr lang="pt-BR" sz="2400" dirty="0" smtClean="0"/>
+              <a:rPr lang="pt-BR" sz="2000" dirty="0" smtClean="0"/>
               <a:t>Alternativas ao Qt</a:t>
             </a:r>
           </a:p>
           <a:p>
             <a:r>
-              <a:rPr lang="pt-BR" sz="2400" dirty="0" smtClean="0"/>
+              <a:rPr lang="pt-BR" sz="2000" dirty="0" smtClean="0"/>
               <a:t>Estudo de Caso</a:t>
             </a:r>
           </a:p>
           <a:p>
             <a:r>
-              <a:rPr lang="pt-BR" sz="2400" dirty="0" smtClean="0"/>
+              <a:rPr lang="pt-BR" sz="2000" dirty="0" smtClean="0"/>
+              <a:t>Limitações do Projeto</a:t>
+            </a:r>
+          </a:p>
+          <a:p>
+            <a:r>
+              <a:rPr lang="pt-BR" sz="2000" dirty="0" smtClean="0"/>
               <a:t>Aplicação Cliente</a:t>
             </a:r>
           </a:p>
           <a:p>
             <a:r>
-              <a:rPr lang="pt-BR" sz="2400" dirty="0" smtClean="0"/>
+              <a:rPr lang="pt-BR" sz="2000" dirty="0" smtClean="0"/>
               <a:t>Aplicação Servidor</a:t>
             </a:r>
           </a:p>
           <a:p>
             <a:r>
-              <a:rPr lang="pt-BR" sz="2400" dirty="0" smtClean="0"/>
+              <a:rPr lang="pt-BR" sz="2000" dirty="0" smtClean="0"/>
               <a:t>Conclusão</a:t>
             </a:r>
           </a:p>
           <a:p>
             <a:r>
-              <a:rPr lang="pt-BR" sz="2400" dirty="0" smtClean="0"/>
+              <a:rPr lang="pt-BR" sz="2000" dirty="0" smtClean="0"/>
               <a:t>Trabalhos Futuros</a:t>
             </a:r>
           </a:p>
           <a:p>
             <a:r>
-              <a:rPr lang="pt-BR" sz="2400" dirty="0" smtClean="0"/>
+              <a:rPr lang="pt-BR" sz="2000" dirty="0" smtClean="0"/>
               <a:t>Agradecimentos</a:t>
             </a:r>
-            <a:endParaRPr lang="pt-BR" sz="2400" dirty="0"/>
+            <a:endParaRPr lang="pt-BR" sz="2000" dirty="0"/>
           </a:p>
         </p:txBody>
       </p:sp>
@@ -6736,14 +6904,20 @@
             <p:ph type="title"/>
           </p:nvPr>
         </p:nvSpPr>
-        <p:spPr/>
+        <p:spPr>
+          <a:xfrm>
+            <a:off x="2483768" y="274638"/>
+            <a:ext cx="5328592" cy="1143000"/>
+          </a:xfrm>
+        </p:spPr>
         <p:txBody>
           <a:bodyPr/>
           <a:lstStyle/>
           <a:p>
+            <a:pPr algn="ctr"/>
             <a:r>
               <a:rPr lang="pt-BR" dirty="0" smtClean="0"/>
-              <a:t>Tecnologias Utilizadas</a:t>
+              <a:t>Limitações do Projeto</a:t>
             </a:r>
             <a:endParaRPr lang="pt-BR" dirty="0"/>
           </a:p>
@@ -6759,41 +6933,63 @@
             <p:ph idx="1"/>
           </p:nvPr>
         </p:nvSpPr>
-        <p:spPr/>
+        <p:spPr>
+          <a:xfrm>
+            <a:off x="457200" y="1600201"/>
+            <a:ext cx="8229600" cy="2692896"/>
+          </a:xfrm>
+        </p:spPr>
         <p:txBody>
           <a:bodyPr numCol="2"/>
           <a:lstStyle/>
           <a:p>
+            <a:pPr algn="l"/>
             <a:r>
               <a:rPr lang="pt-BR" dirty="0" smtClean="0"/>
-              <a:t>Qt 5.3.2</a:t>
-            </a:r>
-          </a:p>
-          <a:p>
-            <a:endParaRPr lang="pt-BR" dirty="0"/>
-          </a:p>
-          <a:p>
+              <a:t>O que foi implementado:</a:t>
+            </a:r>
+          </a:p>
+          <a:p>
+            <a:pPr lvl="1" algn="l"/>
+            <a:r>
+              <a:rPr lang="pt-BR" dirty="0" err="1" smtClean="0"/>
+              <a:t>Login</a:t>
+            </a:r>
             <a:endParaRPr lang="pt-BR" dirty="0" smtClean="0"/>
           </a:p>
           <a:p>
-            <a:endParaRPr lang="pt-BR" dirty="0"/>
-          </a:p>
-          <a:p>
-            <a:endParaRPr lang="pt-BR" dirty="0" smtClean="0"/>
-          </a:p>
-          <a:p>
-            <a:endParaRPr lang="pt-BR" dirty="0"/>
-          </a:p>
-          <a:p>
-            <a:endParaRPr lang="pt-BR" dirty="0" smtClean="0"/>
-          </a:p>
-          <a:p>
-            <a:endParaRPr lang="pt-BR" dirty="0" smtClean="0"/>
-          </a:p>
-          <a:p>
-            <a:r>
-              <a:rPr lang="pt-BR" dirty="0" err="1" smtClean="0"/>
-              <a:t>Git</a:t>
+            <a:pPr lvl="1" algn="l"/>
+            <a:r>
+              <a:rPr lang="pt-BR" dirty="0" smtClean="0"/>
+              <a:t>Cadastro</a:t>
+            </a:r>
+          </a:p>
+          <a:p>
+            <a:pPr lvl="1" algn="l"/>
+            <a:r>
+              <a:rPr lang="pt-BR" dirty="0" smtClean="0"/>
+              <a:t>Troca de Mensagens de Texto</a:t>
+            </a:r>
+          </a:p>
+          <a:p>
+            <a:pPr algn="l"/>
+            <a:r>
+              <a:rPr lang="pt-BR" dirty="0" smtClean="0"/>
+              <a:t>O que não foi implementado:</a:t>
+            </a:r>
+          </a:p>
+          <a:p>
+            <a:pPr lvl="1" algn="l"/>
+            <a:r>
+              <a:rPr lang="pt-BR" dirty="0" smtClean="0"/>
+              <a:t>Grupos</a:t>
+            </a:r>
+          </a:p>
+          <a:p>
+            <a:pPr lvl="1" algn="l"/>
+            <a:r>
+              <a:rPr lang="pt-BR" dirty="0" smtClean="0"/>
+              <a:t>Envio de Mídia</a:t>
             </a:r>
             <a:endParaRPr lang="pt-BR" dirty="0"/>
           </a:p>
@@ -6823,40 +7019,71 @@
           </a:p>
         </p:txBody>
       </p:sp>
-      <p:pic>
-        <p:nvPicPr>
-          <p:cNvPr id="5" name="Picture 4"/>
-          <p:cNvPicPr>
-            <a:picLocks noChangeAspect="1"/>
-          </p:cNvPicPr>
+      <p:sp>
+        <p:nvSpPr>
+          <p:cNvPr id="5" name="TextBox 4"/>
+          <p:cNvSpPr txBox="1"/>
           <p:nvPr/>
-        </p:nvPicPr>
-        <p:blipFill>
-          <a:blip r:embed="rId2">
-            <a:extLst>
-              <a:ext uri="{28A0092B-C50C-407E-A947-70E740481C1C}">
-                <a14:useLocalDpi xmlns:a14="http://schemas.microsoft.com/office/drawing/2010/main" val="0"/>
-              </a:ext>
-            </a:extLst>
-          </a:blip>
-          <a:stretch>
-            <a:fillRect/>
-          </a:stretch>
-        </p:blipFill>
+        </p:nvSpPr>
         <p:spPr>
           <a:xfrm>
-            <a:off x="457200" y="2622649"/>
-            <a:ext cx="2481064" cy="2481064"/>
+            <a:off x="575556" y="4767897"/>
+            <a:ext cx="7992888" cy="1477328"/>
           </a:xfrm>
           <a:prstGeom prst="rect">
             <a:avLst/>
           </a:prstGeom>
-        </p:spPr>
-      </p:pic>
+          <a:noFill/>
+        </p:spPr>
+        <p:txBody>
+          <a:bodyPr wrap="square" rtlCol="0">
+            <a:spAutoFit/>
+          </a:bodyPr>
+          <a:lstStyle/>
+          <a:p>
+            <a:r>
+              <a:rPr lang="pt-BR" sz="3000" dirty="0" smtClean="0"/>
+              <a:t>Plataformas Testadas:</a:t>
+            </a:r>
+          </a:p>
+          <a:p>
+            <a:pPr marL="342900" indent="-342900">
+              <a:buFont typeface="Arial" panose="020B0604020202020204" pitchFamily="34" charset="0"/>
+              <a:buChar char="•"/>
+            </a:pPr>
+            <a:r>
+              <a:rPr lang="pt-BR" sz="2000" dirty="0" smtClean="0"/>
+              <a:t>Windows</a:t>
+            </a:r>
+          </a:p>
+          <a:p>
+            <a:pPr marL="342900" indent="-342900">
+              <a:buFont typeface="Arial" panose="020B0604020202020204" pitchFamily="34" charset="0"/>
+              <a:buChar char="•"/>
+            </a:pPr>
+            <a:r>
+              <a:rPr lang="pt-BR" sz="2000" dirty="0" err="1" smtClean="0"/>
+              <a:t>Android</a:t>
+            </a:r>
+            <a:endParaRPr lang="pt-BR" sz="2000" dirty="0" smtClean="0"/>
+          </a:p>
+          <a:p>
+            <a:pPr marL="342900" indent="-342900">
+              <a:buFont typeface="Arial" panose="020B0604020202020204" pitchFamily="34" charset="0"/>
+              <a:buChar char="•"/>
+            </a:pPr>
+            <a:r>
+              <a:rPr lang="pt-BR" sz="2000" dirty="0" smtClean="0"/>
+              <a:t>Linux</a:t>
+            </a:r>
+            <a:endParaRPr lang="pt-BR" sz="2000" dirty="0"/>
+          </a:p>
+        </p:txBody>
+      </p:sp>
     </p:spTree>
     <p:extLst>
       <p:ext uri="{BB962C8B-B14F-4D97-AF65-F5344CB8AC3E}">
-        <p14:creationId xmlns:p14="http://schemas.microsoft.com/office/powerpoint/2010/main" val="2482608355"/>
+        <p14:creationId xmlns:p14="http://schemas.microsoft.com/office/powerpoint/2010/main" val="1428006623"/>
       </p:ext>
     </p:extLst>
   </p:cSld>
@@ -6895,7 +7122,7 @@
       </p:grpSpPr>
       <p:sp>
         <p:nvSpPr>
-          <p:cNvPr id="2" name="Título 1"/>
+          <p:cNvPr id="2" name="Title 1"/>
           <p:cNvSpPr>
             <a:spLocks noGrp="1"/>
           </p:cNvSpPr>
@@ -6903,14 +7130,55 @@
             <p:ph type="title"/>
           </p:nvPr>
         </p:nvSpPr>
+        <p:spPr>
+          <a:xfrm>
+            <a:off x="2483768" y="274638"/>
+            <a:ext cx="5328592" cy="1143000"/>
+          </a:xfrm>
+        </p:spPr>
+        <p:txBody>
+          <a:bodyPr/>
+          <a:lstStyle/>
+          <a:p>
+            <a:pPr algn="ctr"/>
+            <a:r>
+              <a:rPr lang="pt-BR" dirty="0" smtClean="0"/>
+              <a:t>Cliente (QTCC)</a:t>
+            </a:r>
+            <a:endParaRPr lang="pt-BR" dirty="0"/>
+          </a:p>
+        </p:txBody>
+      </p:sp>
+      <p:sp>
+        <p:nvSpPr>
+          <p:cNvPr id="3" name="Content Placeholder 2"/>
+          <p:cNvSpPr>
+            <a:spLocks noGrp="1"/>
+          </p:cNvSpPr>
+          <p:nvPr>
+            <p:ph idx="1"/>
+          </p:nvPr>
+        </p:nvSpPr>
         <p:spPr/>
         <p:txBody>
           <a:bodyPr/>
           <a:lstStyle/>
           <a:p>
             <a:r>
-              <a:rPr lang="pt-BR" smtClean="0"/>
-              <a:t>Arquitetura do Sistema</a:t>
+              <a:rPr lang="pt-BR" dirty="0" err="1" smtClean="0"/>
+              <a:t>Login</a:t>
+            </a:r>
+            <a:r>
+              <a:rPr lang="pt-BR" dirty="0" smtClean="0"/>
+              <a:t> </a:t>
+            </a:r>
+            <a:r>
+              <a:rPr lang="pt-BR" dirty="0" smtClean="0"/>
+              <a:t>de Usuários &lt;por foto</a:t>
+            </a:r>
+            <a:r>
+              <a:rPr lang="pt-BR" dirty="0" smtClean="0"/>
+              <a:t>&gt;</a:t>
             </a:r>
             <a:endParaRPr lang="pt-BR" dirty="0"/>
           </a:p>
@@ -6918,26 +7186,7 @@
       </p:sp>
       <p:sp>
         <p:nvSpPr>
-          <p:cNvPr id="6" name="Content Placeholder 5"/>
-          <p:cNvSpPr>
-            <a:spLocks noGrp="1"/>
-          </p:cNvSpPr>
-          <p:nvPr>
-            <p:ph idx="1"/>
-          </p:nvPr>
-        </p:nvSpPr>
-        <p:spPr/>
-        <p:txBody>
-          <a:bodyPr/>
-          <a:lstStyle/>
-          <a:p>
-            <a:endParaRPr lang="pt-BR" dirty="0"/>
-          </a:p>
-        </p:txBody>
-      </p:sp>
-      <p:sp>
-        <p:nvSpPr>
-          <p:cNvPr id="4" name="Espaço Reservado para Número de Slide 3"/>
+          <p:cNvPr id="4" name="Slide Number Placeholder 3"/>
           <p:cNvSpPr>
             <a:spLocks noGrp="1"/>
           </p:cNvSpPr>
@@ -6959,43 +7208,10 @@
           </a:p>
         </p:txBody>
       </p:sp>
-      <p:pic>
-        <p:nvPicPr>
-          <p:cNvPr id="5" name="Picture 4" descr="H:\Nova pasta\TCC\Modelo de Arquitetura Cliente Servidor.png"/>
-          <p:cNvPicPr/>
-          <p:nvPr/>
-        </p:nvPicPr>
-        <p:blipFill>
-          <a:blip r:embed="rId2">
-            <a:extLst>
-              <a:ext uri="{28A0092B-C50C-407E-A947-70E740481C1C}">
-                <a14:useLocalDpi xmlns:a14="http://schemas.microsoft.com/office/drawing/2010/main" val="0"/>
-              </a:ext>
-            </a:extLst>
-          </a:blip>
-          <a:srcRect/>
-          <a:stretch>
-            <a:fillRect/>
-          </a:stretch>
-        </p:blipFill>
-        <p:spPr bwMode="auto">
-          <a:xfrm>
-            <a:off x="1115616" y="1448551"/>
-            <a:ext cx="6912768" cy="4829259"/>
-          </a:xfrm>
-          <a:prstGeom prst="rect">
-            <a:avLst/>
-          </a:prstGeom>
-          <a:noFill/>
-          <a:ln>
-            <a:noFill/>
-          </a:ln>
-        </p:spPr>
-      </p:pic>
     </p:spTree>
     <p:extLst>
       <p:ext uri="{BB962C8B-B14F-4D97-AF65-F5344CB8AC3E}">
-        <p14:creationId xmlns:p14="http://schemas.microsoft.com/office/powerpoint/2010/main" val="3625565739"/>
+        <p14:creationId xmlns:p14="http://schemas.microsoft.com/office/powerpoint/2010/main" val="202705441"/>
       </p:ext>
     </p:extLst>
   </p:cSld>
@@ -7034,7 +7250,7 @@
       </p:grpSpPr>
       <p:sp>
         <p:nvSpPr>
-          <p:cNvPr id="2" name="Título 1"/>
+          <p:cNvPr id="2" name="Title 1"/>
           <p:cNvSpPr>
             <a:spLocks noGrp="1"/>
           </p:cNvSpPr>
@@ -7042,6 +7258,35 @@
             <p:ph type="title"/>
           </p:nvPr>
         </p:nvSpPr>
+        <p:spPr>
+          <a:xfrm>
+            <a:off x="2483768" y="274638"/>
+            <a:ext cx="5328592" cy="1143000"/>
+          </a:xfrm>
+        </p:spPr>
+        <p:txBody>
+          <a:bodyPr/>
+          <a:lstStyle/>
+          <a:p>
+            <a:pPr algn="ctr"/>
+            <a:r>
+              <a:rPr lang="pt-BR" dirty="0" smtClean="0"/>
+              <a:t>Cliente (QTCC)</a:t>
+            </a:r>
+            <a:endParaRPr lang="pt-BR" dirty="0"/>
+          </a:p>
+        </p:txBody>
+      </p:sp>
+      <p:sp>
+        <p:nvSpPr>
+          <p:cNvPr id="3" name="Content Placeholder 2"/>
+          <p:cNvSpPr>
+            <a:spLocks noGrp="1"/>
+          </p:cNvSpPr>
+          <p:nvPr>
+            <p:ph idx="1"/>
+          </p:nvPr>
+        </p:nvSpPr>
         <p:spPr/>
         <p:txBody>
           <a:bodyPr/>
@@ -7049,7 +7294,19 @@
           <a:p>
             <a:r>
               <a:rPr lang="pt-BR" dirty="0" smtClean="0"/>
-              <a:t>Conclusão</a:t>
+              <a:t>Cadastro </a:t>
+            </a:r>
+            <a:r>
+              <a:rPr lang="pt-BR" dirty="0" smtClean="0"/>
+              <a:t>de Usuários </a:t>
+            </a:r>
+            <a:r>
+              <a:rPr lang="pt-BR" dirty="0"/>
+              <a:t>&lt;por foto</a:t>
+            </a:r>
+            <a:r>
+              <a:rPr lang="pt-BR" dirty="0" smtClean="0"/>
+              <a:t>&gt;</a:t>
             </a:r>
             <a:endParaRPr lang="pt-BR" dirty="0"/>
           </a:p>
@@ -7057,52 +7314,7 @@
       </p:sp>
       <p:sp>
         <p:nvSpPr>
-          <p:cNvPr id="3" name="Espaço Reservado para Conteúdo 2"/>
-          <p:cNvSpPr>
-            <a:spLocks noGrp="1"/>
-          </p:cNvSpPr>
-          <p:nvPr>
-            <p:ph idx="1"/>
-          </p:nvPr>
-        </p:nvSpPr>
-        <p:spPr/>
-        <p:txBody>
-          <a:bodyPr/>
-          <a:lstStyle/>
-          <a:p>
-            <a:r>
-              <a:rPr lang="pt-BR" dirty="0" smtClean="0"/>
-              <a:t>O desenvolvimento </a:t>
-            </a:r>
-            <a:r>
-              <a:rPr lang="pt-BR" dirty="0" err="1" smtClean="0"/>
-              <a:t>multiplataforma</a:t>
-            </a:r>
-            <a:r>
-              <a:rPr lang="pt-BR" dirty="0" smtClean="0"/>
-              <a:t> utilizando Qt é viável.</a:t>
-            </a:r>
-          </a:p>
-          <a:p>
-            <a:r>
-              <a:rPr lang="pt-BR" dirty="0" err="1" smtClean="0"/>
-              <a:t>Refatoração</a:t>
-            </a:r>
-            <a:r>
-              <a:rPr lang="pt-BR" dirty="0" smtClean="0"/>
-              <a:t> próxima </a:t>
-            </a:r>
-            <a:r>
-              <a:rPr lang="pt-BR" smtClean="0"/>
-              <a:t>de zero.</a:t>
-            </a:r>
-            <a:endParaRPr lang="pt-BR" dirty="0"/>
-          </a:p>
-        </p:txBody>
-      </p:sp>
-      <p:sp>
-        <p:nvSpPr>
-          <p:cNvPr id="4" name="Espaço Reservado para Número de Slide 3"/>
+          <p:cNvPr id="4" name="Slide Number Placeholder 3"/>
           <p:cNvSpPr>
             <a:spLocks noGrp="1"/>
           </p:cNvSpPr>
@@ -7127,7 +7339,7 @@
     </p:spTree>
     <p:extLst>
       <p:ext uri="{BB962C8B-B14F-4D97-AF65-F5344CB8AC3E}">
-        <p14:creationId xmlns:p14="http://schemas.microsoft.com/office/powerpoint/2010/main" val="1724550400"/>
+        <p14:creationId xmlns:p14="http://schemas.microsoft.com/office/powerpoint/2010/main" val="1424489595"/>
       </p:ext>
     </p:extLst>
   </p:cSld>
@@ -7174,6 +7386,35 @@
             <p:ph type="title"/>
           </p:nvPr>
         </p:nvSpPr>
+        <p:spPr>
+          <a:xfrm>
+            <a:off x="2483768" y="274638"/>
+            <a:ext cx="5328592" cy="1143000"/>
+          </a:xfrm>
+        </p:spPr>
+        <p:txBody>
+          <a:bodyPr/>
+          <a:lstStyle/>
+          <a:p>
+            <a:pPr algn="ctr"/>
+            <a:r>
+              <a:rPr lang="pt-BR" dirty="0" smtClean="0"/>
+              <a:t>Cliente (QTCC)</a:t>
+            </a:r>
+            <a:endParaRPr lang="pt-BR" dirty="0"/>
+          </a:p>
+        </p:txBody>
+      </p:sp>
+      <p:sp>
+        <p:nvSpPr>
+          <p:cNvPr id="3" name="Content Placeholder 2"/>
+          <p:cNvSpPr>
+            <a:spLocks noGrp="1"/>
+          </p:cNvSpPr>
+          <p:nvPr>
+            <p:ph idx="1"/>
+          </p:nvPr>
+        </p:nvSpPr>
         <p:spPr/>
         <p:txBody>
           <a:bodyPr/>
@@ -7181,50 +7422,16 @@
           <a:p>
             <a:r>
               <a:rPr lang="pt-BR" dirty="0" smtClean="0"/>
-              <a:t>Trabalhos Futuros</a:t>
-            </a:r>
-            <a:endParaRPr lang="pt-BR" dirty="0"/>
-          </a:p>
-        </p:txBody>
-      </p:sp>
-      <p:sp>
-        <p:nvSpPr>
-          <p:cNvPr id="3" name="Content Placeholder 2"/>
-          <p:cNvSpPr>
-            <a:spLocks noGrp="1"/>
-          </p:cNvSpPr>
-          <p:nvPr>
-            <p:ph idx="1"/>
-          </p:nvPr>
-        </p:nvSpPr>
-        <p:spPr/>
-        <p:txBody>
-          <a:bodyPr/>
-          <a:lstStyle/>
-          <a:p>
+              <a:t>Troca </a:t>
+            </a:r>
             <a:r>
               <a:rPr lang="pt-BR" dirty="0" smtClean="0"/>
-              <a:t>Interfaces com QML</a:t>
-            </a:r>
-          </a:p>
-          <a:p>
-            <a:endParaRPr lang="pt-BR" dirty="0" smtClean="0"/>
-          </a:p>
-          <a:p>
-            <a:r>
-              <a:rPr lang="pt-BR" dirty="0" smtClean="0"/>
-              <a:t>Conversas em grupo</a:t>
-            </a:r>
-          </a:p>
-          <a:p>
-            <a:endParaRPr lang="pt-BR" dirty="0" smtClean="0"/>
-          </a:p>
-          <a:p>
-            <a:r>
-              <a:rPr lang="pt-BR" dirty="0" smtClean="0"/>
-              <a:t>Envio de mídias</a:t>
-            </a:r>
-            <a:endParaRPr lang="pt-BR" dirty="0"/>
+              <a:t>de Mensagens </a:t>
+            </a:r>
+            <a:r>
+              <a:rPr lang="pt-BR" dirty="0"/>
+              <a:t>&lt;por foto&gt;</a:t>
+            </a:r>
           </a:p>
         </p:txBody>
       </p:sp>
@@ -7255,7 +7462,7 @@
     </p:spTree>
     <p:extLst>
       <p:ext uri="{BB962C8B-B14F-4D97-AF65-F5344CB8AC3E}">
-        <p14:creationId xmlns:p14="http://schemas.microsoft.com/office/powerpoint/2010/main" val="2912610197"/>
+        <p14:creationId xmlns:p14="http://schemas.microsoft.com/office/powerpoint/2010/main" val="2490641662"/>
       </p:ext>
     </p:extLst>
   </p:cSld>
@@ -7265,6 +7472,13 @@
   <p:transition>
     <p:fade/>
   </p:transition>
+  <p:timing>
+    <p:tnLst>
+      <p:par>
+        <p:cTn id="1" dur="indefinite" restart="never" nodeType="tmRoot"/>
+      </p:par>
+    </p:tnLst>
+  </p:timing>
 </p:sld>
 </file>
 
@@ -7287,7 +7501,7 @@
       </p:grpSpPr>
       <p:sp>
         <p:nvSpPr>
-          <p:cNvPr id="2" name="Título 1"/>
+          <p:cNvPr id="2" name="Title 1"/>
           <p:cNvSpPr>
             <a:spLocks noGrp="1"/>
           </p:cNvSpPr>
@@ -7295,14 +7509,55 @@
             <p:ph type="title"/>
           </p:nvPr>
         </p:nvSpPr>
+        <p:spPr>
+          <a:xfrm>
+            <a:off x="2483768" y="274638"/>
+            <a:ext cx="5328592" cy="1143000"/>
+          </a:xfrm>
+        </p:spPr>
+        <p:txBody>
+          <a:bodyPr/>
+          <a:lstStyle/>
+          <a:p>
+            <a:pPr algn="ctr"/>
+            <a:r>
+              <a:rPr lang="pt-BR" dirty="0" smtClean="0"/>
+              <a:t>Servidor (</a:t>
+            </a:r>
+            <a:r>
+              <a:rPr lang="pt-BR" dirty="0" err="1" smtClean="0"/>
+              <a:t>QTCC_Server</a:t>
+            </a:r>
+            <a:r>
+              <a:rPr lang="pt-BR" dirty="0" smtClean="0"/>
+              <a:t>)</a:t>
+            </a:r>
+            <a:endParaRPr lang="pt-BR" dirty="0"/>
+          </a:p>
+        </p:txBody>
+      </p:sp>
+      <p:sp>
+        <p:nvSpPr>
+          <p:cNvPr id="3" name="Content Placeholder 2"/>
+          <p:cNvSpPr>
+            <a:spLocks noGrp="1"/>
+          </p:cNvSpPr>
+          <p:nvPr>
+            <p:ph idx="1"/>
+          </p:nvPr>
+        </p:nvSpPr>
         <p:spPr/>
         <p:txBody>
           <a:bodyPr/>
           <a:lstStyle/>
           <a:p>
             <a:r>
+              <a:rPr lang="pt-BR" dirty="0"/>
+              <a:t>Gerencia o tráfego de mensagens &lt;por foto</a:t>
+            </a:r>
+            <a:r>
               <a:rPr lang="pt-BR" dirty="0" smtClean="0"/>
-              <a:t>Agradecimentos</a:t>
+              <a:t>&gt;</a:t>
             </a:r>
             <a:endParaRPr lang="pt-BR" dirty="0"/>
           </a:p>
@@ -7310,51 +7565,7 @@
       </p:sp>
       <p:sp>
         <p:nvSpPr>
-          <p:cNvPr id="3" name="Espaço Reservado para Conteúdo 2"/>
-          <p:cNvSpPr>
-            <a:spLocks noGrp="1"/>
-          </p:cNvSpPr>
-          <p:nvPr>
-            <p:ph idx="1"/>
-          </p:nvPr>
-        </p:nvSpPr>
-        <p:spPr/>
-        <p:txBody>
-          <a:bodyPr/>
-          <a:lstStyle/>
-          <a:p>
-            <a:r>
-              <a:rPr lang="pt-BR" dirty="0"/>
-              <a:t>Fundação Salvador </a:t>
-            </a:r>
-            <a:r>
-              <a:rPr lang="pt-BR" dirty="0" smtClean="0"/>
-              <a:t>Arena</a:t>
-            </a:r>
-          </a:p>
-          <a:p>
-            <a:r>
-              <a:rPr lang="pt-BR" dirty="0" smtClean="0"/>
-              <a:t>Professores Eduardo, Ricardo</a:t>
-            </a:r>
-          </a:p>
-          <a:p>
-            <a:r>
-              <a:rPr lang="pt-BR" dirty="0" smtClean="0"/>
-              <a:t>Familiares</a:t>
-            </a:r>
-          </a:p>
-          <a:p>
-            <a:r>
-              <a:rPr lang="pt-BR" dirty="0" smtClean="0"/>
-              <a:t>Amigos</a:t>
-            </a:r>
-          </a:p>
-        </p:txBody>
-      </p:sp>
-      <p:sp>
-        <p:nvSpPr>
-          <p:cNvPr id="4" name="Espaço Reservado para Número de Slide 3"/>
+          <p:cNvPr id="4" name="Slide Number Placeholder 3"/>
           <p:cNvSpPr>
             <a:spLocks noGrp="1"/>
           </p:cNvSpPr>
@@ -7379,7 +7590,1627 @@
     </p:spTree>
     <p:extLst>
       <p:ext uri="{BB962C8B-B14F-4D97-AF65-F5344CB8AC3E}">
-        <p14:creationId xmlns:p14="http://schemas.microsoft.com/office/powerpoint/2010/main" val="3093954524"/>
+        <p14:creationId xmlns:p14="http://schemas.microsoft.com/office/powerpoint/2010/main" val="3118226102"/>
+      </p:ext>
+    </p:extLst>
+  </p:cSld>
+  <p:clrMapOvr>
+    <a:masterClrMapping/>
+  </p:clrMapOvr>
+  <p:transition>
+    <p:fade/>
+  </p:transition>
+  <p:timing>
+    <p:tnLst>
+      <p:par>
+        <p:cTn id="1" dur="indefinite" restart="never" nodeType="tmRoot"/>
+      </p:par>
+    </p:tnLst>
+  </p:timing>
+</p:sld>
+</file>
+
+<file path=ppt/slides/slide25.xml><?xml version="1.0" encoding="utf-8"?>
+<p:sld xmlns:a="http://schemas.openxmlformats.org/drawingml/2006/main" xmlns:r="http://schemas.openxmlformats.org/officeDocument/2006/relationships" xmlns:p="http://schemas.openxmlformats.org/presentationml/2006/main">
+  <p:cSld>
+    <p:spTree>
+      <p:nvGrpSpPr>
+        <p:cNvPr id="1" name=""/>
+        <p:cNvGrpSpPr/>
+        <p:nvPr/>
+      </p:nvGrpSpPr>
+      <p:grpSpPr>
+        <a:xfrm>
+          <a:off x="0" y="0"/>
+          <a:ext cx="0" cy="0"/>
+          <a:chOff x="0" y="0"/>
+          <a:chExt cx="0" cy="0"/>
+        </a:xfrm>
+      </p:grpSpPr>
+      <p:sp>
+        <p:nvSpPr>
+          <p:cNvPr id="2" name="Title 1"/>
+          <p:cNvSpPr>
+            <a:spLocks noGrp="1"/>
+          </p:cNvSpPr>
+          <p:nvPr>
+            <p:ph type="title"/>
+          </p:nvPr>
+        </p:nvSpPr>
+        <p:spPr>
+          <a:xfrm>
+            <a:off x="2483768" y="274638"/>
+            <a:ext cx="5328592" cy="1143000"/>
+          </a:xfrm>
+        </p:spPr>
+        <p:txBody>
+          <a:bodyPr/>
+          <a:lstStyle/>
+          <a:p>
+            <a:pPr algn="ctr"/>
+            <a:r>
+              <a:rPr lang="pt-BR" dirty="0" smtClean="0"/>
+              <a:t>Servidor (</a:t>
+            </a:r>
+            <a:r>
+              <a:rPr lang="pt-BR" dirty="0" err="1" smtClean="0"/>
+              <a:t>QTCC_Server</a:t>
+            </a:r>
+            <a:r>
+              <a:rPr lang="pt-BR" dirty="0" smtClean="0"/>
+              <a:t>)</a:t>
+            </a:r>
+            <a:endParaRPr lang="pt-BR" dirty="0"/>
+          </a:p>
+        </p:txBody>
+      </p:sp>
+      <p:sp>
+        <p:nvSpPr>
+          <p:cNvPr id="3" name="Content Placeholder 2"/>
+          <p:cNvSpPr>
+            <a:spLocks noGrp="1"/>
+          </p:cNvSpPr>
+          <p:nvPr>
+            <p:ph idx="1"/>
+          </p:nvPr>
+        </p:nvSpPr>
+        <p:spPr/>
+        <p:txBody>
+          <a:bodyPr/>
+          <a:lstStyle/>
+          <a:p>
+            <a:r>
+              <a:rPr lang="pt-BR" dirty="0"/>
+              <a:t>Interface entre o banco de dados e clientes &lt;por foto&gt;</a:t>
+            </a:r>
+            <a:endParaRPr lang="pt-BR" dirty="0"/>
+          </a:p>
+        </p:txBody>
+      </p:sp>
+      <p:sp>
+        <p:nvSpPr>
+          <p:cNvPr id="4" name="Slide Number Placeholder 3"/>
+          <p:cNvSpPr>
+            <a:spLocks noGrp="1"/>
+          </p:cNvSpPr>
+          <p:nvPr>
+            <p:ph type="sldNum" sz="quarter" idx="12"/>
+          </p:nvPr>
+        </p:nvSpPr>
+        <p:spPr/>
+        <p:txBody>
+          <a:bodyPr/>
+          <a:lstStyle/>
+          <a:p>
+            <a:fld id="{75B5FC9A-82D6-4ABF-82CF-F56A69AA85D0}" type="slidenum">
+              <a:rPr lang="pt-BR" smtClean="0"/>
+              <a:pPr/>
+              <a:t>25</a:t>
+            </a:fld>
+            <a:endParaRPr lang="pt-BR"/>
+          </a:p>
+        </p:txBody>
+      </p:sp>
+    </p:spTree>
+    <p:extLst>
+      <p:ext uri="{BB962C8B-B14F-4D97-AF65-F5344CB8AC3E}">
+        <p14:creationId xmlns:p14="http://schemas.microsoft.com/office/powerpoint/2010/main" val="1697824884"/>
+      </p:ext>
+    </p:extLst>
+  </p:cSld>
+  <p:clrMapOvr>
+    <a:masterClrMapping/>
+  </p:clrMapOvr>
+  <p:transition>
+    <p:fade/>
+  </p:transition>
+  <p:timing>
+    <p:tnLst>
+      <p:par>
+        <p:cTn id="1" dur="indefinite" restart="never" nodeType="tmRoot"/>
+      </p:par>
+    </p:tnLst>
+  </p:timing>
+</p:sld>
+</file>
+
+<file path=ppt/slides/slide26.xml><?xml version="1.0" encoding="utf-8"?>
+<p:sld xmlns:a="http://schemas.openxmlformats.org/drawingml/2006/main" xmlns:r="http://schemas.openxmlformats.org/officeDocument/2006/relationships" xmlns:p="http://schemas.openxmlformats.org/presentationml/2006/main">
+  <p:cSld>
+    <p:spTree>
+      <p:nvGrpSpPr>
+        <p:cNvPr id="1" name=""/>
+        <p:cNvGrpSpPr/>
+        <p:nvPr/>
+      </p:nvGrpSpPr>
+      <p:grpSpPr>
+        <a:xfrm>
+          <a:off x="0" y="0"/>
+          <a:ext cx="0" cy="0"/>
+          <a:chOff x="0" y="0"/>
+          <a:chExt cx="0" cy="0"/>
+        </a:xfrm>
+      </p:grpSpPr>
+      <p:sp>
+        <p:nvSpPr>
+          <p:cNvPr id="2" name="Title 1"/>
+          <p:cNvSpPr>
+            <a:spLocks noGrp="1"/>
+          </p:cNvSpPr>
+          <p:nvPr>
+            <p:ph type="title"/>
+          </p:nvPr>
+        </p:nvSpPr>
+        <p:spPr>
+          <a:xfrm>
+            <a:off x="2483768" y="274638"/>
+            <a:ext cx="5328592" cy="1143000"/>
+          </a:xfrm>
+        </p:spPr>
+        <p:txBody>
+          <a:bodyPr/>
+          <a:lstStyle/>
+          <a:p>
+            <a:pPr algn="ctr"/>
+            <a:r>
+              <a:rPr lang="pt-BR" dirty="0" smtClean="0"/>
+              <a:t>Servidor (</a:t>
+            </a:r>
+            <a:r>
+              <a:rPr lang="pt-BR" dirty="0" err="1" smtClean="0"/>
+              <a:t>QTCC_Server</a:t>
+            </a:r>
+            <a:r>
+              <a:rPr lang="pt-BR" dirty="0" smtClean="0"/>
+              <a:t>)</a:t>
+            </a:r>
+            <a:endParaRPr lang="pt-BR" dirty="0"/>
+          </a:p>
+        </p:txBody>
+      </p:sp>
+      <p:sp>
+        <p:nvSpPr>
+          <p:cNvPr id="3" name="Content Placeholder 2"/>
+          <p:cNvSpPr>
+            <a:spLocks noGrp="1"/>
+          </p:cNvSpPr>
+          <p:nvPr>
+            <p:ph idx="1"/>
+          </p:nvPr>
+        </p:nvSpPr>
+        <p:spPr/>
+        <p:txBody>
+          <a:bodyPr/>
+          <a:lstStyle/>
+          <a:p>
+            <a:r>
+              <a:rPr lang="pt-BR" dirty="0"/>
+              <a:t>Monitora usuários </a:t>
+            </a:r>
+            <a:r>
+              <a:rPr lang="pt-BR" dirty="0" err="1"/>
+              <a:t>logados</a:t>
+            </a:r>
+            <a:r>
+              <a:rPr lang="pt-BR" dirty="0"/>
+              <a:t> &lt;por foto&gt;</a:t>
+            </a:r>
+            <a:endParaRPr lang="pt-BR" dirty="0"/>
+          </a:p>
+        </p:txBody>
+      </p:sp>
+      <p:sp>
+        <p:nvSpPr>
+          <p:cNvPr id="4" name="Slide Number Placeholder 3"/>
+          <p:cNvSpPr>
+            <a:spLocks noGrp="1"/>
+          </p:cNvSpPr>
+          <p:nvPr>
+            <p:ph type="sldNum" sz="quarter" idx="12"/>
+          </p:nvPr>
+        </p:nvSpPr>
+        <p:spPr/>
+        <p:txBody>
+          <a:bodyPr/>
+          <a:lstStyle/>
+          <a:p>
+            <a:fld id="{75B5FC9A-82D6-4ABF-82CF-F56A69AA85D0}" type="slidenum">
+              <a:rPr lang="pt-BR" smtClean="0"/>
+              <a:pPr/>
+              <a:t>26</a:t>
+            </a:fld>
+            <a:endParaRPr lang="pt-BR"/>
+          </a:p>
+        </p:txBody>
+      </p:sp>
+    </p:spTree>
+    <p:extLst>
+      <p:ext uri="{BB962C8B-B14F-4D97-AF65-F5344CB8AC3E}">
+        <p14:creationId xmlns:p14="http://schemas.microsoft.com/office/powerpoint/2010/main" val="394666431"/>
+      </p:ext>
+    </p:extLst>
+  </p:cSld>
+  <p:clrMapOvr>
+    <a:masterClrMapping/>
+  </p:clrMapOvr>
+  <p:transition>
+    <p:fade/>
+  </p:transition>
+  <p:timing>
+    <p:tnLst>
+      <p:par>
+        <p:cTn id="1" dur="indefinite" restart="never" nodeType="tmRoot"/>
+      </p:par>
+    </p:tnLst>
+  </p:timing>
+</p:sld>
+</file>
+
+<file path=ppt/slides/slide27.xml><?xml version="1.0" encoding="utf-8"?>
+<p:sld xmlns:a="http://schemas.openxmlformats.org/drawingml/2006/main" xmlns:r="http://schemas.openxmlformats.org/officeDocument/2006/relationships" xmlns:p="http://schemas.openxmlformats.org/presentationml/2006/main">
+  <p:cSld>
+    <p:spTree>
+      <p:nvGrpSpPr>
+        <p:cNvPr id="1" name=""/>
+        <p:cNvGrpSpPr/>
+        <p:nvPr/>
+      </p:nvGrpSpPr>
+      <p:grpSpPr>
+        <a:xfrm>
+          <a:off x="0" y="0"/>
+          <a:ext cx="0" cy="0"/>
+          <a:chOff x="0" y="0"/>
+          <a:chExt cx="0" cy="0"/>
+        </a:xfrm>
+      </p:grpSpPr>
+      <p:sp>
+        <p:nvSpPr>
+          <p:cNvPr id="2" name="Título 1"/>
+          <p:cNvSpPr>
+            <a:spLocks noGrp="1"/>
+          </p:cNvSpPr>
+          <p:nvPr>
+            <p:ph type="title"/>
+          </p:nvPr>
+        </p:nvSpPr>
+        <p:spPr>
+          <a:xfrm>
+            <a:off x="2483768" y="274638"/>
+            <a:ext cx="5328592" cy="1143000"/>
+          </a:xfrm>
+        </p:spPr>
+        <p:txBody>
+          <a:bodyPr/>
+          <a:lstStyle/>
+          <a:p>
+            <a:pPr algn="ctr"/>
+            <a:r>
+              <a:rPr lang="pt-BR" dirty="0" smtClean="0"/>
+              <a:t>Tecnologias Utilizadas</a:t>
+            </a:r>
+            <a:endParaRPr lang="pt-BR" dirty="0"/>
+          </a:p>
+        </p:txBody>
+      </p:sp>
+      <p:sp>
+        <p:nvSpPr>
+          <p:cNvPr id="3" name="Espaço Reservado para Conteúdo 2"/>
+          <p:cNvSpPr>
+            <a:spLocks noGrp="1"/>
+          </p:cNvSpPr>
+          <p:nvPr>
+            <p:ph idx="1"/>
+          </p:nvPr>
+        </p:nvSpPr>
+        <p:spPr>
+          <a:xfrm>
+            <a:off x="457200" y="1600200"/>
+            <a:ext cx="4042792" cy="4525963"/>
+          </a:xfrm>
+        </p:spPr>
+        <p:txBody>
+          <a:bodyPr numCol="1"/>
+          <a:lstStyle/>
+          <a:p>
+            <a:pPr algn="l"/>
+            <a:r>
+              <a:rPr lang="pt-BR" dirty="0" smtClean="0"/>
+              <a:t>Visual Studio 2013 </a:t>
+            </a:r>
+            <a:r>
+              <a:rPr lang="pt-BR" dirty="0" smtClean="0"/>
+              <a:t>(</a:t>
+            </a:r>
+            <a:r>
+              <a:rPr lang="pt-BR" dirty="0" smtClean="0"/>
+              <a:t>C#, Servidor</a:t>
+            </a:r>
+            <a:r>
+              <a:rPr lang="pt-BR" dirty="0" smtClean="0"/>
+              <a:t>)</a:t>
+            </a:r>
+            <a:endParaRPr lang="pt-BR" dirty="0" smtClean="0"/>
+          </a:p>
+        </p:txBody>
+      </p:sp>
+      <p:sp>
+        <p:nvSpPr>
+          <p:cNvPr id="4" name="Espaço Reservado para Número de Slide 3"/>
+          <p:cNvSpPr>
+            <a:spLocks noGrp="1"/>
+          </p:cNvSpPr>
+          <p:nvPr>
+            <p:ph type="sldNum" sz="quarter" idx="12"/>
+          </p:nvPr>
+        </p:nvSpPr>
+        <p:spPr/>
+        <p:txBody>
+          <a:bodyPr/>
+          <a:lstStyle/>
+          <a:p>
+            <a:fld id="{75B5FC9A-82D6-4ABF-82CF-F56A69AA85D0}" type="slidenum">
+              <a:rPr lang="pt-BR" smtClean="0"/>
+              <a:pPr/>
+              <a:t>27</a:t>
+            </a:fld>
+            <a:endParaRPr lang="pt-BR"/>
+          </a:p>
+        </p:txBody>
+      </p:sp>
+      <p:pic>
+        <p:nvPicPr>
+          <p:cNvPr id="1026" name="Picture 2" descr="C:\Users\Guilherme\Videos\rfid\visual-studio-2013-logo.png"/>
+          <p:cNvPicPr>
+            <a:picLocks noChangeAspect="1" noChangeArrowheads="1"/>
+          </p:cNvPicPr>
+          <p:nvPr/>
+        </p:nvPicPr>
+        <p:blipFill>
+          <a:blip r:embed="rId2">
+            <a:extLst>
+              <a:ext uri="{28A0092B-C50C-407E-A947-70E740481C1C}">
+                <a14:useLocalDpi xmlns:a14="http://schemas.microsoft.com/office/drawing/2010/main" val="0"/>
+              </a:ext>
+            </a:extLst>
+          </a:blip>
+          <a:srcRect/>
+          <a:stretch>
+            <a:fillRect/>
+          </a:stretch>
+        </p:blipFill>
+        <p:spPr bwMode="auto">
+          <a:xfrm>
+            <a:off x="683568" y="3474399"/>
+            <a:ext cx="3279670" cy="1886418"/>
+          </a:xfrm>
+          <a:prstGeom prst="rect">
+            <a:avLst/>
+          </a:prstGeom>
+          <a:noFill/>
+          <a:extLst>
+            <a:ext uri="{909E8E84-426E-40DD-AFC4-6F175D3DCCD1}">
+              <a14:hiddenFill xmlns:a14="http://schemas.microsoft.com/office/drawing/2010/main">
+                <a:solidFill>
+                  <a:srgbClr val="FFFFFF"/>
+                </a:solidFill>
+              </a14:hiddenFill>
+            </a:ext>
+          </a:extLst>
+        </p:spPr>
+      </p:pic>
+      <p:sp>
+        <p:nvSpPr>
+          <p:cNvPr id="7" name="Espaço Reservado para Conteúdo 2"/>
+          <p:cNvSpPr txBox="1">
+            <a:spLocks/>
+          </p:cNvSpPr>
+          <p:nvPr/>
+        </p:nvSpPr>
+        <p:spPr bwMode="auto">
+          <a:xfrm>
+            <a:off x="4499992" y="1600199"/>
+            <a:ext cx="4186808" cy="4525963"/>
+          </a:xfrm>
+          <a:prstGeom prst="rect">
+            <a:avLst/>
+          </a:prstGeom>
+          <a:noFill/>
+          <a:ln>
+            <a:noFill/>
+          </a:ln>
+          <a:extLst>
+            <a:ext uri="{909E8E84-426E-40DD-AFC4-6F175D3DCCD1}">
+              <a14:hiddenFill xmlns:a14="http://schemas.microsoft.com/office/drawing/2010/main">
+                <a:solidFill>
+                  <a:srgbClr val="FFFFFF"/>
+                </a:solidFill>
+              </a14:hiddenFill>
+            </a:ext>
+            <a:ext uri="{91240B29-F687-4F45-9708-019B960494DF}">
+              <a14:hiddenLine xmlns:a14="http://schemas.microsoft.com/office/drawing/2010/main" w="9525">
+                <a:solidFill>
+                  <a:srgbClr val="000000"/>
+                </a:solidFill>
+                <a:miter lim="800000"/>
+                <a:headEnd/>
+                <a:tailEnd/>
+              </a14:hiddenLine>
+            </a:ext>
+          </a:extLst>
+        </p:spPr>
+        <p:txBody>
+          <a:bodyPr vert="horz" wrap="square" lIns="91440" tIns="45720" rIns="91440" bIns="45720" numCol="1" anchor="t" anchorCtr="0" compatLnSpc="1">
+            <a:prstTxWarp prst="textNoShape">
+              <a:avLst/>
+            </a:prstTxWarp>
+          </a:bodyPr>
+          <a:lstStyle>
+            <a:lvl1pPr marL="342900" indent="-342900" algn="just" rtl="0" eaLnBrk="0" fontAlgn="base" hangingPunct="0">
+              <a:spcBef>
+                <a:spcPct val="20000"/>
+              </a:spcBef>
+              <a:spcAft>
+                <a:spcPct val="0"/>
+              </a:spcAft>
+              <a:buFont typeface="Wingdings" pitchFamily="2" charset="2"/>
+              <a:buChar char="Ø"/>
+              <a:defRPr sz="3000">
+                <a:solidFill>
+                  <a:schemeClr val="tx1"/>
+                </a:solidFill>
+                <a:latin typeface="+mn-lt"/>
+                <a:ea typeface="+mn-ea"/>
+                <a:cs typeface="+mn-cs"/>
+              </a:defRPr>
+            </a:lvl1pPr>
+            <a:lvl2pPr marL="742950" indent="-285750" algn="just" rtl="0" eaLnBrk="0" fontAlgn="base" hangingPunct="0">
+              <a:spcBef>
+                <a:spcPct val="20000"/>
+              </a:spcBef>
+              <a:spcAft>
+                <a:spcPct val="0"/>
+              </a:spcAft>
+              <a:buFont typeface="Arial" pitchFamily="34" charset="0"/>
+              <a:buChar char="•"/>
+              <a:defRPr sz="2400">
+                <a:solidFill>
+                  <a:schemeClr val="tx1"/>
+                </a:solidFill>
+                <a:latin typeface="+mn-lt"/>
+              </a:defRPr>
+            </a:lvl2pPr>
+            <a:lvl3pPr marL="1143000" indent="-228600" algn="just" rtl="0" eaLnBrk="0" fontAlgn="base" hangingPunct="0">
+              <a:spcBef>
+                <a:spcPct val="20000"/>
+              </a:spcBef>
+              <a:spcAft>
+                <a:spcPct val="0"/>
+              </a:spcAft>
+              <a:buFont typeface="Wingdings" pitchFamily="2" charset="2"/>
+              <a:buChar char="§"/>
+              <a:defRPr sz="2000">
+                <a:solidFill>
+                  <a:schemeClr val="tx1"/>
+                </a:solidFill>
+                <a:latin typeface="+mn-lt"/>
+              </a:defRPr>
+            </a:lvl3pPr>
+            <a:lvl4pPr marL="1600200" indent="-228600" algn="just" rtl="0" eaLnBrk="0" fontAlgn="base" hangingPunct="0">
+              <a:spcBef>
+                <a:spcPct val="20000"/>
+              </a:spcBef>
+              <a:spcAft>
+                <a:spcPct val="0"/>
+              </a:spcAft>
+              <a:buFont typeface="Courier New" pitchFamily="49" charset="0"/>
+              <a:buChar char="o"/>
+              <a:defRPr sz="1800">
+                <a:solidFill>
+                  <a:schemeClr val="tx1"/>
+                </a:solidFill>
+                <a:latin typeface="+mn-lt"/>
+              </a:defRPr>
+            </a:lvl4pPr>
+            <a:lvl5pPr marL="2057400" indent="-228600" algn="just" rtl="0" eaLnBrk="0" fontAlgn="base" hangingPunct="0">
+              <a:spcBef>
+                <a:spcPct val="20000"/>
+              </a:spcBef>
+              <a:spcAft>
+                <a:spcPct val="0"/>
+              </a:spcAft>
+              <a:buChar char="»"/>
+              <a:defRPr sz="1600">
+                <a:solidFill>
+                  <a:schemeClr val="tx1"/>
+                </a:solidFill>
+                <a:latin typeface="+mn-lt"/>
+              </a:defRPr>
+            </a:lvl5pPr>
+            <a:lvl6pPr marL="2514600" indent="-228600" algn="l" rtl="0" fontAlgn="base">
+              <a:spcBef>
+                <a:spcPct val="20000"/>
+              </a:spcBef>
+              <a:spcAft>
+                <a:spcPct val="0"/>
+              </a:spcAft>
+              <a:buChar char="»"/>
+              <a:defRPr sz="2000">
+                <a:solidFill>
+                  <a:schemeClr val="tx1"/>
+                </a:solidFill>
+                <a:latin typeface="+mn-lt"/>
+              </a:defRPr>
+            </a:lvl6pPr>
+            <a:lvl7pPr marL="2971800" indent="-228600" algn="l" rtl="0" fontAlgn="base">
+              <a:spcBef>
+                <a:spcPct val="20000"/>
+              </a:spcBef>
+              <a:spcAft>
+                <a:spcPct val="0"/>
+              </a:spcAft>
+              <a:buChar char="»"/>
+              <a:defRPr sz="2000">
+                <a:solidFill>
+                  <a:schemeClr val="tx1"/>
+                </a:solidFill>
+                <a:latin typeface="+mn-lt"/>
+              </a:defRPr>
+            </a:lvl7pPr>
+            <a:lvl8pPr marL="3429000" indent="-228600" algn="l" rtl="0" fontAlgn="base">
+              <a:spcBef>
+                <a:spcPct val="20000"/>
+              </a:spcBef>
+              <a:spcAft>
+                <a:spcPct val="0"/>
+              </a:spcAft>
+              <a:buChar char="»"/>
+              <a:defRPr sz="2000">
+                <a:solidFill>
+                  <a:schemeClr val="tx1"/>
+                </a:solidFill>
+                <a:latin typeface="+mn-lt"/>
+              </a:defRPr>
+            </a:lvl8pPr>
+            <a:lvl9pPr marL="3886200" indent="-228600" algn="l" rtl="0" fontAlgn="base">
+              <a:spcBef>
+                <a:spcPct val="20000"/>
+              </a:spcBef>
+              <a:spcAft>
+                <a:spcPct val="0"/>
+              </a:spcAft>
+              <a:buChar char="»"/>
+              <a:defRPr sz="2000">
+                <a:solidFill>
+                  <a:schemeClr val="tx1"/>
+                </a:solidFill>
+                <a:latin typeface="+mn-lt"/>
+              </a:defRPr>
+            </a:lvl9pPr>
+          </a:lstStyle>
+          <a:p>
+            <a:pPr algn="l"/>
+            <a:r>
+              <a:rPr lang="pt-BR" kern="0" dirty="0" smtClean="0"/>
+              <a:t>SQL Server 2012 (Persistência dos Dados)</a:t>
+            </a:r>
+            <a:endParaRPr lang="pt-BR" kern="0" dirty="0" smtClean="0"/>
+          </a:p>
+        </p:txBody>
+      </p:sp>
+      <p:pic>
+        <p:nvPicPr>
+          <p:cNvPr id="1027" name="Picture 3" descr="C:\Users\Guilherme\Videos\rfid\1830.SQL12_v_rgb.png"/>
+          <p:cNvPicPr>
+            <a:picLocks noChangeAspect="1" noChangeArrowheads="1"/>
+          </p:cNvPicPr>
+          <p:nvPr/>
+        </p:nvPicPr>
+        <p:blipFill>
+          <a:blip r:embed="rId3" cstate="print">
+            <a:extLst>
+              <a:ext uri="{28A0092B-C50C-407E-A947-70E740481C1C}">
+                <a14:useLocalDpi xmlns:a14="http://schemas.microsoft.com/office/drawing/2010/main" val="0"/>
+              </a:ext>
+            </a:extLst>
+          </a:blip>
+          <a:srcRect/>
+          <a:stretch>
+            <a:fillRect/>
+          </a:stretch>
+        </p:blipFill>
+        <p:spPr bwMode="auto">
+          <a:xfrm>
+            <a:off x="4855205" y="3351802"/>
+            <a:ext cx="3395990" cy="2131613"/>
+          </a:xfrm>
+          <a:prstGeom prst="rect">
+            <a:avLst/>
+          </a:prstGeom>
+          <a:noFill/>
+          <a:extLst>
+            <a:ext uri="{909E8E84-426E-40DD-AFC4-6F175D3DCCD1}">
+              <a14:hiddenFill xmlns:a14="http://schemas.microsoft.com/office/drawing/2010/main">
+                <a:solidFill>
+                  <a:srgbClr val="FFFFFF"/>
+                </a:solidFill>
+              </a14:hiddenFill>
+            </a:ext>
+          </a:extLst>
+        </p:spPr>
+      </p:pic>
+    </p:spTree>
+    <p:extLst>
+      <p:ext uri="{BB962C8B-B14F-4D97-AF65-F5344CB8AC3E}">
+        <p14:creationId xmlns:p14="http://schemas.microsoft.com/office/powerpoint/2010/main" val="1336122015"/>
+      </p:ext>
+    </p:extLst>
+  </p:cSld>
+  <p:clrMapOvr>
+    <a:masterClrMapping/>
+  </p:clrMapOvr>
+  <p:transition>
+    <p:fade/>
+  </p:transition>
+  <p:timing>
+    <p:tnLst>
+      <p:par>
+        <p:cTn id="1" dur="indefinite" restart="never" nodeType="tmRoot">
+          <p:childTnLst>
+            <p:seq concurrent="1" nextAc="seek">
+              <p:cTn id="2" dur="indefinite" nodeType="mainSeq">
+                <p:childTnLst>
+                  <p:par>
+                    <p:cTn id="3" fill="hold">
+                      <p:stCondLst>
+                        <p:cond delay="indefinite"/>
+                      </p:stCondLst>
+                      <p:childTnLst>
+                        <p:par>
+                          <p:cTn id="4" fill="hold">
+                            <p:stCondLst>
+                              <p:cond delay="0"/>
+                            </p:stCondLst>
+                            <p:childTnLst>
+                              <p:par>
+                                <p:cTn id="5" presetID="10" presetClass="entr" presetSubtype="0" fill="hold" grpId="0" nodeType="clickEffect">
+                                  <p:stCondLst>
+                                    <p:cond delay="0"/>
+                                  </p:stCondLst>
+                                  <p:childTnLst>
+                                    <p:set>
+                                      <p:cBhvr>
+                                        <p:cTn id="6" dur="1" fill="hold">
+                                          <p:stCondLst>
+                                            <p:cond delay="0"/>
+                                          </p:stCondLst>
+                                        </p:cTn>
+                                        <p:tgtEl>
+                                          <p:spTgt spid="3">
+                                            <p:txEl>
+                                              <p:pRg st="0" end="0"/>
+                                            </p:txEl>
+                                          </p:spTgt>
+                                        </p:tgtEl>
+                                        <p:attrNameLst>
+                                          <p:attrName>style.visibility</p:attrName>
+                                        </p:attrNameLst>
+                                      </p:cBhvr>
+                                      <p:to>
+                                        <p:strVal val="visible"/>
+                                      </p:to>
+                                    </p:set>
+                                    <p:animEffect transition="in" filter="fade">
+                                      <p:cBhvr>
+                                        <p:cTn id="7" dur="500"/>
+                                        <p:tgtEl>
+                                          <p:spTgt spid="3">
+                                            <p:txEl>
+                                              <p:pRg st="0" end="0"/>
+                                            </p:txEl>
+                                          </p:spTgt>
+                                        </p:tgtEl>
+                                      </p:cBhvr>
+                                    </p:animEffect>
+                                  </p:childTnLst>
+                                </p:cTn>
+                              </p:par>
+                              <p:par>
+                                <p:cTn id="8" presetID="10" presetClass="entr" presetSubtype="0" fill="hold" nodeType="withEffect">
+                                  <p:stCondLst>
+                                    <p:cond delay="0"/>
+                                  </p:stCondLst>
+                                  <p:childTnLst>
+                                    <p:set>
+                                      <p:cBhvr>
+                                        <p:cTn id="9" dur="1" fill="hold">
+                                          <p:stCondLst>
+                                            <p:cond delay="0"/>
+                                          </p:stCondLst>
+                                        </p:cTn>
+                                        <p:tgtEl>
+                                          <p:spTgt spid="1026"/>
+                                        </p:tgtEl>
+                                        <p:attrNameLst>
+                                          <p:attrName>style.visibility</p:attrName>
+                                        </p:attrNameLst>
+                                      </p:cBhvr>
+                                      <p:to>
+                                        <p:strVal val="visible"/>
+                                      </p:to>
+                                    </p:set>
+                                    <p:animEffect transition="in" filter="fade">
+                                      <p:cBhvr>
+                                        <p:cTn id="10" dur="500"/>
+                                        <p:tgtEl>
+                                          <p:spTgt spid="1026"/>
+                                        </p:tgtEl>
+                                      </p:cBhvr>
+                                    </p:animEffect>
+                                  </p:childTnLst>
+                                </p:cTn>
+                              </p:par>
+                            </p:childTnLst>
+                          </p:cTn>
+                        </p:par>
+                      </p:childTnLst>
+                    </p:cTn>
+                  </p:par>
+                  <p:par>
+                    <p:cTn id="11" fill="hold">
+                      <p:stCondLst>
+                        <p:cond delay="indefinite"/>
+                      </p:stCondLst>
+                      <p:childTnLst>
+                        <p:par>
+                          <p:cTn id="12" fill="hold">
+                            <p:stCondLst>
+                              <p:cond delay="0"/>
+                            </p:stCondLst>
+                            <p:childTnLst>
+                              <p:par>
+                                <p:cTn id="13" presetID="10" presetClass="entr" presetSubtype="0" fill="hold" grpId="0" nodeType="clickEffect">
+                                  <p:stCondLst>
+                                    <p:cond delay="0"/>
+                                  </p:stCondLst>
+                                  <p:childTnLst>
+                                    <p:set>
+                                      <p:cBhvr>
+                                        <p:cTn id="14" dur="1" fill="hold">
+                                          <p:stCondLst>
+                                            <p:cond delay="0"/>
+                                          </p:stCondLst>
+                                        </p:cTn>
+                                        <p:tgtEl>
+                                          <p:spTgt spid="7"/>
+                                        </p:tgtEl>
+                                        <p:attrNameLst>
+                                          <p:attrName>style.visibility</p:attrName>
+                                        </p:attrNameLst>
+                                      </p:cBhvr>
+                                      <p:to>
+                                        <p:strVal val="visible"/>
+                                      </p:to>
+                                    </p:set>
+                                    <p:animEffect transition="in" filter="fade">
+                                      <p:cBhvr>
+                                        <p:cTn id="15" dur="500"/>
+                                        <p:tgtEl>
+                                          <p:spTgt spid="7"/>
+                                        </p:tgtEl>
+                                      </p:cBhvr>
+                                    </p:animEffect>
+                                  </p:childTnLst>
+                                </p:cTn>
+                              </p:par>
+                              <p:par>
+                                <p:cTn id="16" presetID="10" presetClass="entr" presetSubtype="0" fill="hold" nodeType="withEffect">
+                                  <p:stCondLst>
+                                    <p:cond delay="0"/>
+                                  </p:stCondLst>
+                                  <p:childTnLst>
+                                    <p:set>
+                                      <p:cBhvr>
+                                        <p:cTn id="17" dur="1" fill="hold">
+                                          <p:stCondLst>
+                                            <p:cond delay="0"/>
+                                          </p:stCondLst>
+                                        </p:cTn>
+                                        <p:tgtEl>
+                                          <p:spTgt spid="1027"/>
+                                        </p:tgtEl>
+                                        <p:attrNameLst>
+                                          <p:attrName>style.visibility</p:attrName>
+                                        </p:attrNameLst>
+                                      </p:cBhvr>
+                                      <p:to>
+                                        <p:strVal val="visible"/>
+                                      </p:to>
+                                    </p:set>
+                                    <p:animEffect transition="in" filter="fade">
+                                      <p:cBhvr>
+                                        <p:cTn id="18" dur="500"/>
+                                        <p:tgtEl>
+                                          <p:spTgt spid="1027"/>
+                                        </p:tgtEl>
+                                      </p:cBhvr>
+                                    </p:animEffect>
+                                  </p:childTnLst>
+                                </p:cTn>
+                              </p:par>
+                            </p:childTnLst>
+                          </p:cTn>
+                        </p:par>
+                      </p:childTnLst>
+                    </p:cTn>
+                  </p:par>
+                </p:childTnLst>
+              </p:cTn>
+              <p:prevCondLst>
+                <p:cond evt="onPrev" delay="0">
+                  <p:tgtEl>
+                    <p:sldTgt/>
+                  </p:tgtEl>
+                </p:cond>
+              </p:prevCondLst>
+              <p:nextCondLst>
+                <p:cond evt="onNext" delay="0">
+                  <p:tgtEl>
+                    <p:sldTgt/>
+                  </p:tgtEl>
+                </p:cond>
+              </p:nextCondLst>
+            </p:seq>
+          </p:childTnLst>
+        </p:cTn>
+      </p:par>
+    </p:tnLst>
+    <p:bldLst>
+      <p:bldP spid="3" grpId="0" build="p"/>
+      <p:bldP spid="7" grpId="0"/>
+    </p:bldLst>
+  </p:timing>
+</p:sld>
+</file>
+
+<file path=ppt/slides/slide28.xml><?xml version="1.0" encoding="utf-8"?>
+<p:sld xmlns:a="http://schemas.openxmlformats.org/drawingml/2006/main" xmlns:r="http://schemas.openxmlformats.org/officeDocument/2006/relationships" xmlns:p="http://schemas.openxmlformats.org/presentationml/2006/main">
+  <p:cSld>
+    <p:spTree>
+      <p:nvGrpSpPr>
+        <p:cNvPr id="1" name=""/>
+        <p:cNvGrpSpPr/>
+        <p:nvPr/>
+      </p:nvGrpSpPr>
+      <p:grpSpPr>
+        <a:xfrm>
+          <a:off x="0" y="0"/>
+          <a:ext cx="0" cy="0"/>
+          <a:chOff x="0" y="0"/>
+          <a:chExt cx="0" cy="0"/>
+        </a:xfrm>
+      </p:grpSpPr>
+      <p:sp>
+        <p:nvSpPr>
+          <p:cNvPr id="2" name="Title 1"/>
+          <p:cNvSpPr>
+            <a:spLocks noGrp="1"/>
+          </p:cNvSpPr>
+          <p:nvPr>
+            <p:ph type="title"/>
+          </p:nvPr>
+        </p:nvSpPr>
+        <p:spPr>
+          <a:xfrm>
+            <a:off x="2483768" y="274638"/>
+            <a:ext cx="5328592" cy="1143000"/>
+          </a:xfrm>
+        </p:spPr>
+        <p:txBody>
+          <a:bodyPr/>
+          <a:lstStyle/>
+          <a:p>
+            <a:pPr algn="ctr"/>
+            <a:r>
+              <a:rPr lang="pt-BR" dirty="0" smtClean="0"/>
+              <a:t>Tecnologias Utilizadas</a:t>
+            </a:r>
+            <a:endParaRPr lang="pt-BR" dirty="0"/>
+          </a:p>
+        </p:txBody>
+      </p:sp>
+      <p:sp>
+        <p:nvSpPr>
+          <p:cNvPr id="3" name="Content Placeholder 2"/>
+          <p:cNvSpPr>
+            <a:spLocks noGrp="1"/>
+          </p:cNvSpPr>
+          <p:nvPr>
+            <p:ph idx="1"/>
+          </p:nvPr>
+        </p:nvSpPr>
+        <p:spPr>
+          <a:xfrm>
+            <a:off x="457200" y="1600200"/>
+            <a:ext cx="4114800" cy="4525963"/>
+          </a:xfrm>
+        </p:spPr>
+        <p:txBody>
+          <a:bodyPr numCol="1"/>
+          <a:lstStyle/>
+          <a:p>
+            <a:pPr algn="l"/>
+            <a:r>
+              <a:rPr lang="pt-BR" dirty="0" smtClean="0"/>
+              <a:t>Qt 5.3.2 (Cliente</a:t>
+            </a:r>
+            <a:r>
+              <a:rPr lang="pt-BR" dirty="0" smtClean="0"/>
+              <a:t>)</a:t>
+            </a:r>
+            <a:endParaRPr lang="pt-BR" dirty="0"/>
+          </a:p>
+        </p:txBody>
+      </p:sp>
+      <p:sp>
+        <p:nvSpPr>
+          <p:cNvPr id="4" name="Slide Number Placeholder 3"/>
+          <p:cNvSpPr>
+            <a:spLocks noGrp="1"/>
+          </p:cNvSpPr>
+          <p:nvPr>
+            <p:ph type="sldNum" sz="quarter" idx="12"/>
+          </p:nvPr>
+        </p:nvSpPr>
+        <p:spPr/>
+        <p:txBody>
+          <a:bodyPr/>
+          <a:lstStyle/>
+          <a:p>
+            <a:fld id="{75B5FC9A-82D6-4ABF-82CF-F56A69AA85D0}" type="slidenum">
+              <a:rPr lang="pt-BR" smtClean="0"/>
+              <a:pPr/>
+              <a:t>28</a:t>
+            </a:fld>
+            <a:endParaRPr lang="pt-BR"/>
+          </a:p>
+        </p:txBody>
+      </p:sp>
+      <p:pic>
+        <p:nvPicPr>
+          <p:cNvPr id="5" name="Picture 4"/>
+          <p:cNvPicPr>
+            <a:picLocks noChangeAspect="1"/>
+          </p:cNvPicPr>
+          <p:nvPr/>
+        </p:nvPicPr>
+        <p:blipFill>
+          <a:blip r:embed="rId2">
+            <a:extLst>
+              <a:ext uri="{28A0092B-C50C-407E-A947-70E740481C1C}">
+                <a14:useLocalDpi xmlns:a14="http://schemas.microsoft.com/office/drawing/2010/main" val="0"/>
+              </a:ext>
+            </a:extLst>
+          </a:blip>
+          <a:stretch>
+            <a:fillRect/>
+          </a:stretch>
+        </p:blipFill>
+        <p:spPr>
+          <a:xfrm>
+            <a:off x="1115616" y="2801336"/>
+            <a:ext cx="2481064" cy="2481064"/>
+          </a:xfrm>
+          <a:prstGeom prst="rect">
+            <a:avLst/>
+          </a:prstGeom>
+        </p:spPr>
+      </p:pic>
+      <p:sp>
+        <p:nvSpPr>
+          <p:cNvPr id="7" name="Content Placeholder 2"/>
+          <p:cNvSpPr txBox="1">
+            <a:spLocks/>
+          </p:cNvSpPr>
+          <p:nvPr/>
+        </p:nvSpPr>
+        <p:spPr bwMode="auto">
+          <a:xfrm>
+            <a:off x="4572000" y="1600200"/>
+            <a:ext cx="4114800" cy="4525963"/>
+          </a:xfrm>
+          <a:prstGeom prst="rect">
+            <a:avLst/>
+          </a:prstGeom>
+          <a:noFill/>
+          <a:ln>
+            <a:noFill/>
+          </a:ln>
+          <a:extLst>
+            <a:ext uri="{909E8E84-426E-40DD-AFC4-6F175D3DCCD1}">
+              <a14:hiddenFill xmlns:a14="http://schemas.microsoft.com/office/drawing/2010/main">
+                <a:solidFill>
+                  <a:srgbClr val="FFFFFF"/>
+                </a:solidFill>
+              </a14:hiddenFill>
+            </a:ext>
+            <a:ext uri="{91240B29-F687-4F45-9708-019B960494DF}">
+              <a14:hiddenLine xmlns:a14="http://schemas.microsoft.com/office/drawing/2010/main" w="9525">
+                <a:solidFill>
+                  <a:srgbClr val="000000"/>
+                </a:solidFill>
+                <a:miter lim="800000"/>
+                <a:headEnd/>
+                <a:tailEnd/>
+              </a14:hiddenLine>
+            </a:ext>
+          </a:extLst>
+        </p:spPr>
+        <p:txBody>
+          <a:bodyPr vert="horz" wrap="square" lIns="91440" tIns="45720" rIns="91440" bIns="45720" numCol="1" anchor="t" anchorCtr="0" compatLnSpc="1">
+            <a:prstTxWarp prst="textNoShape">
+              <a:avLst/>
+            </a:prstTxWarp>
+          </a:bodyPr>
+          <a:lstStyle>
+            <a:lvl1pPr marL="342900" indent="-342900" algn="just" rtl="0" eaLnBrk="0" fontAlgn="base" hangingPunct="0">
+              <a:spcBef>
+                <a:spcPct val="20000"/>
+              </a:spcBef>
+              <a:spcAft>
+                <a:spcPct val="0"/>
+              </a:spcAft>
+              <a:buFont typeface="Wingdings" pitchFamily="2" charset="2"/>
+              <a:buChar char="Ø"/>
+              <a:defRPr sz="3000">
+                <a:solidFill>
+                  <a:schemeClr val="tx1"/>
+                </a:solidFill>
+                <a:latin typeface="+mn-lt"/>
+                <a:ea typeface="+mn-ea"/>
+                <a:cs typeface="+mn-cs"/>
+              </a:defRPr>
+            </a:lvl1pPr>
+            <a:lvl2pPr marL="742950" indent="-285750" algn="just" rtl="0" eaLnBrk="0" fontAlgn="base" hangingPunct="0">
+              <a:spcBef>
+                <a:spcPct val="20000"/>
+              </a:spcBef>
+              <a:spcAft>
+                <a:spcPct val="0"/>
+              </a:spcAft>
+              <a:buFont typeface="Arial" pitchFamily="34" charset="0"/>
+              <a:buChar char="•"/>
+              <a:defRPr sz="2400">
+                <a:solidFill>
+                  <a:schemeClr val="tx1"/>
+                </a:solidFill>
+                <a:latin typeface="+mn-lt"/>
+              </a:defRPr>
+            </a:lvl2pPr>
+            <a:lvl3pPr marL="1143000" indent="-228600" algn="just" rtl="0" eaLnBrk="0" fontAlgn="base" hangingPunct="0">
+              <a:spcBef>
+                <a:spcPct val="20000"/>
+              </a:spcBef>
+              <a:spcAft>
+                <a:spcPct val="0"/>
+              </a:spcAft>
+              <a:buFont typeface="Wingdings" pitchFamily="2" charset="2"/>
+              <a:buChar char="§"/>
+              <a:defRPr sz="2000">
+                <a:solidFill>
+                  <a:schemeClr val="tx1"/>
+                </a:solidFill>
+                <a:latin typeface="+mn-lt"/>
+              </a:defRPr>
+            </a:lvl3pPr>
+            <a:lvl4pPr marL="1600200" indent="-228600" algn="just" rtl="0" eaLnBrk="0" fontAlgn="base" hangingPunct="0">
+              <a:spcBef>
+                <a:spcPct val="20000"/>
+              </a:spcBef>
+              <a:spcAft>
+                <a:spcPct val="0"/>
+              </a:spcAft>
+              <a:buFont typeface="Courier New" pitchFamily="49" charset="0"/>
+              <a:buChar char="o"/>
+              <a:defRPr sz="1800">
+                <a:solidFill>
+                  <a:schemeClr val="tx1"/>
+                </a:solidFill>
+                <a:latin typeface="+mn-lt"/>
+              </a:defRPr>
+            </a:lvl4pPr>
+            <a:lvl5pPr marL="2057400" indent="-228600" algn="just" rtl="0" eaLnBrk="0" fontAlgn="base" hangingPunct="0">
+              <a:spcBef>
+                <a:spcPct val="20000"/>
+              </a:spcBef>
+              <a:spcAft>
+                <a:spcPct val="0"/>
+              </a:spcAft>
+              <a:buChar char="»"/>
+              <a:defRPr sz="1600">
+                <a:solidFill>
+                  <a:schemeClr val="tx1"/>
+                </a:solidFill>
+                <a:latin typeface="+mn-lt"/>
+              </a:defRPr>
+            </a:lvl5pPr>
+            <a:lvl6pPr marL="2514600" indent="-228600" algn="l" rtl="0" fontAlgn="base">
+              <a:spcBef>
+                <a:spcPct val="20000"/>
+              </a:spcBef>
+              <a:spcAft>
+                <a:spcPct val="0"/>
+              </a:spcAft>
+              <a:buChar char="»"/>
+              <a:defRPr sz="2000">
+                <a:solidFill>
+                  <a:schemeClr val="tx1"/>
+                </a:solidFill>
+                <a:latin typeface="+mn-lt"/>
+              </a:defRPr>
+            </a:lvl6pPr>
+            <a:lvl7pPr marL="2971800" indent="-228600" algn="l" rtl="0" fontAlgn="base">
+              <a:spcBef>
+                <a:spcPct val="20000"/>
+              </a:spcBef>
+              <a:spcAft>
+                <a:spcPct val="0"/>
+              </a:spcAft>
+              <a:buChar char="»"/>
+              <a:defRPr sz="2000">
+                <a:solidFill>
+                  <a:schemeClr val="tx1"/>
+                </a:solidFill>
+                <a:latin typeface="+mn-lt"/>
+              </a:defRPr>
+            </a:lvl7pPr>
+            <a:lvl8pPr marL="3429000" indent="-228600" algn="l" rtl="0" fontAlgn="base">
+              <a:spcBef>
+                <a:spcPct val="20000"/>
+              </a:spcBef>
+              <a:spcAft>
+                <a:spcPct val="0"/>
+              </a:spcAft>
+              <a:buChar char="»"/>
+              <a:defRPr sz="2000">
+                <a:solidFill>
+                  <a:schemeClr val="tx1"/>
+                </a:solidFill>
+                <a:latin typeface="+mn-lt"/>
+              </a:defRPr>
+            </a:lvl8pPr>
+            <a:lvl9pPr marL="3886200" indent="-228600" algn="l" rtl="0" fontAlgn="base">
+              <a:spcBef>
+                <a:spcPct val="20000"/>
+              </a:spcBef>
+              <a:spcAft>
+                <a:spcPct val="0"/>
+              </a:spcAft>
+              <a:buChar char="»"/>
+              <a:defRPr sz="2000">
+                <a:solidFill>
+                  <a:schemeClr val="tx1"/>
+                </a:solidFill>
+                <a:latin typeface="+mn-lt"/>
+              </a:defRPr>
+            </a:lvl9pPr>
+          </a:lstStyle>
+          <a:p>
+            <a:pPr algn="l"/>
+            <a:r>
+              <a:rPr lang="pt-BR" kern="0" dirty="0" err="1" smtClean="0"/>
+              <a:t>Git</a:t>
+            </a:r>
+            <a:r>
+              <a:rPr lang="pt-BR" kern="0" dirty="0" smtClean="0"/>
+              <a:t> (repositório e controle de versão)</a:t>
+            </a:r>
+            <a:endParaRPr lang="pt-BR" kern="0" dirty="0"/>
+          </a:p>
+        </p:txBody>
+      </p:sp>
+      <p:pic>
+        <p:nvPicPr>
+          <p:cNvPr id="6" name="Picture 5"/>
+          <p:cNvPicPr>
+            <a:picLocks noChangeAspect="1"/>
+          </p:cNvPicPr>
+          <p:nvPr/>
+        </p:nvPicPr>
+        <p:blipFill>
+          <a:blip r:embed="rId3">
+            <a:extLst>
+              <a:ext uri="{28A0092B-C50C-407E-A947-70E740481C1C}">
+                <a14:useLocalDpi xmlns:a14="http://schemas.microsoft.com/office/drawing/2010/main" val="0"/>
+              </a:ext>
+            </a:extLst>
+          </a:blip>
+          <a:stretch>
+            <a:fillRect/>
+          </a:stretch>
+        </p:blipFill>
+        <p:spPr>
+          <a:xfrm>
+            <a:off x="5401072" y="2889740"/>
+            <a:ext cx="2304256" cy="2304256"/>
+          </a:xfrm>
+          <a:prstGeom prst="rect">
+            <a:avLst/>
+          </a:prstGeom>
+        </p:spPr>
+      </p:pic>
+    </p:spTree>
+    <p:extLst>
+      <p:ext uri="{BB962C8B-B14F-4D97-AF65-F5344CB8AC3E}">
+        <p14:creationId xmlns:p14="http://schemas.microsoft.com/office/powerpoint/2010/main" val="2482608355"/>
+      </p:ext>
+    </p:extLst>
+  </p:cSld>
+  <p:clrMapOvr>
+    <a:masterClrMapping/>
+  </p:clrMapOvr>
+  <p:transition>
+    <p:fade/>
+  </p:transition>
+  <p:timing>
+    <p:tnLst>
+      <p:par>
+        <p:cTn id="1" dur="indefinite" restart="never" nodeType="tmRoot">
+          <p:childTnLst>
+            <p:seq concurrent="1" nextAc="seek">
+              <p:cTn id="2" dur="indefinite" nodeType="mainSeq">
+                <p:childTnLst>
+                  <p:par>
+                    <p:cTn id="3" fill="hold">
+                      <p:stCondLst>
+                        <p:cond delay="indefinite"/>
+                      </p:stCondLst>
+                      <p:childTnLst>
+                        <p:par>
+                          <p:cTn id="4" fill="hold">
+                            <p:stCondLst>
+                              <p:cond delay="0"/>
+                            </p:stCondLst>
+                            <p:childTnLst>
+                              <p:par>
+                                <p:cTn id="5" presetID="10" presetClass="entr" presetSubtype="0" fill="hold" nodeType="clickEffect">
+                                  <p:stCondLst>
+                                    <p:cond delay="0"/>
+                                  </p:stCondLst>
+                                  <p:childTnLst>
+                                    <p:set>
+                                      <p:cBhvr>
+                                        <p:cTn id="6" dur="1" fill="hold">
+                                          <p:stCondLst>
+                                            <p:cond delay="0"/>
+                                          </p:stCondLst>
+                                        </p:cTn>
+                                        <p:tgtEl>
+                                          <p:spTgt spid="5"/>
+                                        </p:tgtEl>
+                                        <p:attrNameLst>
+                                          <p:attrName>style.visibility</p:attrName>
+                                        </p:attrNameLst>
+                                      </p:cBhvr>
+                                      <p:to>
+                                        <p:strVal val="visible"/>
+                                      </p:to>
+                                    </p:set>
+                                    <p:animEffect transition="in" filter="fade">
+                                      <p:cBhvr>
+                                        <p:cTn id="7" dur="500"/>
+                                        <p:tgtEl>
+                                          <p:spTgt spid="5"/>
+                                        </p:tgtEl>
+                                      </p:cBhvr>
+                                    </p:animEffect>
+                                  </p:childTnLst>
+                                </p:cTn>
+                              </p:par>
+                              <p:par>
+                                <p:cTn id="8" presetID="10" presetClass="entr" presetSubtype="0" fill="hold" grpId="0" nodeType="withEffect">
+                                  <p:stCondLst>
+                                    <p:cond delay="0"/>
+                                  </p:stCondLst>
+                                  <p:childTnLst>
+                                    <p:set>
+                                      <p:cBhvr>
+                                        <p:cTn id="9" dur="1" fill="hold">
+                                          <p:stCondLst>
+                                            <p:cond delay="0"/>
+                                          </p:stCondLst>
+                                        </p:cTn>
+                                        <p:tgtEl>
+                                          <p:spTgt spid="3">
+                                            <p:txEl>
+                                              <p:pRg st="0" end="0"/>
+                                            </p:txEl>
+                                          </p:spTgt>
+                                        </p:tgtEl>
+                                        <p:attrNameLst>
+                                          <p:attrName>style.visibility</p:attrName>
+                                        </p:attrNameLst>
+                                      </p:cBhvr>
+                                      <p:to>
+                                        <p:strVal val="visible"/>
+                                      </p:to>
+                                    </p:set>
+                                    <p:animEffect transition="in" filter="fade">
+                                      <p:cBhvr>
+                                        <p:cTn id="10" dur="500"/>
+                                        <p:tgtEl>
+                                          <p:spTgt spid="3">
+                                            <p:txEl>
+                                              <p:pRg st="0" end="0"/>
+                                            </p:txEl>
+                                          </p:spTgt>
+                                        </p:tgtEl>
+                                      </p:cBhvr>
+                                    </p:animEffect>
+                                  </p:childTnLst>
+                                </p:cTn>
+                              </p:par>
+                            </p:childTnLst>
+                          </p:cTn>
+                        </p:par>
+                      </p:childTnLst>
+                    </p:cTn>
+                  </p:par>
+                  <p:par>
+                    <p:cTn id="11" fill="hold">
+                      <p:stCondLst>
+                        <p:cond delay="indefinite"/>
+                      </p:stCondLst>
+                      <p:childTnLst>
+                        <p:par>
+                          <p:cTn id="12" fill="hold">
+                            <p:stCondLst>
+                              <p:cond delay="0"/>
+                            </p:stCondLst>
+                            <p:childTnLst>
+                              <p:par>
+                                <p:cTn id="13" presetID="10" presetClass="entr" presetSubtype="0" fill="hold" nodeType="clickEffect">
+                                  <p:stCondLst>
+                                    <p:cond delay="0"/>
+                                  </p:stCondLst>
+                                  <p:childTnLst>
+                                    <p:set>
+                                      <p:cBhvr>
+                                        <p:cTn id="14" dur="1" fill="hold">
+                                          <p:stCondLst>
+                                            <p:cond delay="0"/>
+                                          </p:stCondLst>
+                                        </p:cTn>
+                                        <p:tgtEl>
+                                          <p:spTgt spid="6"/>
+                                        </p:tgtEl>
+                                        <p:attrNameLst>
+                                          <p:attrName>style.visibility</p:attrName>
+                                        </p:attrNameLst>
+                                      </p:cBhvr>
+                                      <p:to>
+                                        <p:strVal val="visible"/>
+                                      </p:to>
+                                    </p:set>
+                                    <p:animEffect transition="in" filter="fade">
+                                      <p:cBhvr>
+                                        <p:cTn id="15" dur="500"/>
+                                        <p:tgtEl>
+                                          <p:spTgt spid="6"/>
+                                        </p:tgtEl>
+                                      </p:cBhvr>
+                                    </p:animEffect>
+                                  </p:childTnLst>
+                                </p:cTn>
+                              </p:par>
+                              <p:par>
+                                <p:cTn id="16" presetID="10" presetClass="entr" presetSubtype="0" fill="hold" grpId="0" nodeType="withEffect">
+                                  <p:stCondLst>
+                                    <p:cond delay="0"/>
+                                  </p:stCondLst>
+                                  <p:childTnLst>
+                                    <p:set>
+                                      <p:cBhvr>
+                                        <p:cTn id="17" dur="1" fill="hold">
+                                          <p:stCondLst>
+                                            <p:cond delay="0"/>
+                                          </p:stCondLst>
+                                        </p:cTn>
+                                        <p:tgtEl>
+                                          <p:spTgt spid="7"/>
+                                        </p:tgtEl>
+                                        <p:attrNameLst>
+                                          <p:attrName>style.visibility</p:attrName>
+                                        </p:attrNameLst>
+                                      </p:cBhvr>
+                                      <p:to>
+                                        <p:strVal val="visible"/>
+                                      </p:to>
+                                    </p:set>
+                                    <p:animEffect transition="in" filter="fade">
+                                      <p:cBhvr>
+                                        <p:cTn id="18" dur="500"/>
+                                        <p:tgtEl>
+                                          <p:spTgt spid="7"/>
+                                        </p:tgtEl>
+                                      </p:cBhvr>
+                                    </p:animEffect>
+                                  </p:childTnLst>
+                                </p:cTn>
+                              </p:par>
+                            </p:childTnLst>
+                          </p:cTn>
+                        </p:par>
+                      </p:childTnLst>
+                    </p:cTn>
+                  </p:par>
+                </p:childTnLst>
+              </p:cTn>
+              <p:prevCondLst>
+                <p:cond evt="onPrev" delay="0">
+                  <p:tgtEl>
+                    <p:sldTgt/>
+                  </p:tgtEl>
+                </p:cond>
+              </p:prevCondLst>
+              <p:nextCondLst>
+                <p:cond evt="onNext" delay="0">
+                  <p:tgtEl>
+                    <p:sldTgt/>
+                  </p:tgtEl>
+                </p:cond>
+              </p:nextCondLst>
+            </p:seq>
+          </p:childTnLst>
+        </p:cTn>
+      </p:par>
+    </p:tnLst>
+    <p:bldLst>
+      <p:bldP spid="3" grpId="0" build="p"/>
+      <p:bldP spid="7" grpId="0"/>
+    </p:bldLst>
+  </p:timing>
+</p:sld>
+</file>
+
+<file path=ppt/slides/slide29.xml><?xml version="1.0" encoding="utf-8"?>
+<p:sld xmlns:a="http://schemas.openxmlformats.org/drawingml/2006/main" xmlns:r="http://schemas.openxmlformats.org/officeDocument/2006/relationships" xmlns:p="http://schemas.openxmlformats.org/presentationml/2006/main">
+  <p:cSld>
+    <p:spTree>
+      <p:nvGrpSpPr>
+        <p:cNvPr id="1" name=""/>
+        <p:cNvGrpSpPr/>
+        <p:nvPr/>
+      </p:nvGrpSpPr>
+      <p:grpSpPr>
+        <a:xfrm>
+          <a:off x="0" y="0"/>
+          <a:ext cx="0" cy="0"/>
+          <a:chOff x="0" y="0"/>
+          <a:chExt cx="0" cy="0"/>
+        </a:xfrm>
+      </p:grpSpPr>
+      <p:sp>
+        <p:nvSpPr>
+          <p:cNvPr id="2" name="Título 1"/>
+          <p:cNvSpPr>
+            <a:spLocks noGrp="1"/>
+          </p:cNvSpPr>
+          <p:nvPr>
+            <p:ph type="title"/>
+          </p:nvPr>
+        </p:nvSpPr>
+        <p:spPr>
+          <a:xfrm>
+            <a:off x="2483768" y="274638"/>
+            <a:ext cx="5328592" cy="1143000"/>
+          </a:xfrm>
+        </p:spPr>
+        <p:txBody>
+          <a:bodyPr/>
+          <a:lstStyle/>
+          <a:p>
+            <a:pPr algn="ctr"/>
+            <a:r>
+              <a:rPr lang="pt-BR" dirty="0" smtClean="0"/>
+              <a:t>Conclusão</a:t>
+            </a:r>
+            <a:endParaRPr lang="pt-BR" dirty="0"/>
+          </a:p>
+        </p:txBody>
+      </p:sp>
+      <p:sp>
+        <p:nvSpPr>
+          <p:cNvPr id="3" name="Espaço Reservado para Conteúdo 2"/>
+          <p:cNvSpPr>
+            <a:spLocks noGrp="1"/>
+          </p:cNvSpPr>
+          <p:nvPr>
+            <p:ph idx="1"/>
+          </p:nvPr>
+        </p:nvSpPr>
+        <p:spPr/>
+        <p:txBody>
+          <a:bodyPr/>
+          <a:lstStyle/>
+          <a:p>
+            <a:r>
+              <a:rPr lang="pt-BR" dirty="0" smtClean="0"/>
+              <a:t>O desenvolvimento </a:t>
+            </a:r>
+            <a:r>
+              <a:rPr lang="pt-BR" dirty="0" err="1" smtClean="0"/>
+              <a:t>multiplataforma</a:t>
+            </a:r>
+            <a:r>
+              <a:rPr lang="pt-BR" dirty="0" smtClean="0"/>
+              <a:t> utilizando Qt é viável.</a:t>
+            </a:r>
+          </a:p>
+          <a:p>
+            <a:r>
+              <a:rPr lang="pt-BR" dirty="0" err="1" smtClean="0"/>
+              <a:t>Refatoração</a:t>
+            </a:r>
+            <a:r>
+              <a:rPr lang="pt-BR" dirty="0" smtClean="0"/>
+              <a:t> próxima </a:t>
+            </a:r>
+            <a:r>
+              <a:rPr lang="pt-BR" smtClean="0"/>
+              <a:t>de zero.</a:t>
+            </a:r>
+            <a:endParaRPr lang="pt-BR" dirty="0"/>
+          </a:p>
+        </p:txBody>
+      </p:sp>
+      <p:sp>
+        <p:nvSpPr>
+          <p:cNvPr id="4" name="Espaço Reservado para Número de Slide 3"/>
+          <p:cNvSpPr>
+            <a:spLocks noGrp="1"/>
+          </p:cNvSpPr>
+          <p:nvPr>
+            <p:ph type="sldNum" sz="quarter" idx="12"/>
+          </p:nvPr>
+        </p:nvSpPr>
+        <p:spPr/>
+        <p:txBody>
+          <a:bodyPr/>
+          <a:lstStyle/>
+          <a:p>
+            <a:fld id="{75B5FC9A-82D6-4ABF-82CF-F56A69AA85D0}" type="slidenum">
+              <a:rPr lang="pt-BR" smtClean="0"/>
+              <a:pPr/>
+              <a:t>29</a:t>
+            </a:fld>
+            <a:endParaRPr lang="pt-BR"/>
+          </a:p>
+        </p:txBody>
+      </p:sp>
+    </p:spTree>
+    <p:extLst>
+      <p:ext uri="{BB962C8B-B14F-4D97-AF65-F5344CB8AC3E}">
+        <p14:creationId xmlns:p14="http://schemas.microsoft.com/office/powerpoint/2010/main" val="1724550400"/>
       </p:ext>
     </p:extLst>
   </p:cSld>
@@ -7426,11 +9257,17 @@
             <p:ph type="title"/>
           </p:nvPr>
         </p:nvSpPr>
-        <p:spPr/>
+        <p:spPr>
+          <a:xfrm>
+            <a:off x="2483768" y="274638"/>
+            <a:ext cx="5330670" cy="1143000"/>
+          </a:xfrm>
+        </p:spPr>
         <p:txBody>
           <a:bodyPr/>
           <a:lstStyle/>
           <a:p>
+            <a:pPr algn="ctr"/>
             <a:r>
               <a:rPr lang="pt-BR" dirty="0" smtClean="0"/>
               <a:t>Introdução</a:t>
@@ -7466,30 +9303,6 @@
               <a:rPr lang="pt-BR" dirty="0" smtClean="0"/>
               <a:t>Cenário atual:</a:t>
             </a:r>
-          </a:p>
-          <a:p>
-            <a:pPr marL="0" indent="0">
-              <a:buNone/>
-            </a:pPr>
-            <a:endParaRPr lang="pt-BR" dirty="0" smtClean="0"/>
-          </a:p>
-          <a:p>
-            <a:pPr marL="0" indent="0">
-              <a:buNone/>
-            </a:pPr>
-            <a:r>
-              <a:rPr lang="pt-BR" dirty="0" smtClean="0"/>
-              <a:t>&lt;Fotos com </a:t>
-            </a:r>
-            <a:r>
-              <a:rPr lang="pt-BR" dirty="0" err="1" smtClean="0"/>
-              <a:t>S.Os</a:t>
-            </a:r>
-            <a:r>
-              <a:rPr lang="pt-BR" dirty="0" smtClean="0"/>
-              <a:t> e respectivos nomes&gt;</a:t>
-            </a:r>
-            <a:endParaRPr lang="pt-BR" dirty="0"/>
           </a:p>
         </p:txBody>
       </p:sp>
@@ -7517,10 +9330,429 @@
           </a:p>
         </p:txBody>
       </p:sp>
+      <p:pic>
+        <p:nvPicPr>
+          <p:cNvPr id="4" name="Picture 3"/>
+          <p:cNvPicPr>
+            <a:picLocks noChangeAspect="1"/>
+          </p:cNvPicPr>
+          <p:nvPr/>
+        </p:nvPicPr>
+        <p:blipFill>
+          <a:blip r:embed="rId2"/>
+          <a:stretch>
+            <a:fillRect/>
+          </a:stretch>
+        </p:blipFill>
+        <p:spPr>
+          <a:xfrm>
+            <a:off x="1329561" y="2261245"/>
+            <a:ext cx="6484877" cy="3802996"/>
+          </a:xfrm>
+          <a:prstGeom prst="rect">
+            <a:avLst/>
+          </a:prstGeom>
+        </p:spPr>
+      </p:pic>
     </p:spTree>
     <p:extLst>
       <p:ext uri="{BB962C8B-B14F-4D97-AF65-F5344CB8AC3E}">
         <p14:creationId xmlns:p14="http://schemas.microsoft.com/office/powerpoint/2010/main" val="4246874667"/>
+      </p:ext>
+    </p:extLst>
+  </p:cSld>
+  <p:clrMapOvr>
+    <a:masterClrMapping/>
+  </p:clrMapOvr>
+  <p:transition>
+    <p:fade/>
+  </p:transition>
+  <p:timing>
+    <p:tnLst>
+      <p:par>
+        <p:cTn id="1" dur="indefinite" restart="never" nodeType="tmRoot"/>
+      </p:par>
+    </p:tnLst>
+  </p:timing>
+</p:sld>
+</file>
+
+<file path=ppt/slides/slide30.xml><?xml version="1.0" encoding="utf-8"?>
+<p:sld xmlns:a="http://schemas.openxmlformats.org/drawingml/2006/main" xmlns:r="http://schemas.openxmlformats.org/officeDocument/2006/relationships" xmlns:p="http://schemas.openxmlformats.org/presentationml/2006/main">
+  <p:cSld>
+    <p:spTree>
+      <p:nvGrpSpPr>
+        <p:cNvPr id="1" name=""/>
+        <p:cNvGrpSpPr/>
+        <p:nvPr/>
+      </p:nvGrpSpPr>
+      <p:grpSpPr>
+        <a:xfrm>
+          <a:off x="0" y="0"/>
+          <a:ext cx="0" cy="0"/>
+          <a:chOff x="0" y="0"/>
+          <a:chExt cx="0" cy="0"/>
+        </a:xfrm>
+      </p:grpSpPr>
+      <p:sp>
+        <p:nvSpPr>
+          <p:cNvPr id="2" name="Title 1"/>
+          <p:cNvSpPr>
+            <a:spLocks noGrp="1"/>
+          </p:cNvSpPr>
+          <p:nvPr>
+            <p:ph type="title"/>
+          </p:nvPr>
+        </p:nvSpPr>
+        <p:spPr>
+          <a:xfrm>
+            <a:off x="2483768" y="274638"/>
+            <a:ext cx="5328592" cy="1143000"/>
+          </a:xfrm>
+        </p:spPr>
+        <p:txBody>
+          <a:bodyPr/>
+          <a:lstStyle/>
+          <a:p>
+            <a:pPr algn="ctr"/>
+            <a:r>
+              <a:rPr lang="pt-BR" dirty="0" smtClean="0"/>
+              <a:t>Trabalhos Futuros</a:t>
+            </a:r>
+            <a:endParaRPr lang="pt-BR" dirty="0"/>
+          </a:p>
+        </p:txBody>
+      </p:sp>
+      <p:sp>
+        <p:nvSpPr>
+          <p:cNvPr id="3" name="Content Placeholder 2"/>
+          <p:cNvSpPr>
+            <a:spLocks noGrp="1"/>
+          </p:cNvSpPr>
+          <p:nvPr>
+            <p:ph idx="1"/>
+          </p:nvPr>
+        </p:nvSpPr>
+        <p:spPr/>
+        <p:txBody>
+          <a:bodyPr/>
+          <a:lstStyle/>
+          <a:p>
+            <a:r>
+              <a:rPr lang="pt-BR" dirty="0" smtClean="0"/>
+              <a:t>Interfaces com QML</a:t>
+            </a:r>
+          </a:p>
+          <a:p>
+            <a:endParaRPr lang="pt-BR" dirty="0" smtClean="0"/>
+          </a:p>
+          <a:p>
+            <a:r>
+              <a:rPr lang="pt-BR" dirty="0" smtClean="0"/>
+              <a:t>Conversas em grupo</a:t>
+            </a:r>
+          </a:p>
+          <a:p>
+            <a:endParaRPr lang="pt-BR" dirty="0" smtClean="0"/>
+          </a:p>
+          <a:p>
+            <a:r>
+              <a:rPr lang="pt-BR" dirty="0" smtClean="0"/>
+              <a:t>Envio de mídias</a:t>
+            </a:r>
+            <a:endParaRPr lang="pt-BR" dirty="0"/>
+          </a:p>
+        </p:txBody>
+      </p:sp>
+      <p:sp>
+        <p:nvSpPr>
+          <p:cNvPr id="4" name="Slide Number Placeholder 3"/>
+          <p:cNvSpPr>
+            <a:spLocks noGrp="1"/>
+          </p:cNvSpPr>
+          <p:nvPr>
+            <p:ph type="sldNum" sz="quarter" idx="12"/>
+          </p:nvPr>
+        </p:nvSpPr>
+        <p:spPr/>
+        <p:txBody>
+          <a:bodyPr/>
+          <a:lstStyle/>
+          <a:p>
+            <a:fld id="{75B5FC9A-82D6-4ABF-82CF-F56A69AA85D0}" type="slidenum">
+              <a:rPr lang="pt-BR" smtClean="0"/>
+              <a:pPr/>
+              <a:t>30</a:t>
+            </a:fld>
+            <a:endParaRPr lang="pt-BR"/>
+          </a:p>
+        </p:txBody>
+      </p:sp>
+    </p:spTree>
+    <p:extLst>
+      <p:ext uri="{BB962C8B-B14F-4D97-AF65-F5344CB8AC3E}">
+        <p14:creationId xmlns:p14="http://schemas.microsoft.com/office/powerpoint/2010/main" val="2912610197"/>
+      </p:ext>
+    </p:extLst>
+  </p:cSld>
+  <p:clrMapOvr>
+    <a:masterClrMapping/>
+  </p:clrMapOvr>
+  <p:transition>
+    <p:fade/>
+  </p:transition>
+  <p:timing>
+    <p:tnLst>
+      <p:par>
+        <p:cTn id="1" dur="indefinite" restart="never" nodeType="tmRoot"/>
+      </p:par>
+    </p:tnLst>
+  </p:timing>
+</p:sld>
+</file>
+
+<file path=ppt/slides/slide31.xml><?xml version="1.0" encoding="utf-8"?>
+<p:sld xmlns:a="http://schemas.openxmlformats.org/drawingml/2006/main" xmlns:r="http://schemas.openxmlformats.org/officeDocument/2006/relationships" xmlns:p="http://schemas.openxmlformats.org/presentationml/2006/main">
+  <p:cSld>
+    <p:spTree>
+      <p:nvGrpSpPr>
+        <p:cNvPr id="1" name=""/>
+        <p:cNvGrpSpPr/>
+        <p:nvPr/>
+      </p:nvGrpSpPr>
+      <p:grpSpPr>
+        <a:xfrm>
+          <a:off x="0" y="0"/>
+          <a:ext cx="0" cy="0"/>
+          <a:chOff x="0" y="0"/>
+          <a:chExt cx="0" cy="0"/>
+        </a:xfrm>
+      </p:grpSpPr>
+      <p:sp>
+        <p:nvSpPr>
+          <p:cNvPr id="2" name="Título 1"/>
+          <p:cNvSpPr>
+            <a:spLocks noGrp="1"/>
+          </p:cNvSpPr>
+          <p:nvPr>
+            <p:ph type="title"/>
+          </p:nvPr>
+        </p:nvSpPr>
+        <p:spPr>
+          <a:xfrm>
+            <a:off x="2483768" y="274638"/>
+            <a:ext cx="5328592" cy="1143000"/>
+          </a:xfrm>
+        </p:spPr>
+        <p:txBody>
+          <a:bodyPr/>
+          <a:lstStyle/>
+          <a:p>
+            <a:pPr algn="ctr"/>
+            <a:r>
+              <a:rPr lang="pt-BR" dirty="0" smtClean="0"/>
+              <a:t>Agradecimentos</a:t>
+            </a:r>
+            <a:endParaRPr lang="pt-BR" dirty="0"/>
+          </a:p>
+        </p:txBody>
+      </p:sp>
+      <p:sp>
+        <p:nvSpPr>
+          <p:cNvPr id="3" name="Espaço Reservado para Conteúdo 2"/>
+          <p:cNvSpPr>
+            <a:spLocks noGrp="1"/>
+          </p:cNvSpPr>
+          <p:nvPr>
+            <p:ph idx="1"/>
+          </p:nvPr>
+        </p:nvSpPr>
+        <p:spPr/>
+        <p:txBody>
+          <a:bodyPr/>
+          <a:lstStyle/>
+          <a:p>
+            <a:r>
+              <a:rPr lang="pt-BR" dirty="0"/>
+              <a:t>Fundação Salvador </a:t>
+            </a:r>
+            <a:r>
+              <a:rPr lang="pt-BR" dirty="0" smtClean="0"/>
+              <a:t>Arena</a:t>
+            </a:r>
+          </a:p>
+          <a:p>
+            <a:r>
+              <a:rPr lang="pt-BR" dirty="0" smtClean="0"/>
+              <a:t>Membros da Banca</a:t>
+            </a:r>
+          </a:p>
+          <a:p>
+            <a:r>
+              <a:rPr lang="pt-BR" dirty="0" smtClean="0"/>
+              <a:t>Familiares</a:t>
+            </a:r>
+          </a:p>
+          <a:p>
+            <a:r>
+              <a:rPr lang="pt-BR" dirty="0" smtClean="0"/>
+              <a:t>Amigos</a:t>
+            </a:r>
+          </a:p>
+        </p:txBody>
+      </p:sp>
+      <p:sp>
+        <p:nvSpPr>
+          <p:cNvPr id="4" name="Espaço Reservado para Número de Slide 3"/>
+          <p:cNvSpPr>
+            <a:spLocks noGrp="1"/>
+          </p:cNvSpPr>
+          <p:nvPr>
+            <p:ph type="sldNum" sz="quarter" idx="12"/>
+          </p:nvPr>
+        </p:nvSpPr>
+        <p:spPr/>
+        <p:txBody>
+          <a:bodyPr/>
+          <a:lstStyle/>
+          <a:p>
+            <a:fld id="{75B5FC9A-82D6-4ABF-82CF-F56A69AA85D0}" type="slidenum">
+              <a:rPr lang="pt-BR" smtClean="0"/>
+              <a:pPr/>
+              <a:t>31</a:t>
+            </a:fld>
+            <a:endParaRPr lang="pt-BR"/>
+          </a:p>
+        </p:txBody>
+      </p:sp>
+    </p:spTree>
+    <p:extLst>
+      <p:ext uri="{BB962C8B-B14F-4D97-AF65-F5344CB8AC3E}">
+        <p14:creationId xmlns:p14="http://schemas.microsoft.com/office/powerpoint/2010/main" val="3093954524"/>
+      </p:ext>
+    </p:extLst>
+  </p:cSld>
+  <p:clrMapOvr>
+    <a:masterClrMapping/>
+  </p:clrMapOvr>
+  <p:transition>
+    <p:fade/>
+  </p:transition>
+  <p:timing>
+    <p:tnLst>
+      <p:par>
+        <p:cTn id="1" dur="indefinite" restart="never" nodeType="tmRoot"/>
+      </p:par>
+    </p:tnLst>
+  </p:timing>
+</p:sld>
+</file>
+
+<file path=ppt/slides/slide32.xml><?xml version="1.0" encoding="utf-8"?>
+<p:sld xmlns:a="http://schemas.openxmlformats.org/drawingml/2006/main" xmlns:r="http://schemas.openxmlformats.org/officeDocument/2006/relationships" xmlns:p="http://schemas.openxmlformats.org/presentationml/2006/main">
+  <p:cSld>
+    <p:spTree>
+      <p:nvGrpSpPr>
+        <p:cNvPr id="1" name=""/>
+        <p:cNvGrpSpPr/>
+        <p:nvPr/>
+      </p:nvGrpSpPr>
+      <p:grpSpPr>
+        <a:xfrm>
+          <a:off x="0" y="0"/>
+          <a:ext cx="0" cy="0"/>
+          <a:chOff x="0" y="0"/>
+          <a:chExt cx="0" cy="0"/>
+        </a:xfrm>
+      </p:grpSpPr>
+      <p:sp>
+        <p:nvSpPr>
+          <p:cNvPr id="2" name="Title 1"/>
+          <p:cNvSpPr>
+            <a:spLocks noGrp="1"/>
+          </p:cNvSpPr>
+          <p:nvPr>
+            <p:ph type="title"/>
+          </p:nvPr>
+        </p:nvSpPr>
+        <p:spPr>
+          <a:xfrm>
+            <a:off x="2483768" y="274638"/>
+            <a:ext cx="5328592" cy="1143000"/>
+          </a:xfrm>
+        </p:spPr>
+        <p:txBody>
+          <a:bodyPr/>
+          <a:lstStyle/>
+          <a:p>
+            <a:pPr algn="ctr"/>
+            <a:r>
+              <a:rPr lang="pt-BR" dirty="0" smtClean="0"/>
+              <a:t>Bibliografia</a:t>
+            </a:r>
+            <a:endParaRPr lang="pt-BR" dirty="0"/>
+          </a:p>
+        </p:txBody>
+      </p:sp>
+      <p:sp>
+        <p:nvSpPr>
+          <p:cNvPr id="3" name="Content Placeholder 2"/>
+          <p:cNvSpPr>
+            <a:spLocks noGrp="1"/>
+          </p:cNvSpPr>
+          <p:nvPr>
+            <p:ph idx="1"/>
+          </p:nvPr>
+        </p:nvSpPr>
+        <p:spPr/>
+        <p:txBody>
+          <a:bodyPr/>
+          <a:lstStyle/>
+          <a:p>
+            <a:r>
+              <a:rPr lang="pt-BR" dirty="0" smtClean="0"/>
+              <a:t>DEITEL H., DEITEL P.; </a:t>
+            </a:r>
+            <a:r>
+              <a:rPr lang="pt-BR" i="1" dirty="0" smtClean="0"/>
+              <a:t>Java: Como Programar, </a:t>
+            </a:r>
+            <a:r>
+              <a:rPr lang="pt-BR" dirty="0" smtClean="0"/>
+              <a:t>Oitava Edição, 2009.</a:t>
+            </a:r>
+            <a:endParaRPr lang="pt-BR" dirty="0"/>
+          </a:p>
+        </p:txBody>
+      </p:sp>
+      <p:sp>
+        <p:nvSpPr>
+          <p:cNvPr id="4" name="Slide Number Placeholder 3"/>
+          <p:cNvSpPr>
+            <a:spLocks noGrp="1"/>
+          </p:cNvSpPr>
+          <p:nvPr>
+            <p:ph type="sldNum" sz="quarter" idx="12"/>
+          </p:nvPr>
+        </p:nvSpPr>
+        <p:spPr/>
+        <p:txBody>
+          <a:bodyPr/>
+          <a:lstStyle/>
+          <a:p>
+            <a:fld id="{75B5FC9A-82D6-4ABF-82CF-F56A69AA85D0}" type="slidenum">
+              <a:rPr lang="pt-BR" smtClean="0"/>
+              <a:pPr/>
+              <a:t>32</a:t>
+            </a:fld>
+            <a:endParaRPr lang="pt-BR"/>
+          </a:p>
+        </p:txBody>
+      </p:sp>
+    </p:spTree>
+    <p:extLst>
+      <p:ext uri="{BB962C8B-B14F-4D97-AF65-F5344CB8AC3E}">
+        <p14:creationId xmlns:p14="http://schemas.microsoft.com/office/powerpoint/2010/main" val="1265301607"/>
       </p:ext>
     </p:extLst>
   </p:cSld>
@@ -7567,11 +9799,17 @@
             <p:ph type="title"/>
           </p:nvPr>
         </p:nvSpPr>
-        <p:spPr/>
+        <p:spPr>
+          <a:xfrm>
+            <a:off x="2483768" y="274638"/>
+            <a:ext cx="5328592" cy="1143000"/>
+          </a:xfrm>
+        </p:spPr>
         <p:txBody>
           <a:bodyPr/>
           <a:lstStyle/>
           <a:p>
+            <a:pPr algn="ctr"/>
             <a:r>
               <a:rPr lang="pt-BR" dirty="0" smtClean="0"/>
               <a:t>Introdução</a:t>
@@ -7751,11 +9989,17 @@
             <p:ph type="title"/>
           </p:nvPr>
         </p:nvSpPr>
-        <p:spPr/>
+        <p:spPr>
+          <a:xfrm>
+            <a:off x="2483768" y="274638"/>
+            <a:ext cx="5328592" cy="1143000"/>
+          </a:xfrm>
+        </p:spPr>
         <p:txBody>
           <a:bodyPr/>
           <a:lstStyle/>
           <a:p>
+            <a:pPr algn="ctr"/>
             <a:r>
               <a:rPr lang="pt-BR" dirty="0" smtClean="0"/>
               <a:t>Introdução</a:t>
@@ -7891,11 +10135,17 @@
             <p:ph type="title"/>
           </p:nvPr>
         </p:nvSpPr>
-        <p:spPr/>
+        <p:spPr>
+          <a:xfrm>
+            <a:off x="2483768" y="274638"/>
+            <a:ext cx="5328592" cy="1143000"/>
+          </a:xfrm>
+        </p:spPr>
         <p:txBody>
           <a:bodyPr/>
           <a:lstStyle/>
           <a:p>
+            <a:pPr algn="ctr"/>
             <a:r>
               <a:rPr lang="pt-BR" dirty="0" smtClean="0"/>
               <a:t>Metodologia</a:t>
@@ -8023,11 +10273,17 @@
             <p:ph type="title"/>
           </p:nvPr>
         </p:nvSpPr>
-        <p:spPr/>
+        <p:spPr>
+          <a:xfrm>
+            <a:off x="2483768" y="274638"/>
+            <a:ext cx="5328592" cy="1143000"/>
+          </a:xfrm>
+        </p:spPr>
         <p:txBody>
           <a:bodyPr/>
           <a:lstStyle/>
           <a:p>
+            <a:pPr algn="ctr"/>
             <a:r>
               <a:rPr lang="pt-BR" dirty="0" smtClean="0"/>
               <a:t>Qt</a:t>
@@ -8191,11 +10447,17 @@
             <p:ph type="title"/>
           </p:nvPr>
         </p:nvSpPr>
-        <p:spPr/>
+        <p:spPr>
+          <a:xfrm>
+            <a:off x="2483768" y="274638"/>
+            <a:ext cx="5328592" cy="1143000"/>
+          </a:xfrm>
+        </p:spPr>
         <p:txBody>
           <a:bodyPr/>
           <a:lstStyle/>
           <a:p>
+            <a:pPr algn="ctr"/>
             <a:r>
               <a:rPr lang="pt-BR" dirty="0" smtClean="0"/>
               <a:t>Qt</a:t>
@@ -8467,53 +10729,82 @@
           </a:p>
           <a:p>
             <a:pPr algn="l"/>
+            <a:endParaRPr lang="pt-BR" kern="0" dirty="0" smtClean="0"/>
+          </a:p>
+          <a:p>
+            <a:pPr algn="l"/>
+            <a:endParaRPr lang="pt-BR" kern="0" dirty="0"/>
+          </a:p>
+          <a:p>
+            <a:pPr algn="l"/>
+            <a:endParaRPr lang="pt-BR" kern="0" dirty="0" smtClean="0"/>
+          </a:p>
+          <a:p>
+            <a:pPr algn="l"/>
+            <a:endParaRPr lang="pt-BR" kern="0" dirty="0"/>
+          </a:p>
+          <a:p>
+            <a:pPr algn="l"/>
+            <a:r>
+              <a:rPr lang="pt-BR" kern="0" dirty="0" smtClean="0"/>
+              <a:t>Qt </a:t>
+            </a:r>
+            <a:r>
+              <a:rPr lang="pt-BR" kern="0" dirty="0" err="1" smtClean="0"/>
+              <a:t>Quick</a:t>
+            </a:r>
+            <a:endParaRPr lang="pt-BR" kern="0" dirty="0" smtClean="0"/>
+          </a:p>
+          <a:p>
+            <a:pPr algn="l"/>
+            <a:endParaRPr lang="pt-BR" kern="0" dirty="0"/>
+          </a:p>
+          <a:p>
+            <a:pPr algn="l"/>
+            <a:endParaRPr lang="pt-BR" kern="0" dirty="0" smtClean="0"/>
+          </a:p>
+          <a:p>
+            <a:pPr algn="l"/>
             <a:r>
               <a:rPr lang="pt-BR" kern="0" dirty="0" smtClean="0"/>
               <a:t>&lt;exemplo&gt;</a:t>
             </a:r>
           </a:p>
-          <a:p>
-            <a:pPr algn="l"/>
-            <a:endParaRPr lang="pt-BR" kern="0" dirty="0"/>
-          </a:p>
-          <a:p>
-            <a:pPr algn="l"/>
-            <a:endParaRPr lang="pt-BR" kern="0" dirty="0" smtClean="0"/>
-          </a:p>
-          <a:p>
-            <a:pPr algn="l"/>
-            <a:endParaRPr lang="pt-BR" kern="0" dirty="0"/>
-          </a:p>
-          <a:p>
-            <a:pPr algn="l"/>
-            <a:r>
-              <a:rPr lang="pt-BR" kern="0" dirty="0" smtClean="0"/>
-              <a:t>Qt </a:t>
-            </a:r>
-            <a:r>
-              <a:rPr lang="pt-BR" kern="0" dirty="0" err="1" smtClean="0"/>
-              <a:t>Quick</a:t>
-            </a:r>
-            <a:endParaRPr lang="pt-BR" kern="0" dirty="0" smtClean="0"/>
-          </a:p>
-          <a:p>
-            <a:pPr algn="l"/>
-            <a:endParaRPr lang="pt-BR" kern="0" dirty="0"/>
-          </a:p>
-          <a:p>
-            <a:pPr algn="l"/>
-            <a:endParaRPr lang="pt-BR" kern="0" dirty="0" smtClean="0"/>
-          </a:p>
-          <a:p>
-            <a:pPr algn="l"/>
-            <a:r>
-              <a:rPr lang="pt-BR" kern="0" dirty="0" smtClean="0"/>
-              <a:t>&lt;exemplo&gt;</a:t>
-            </a:r>
-            <a:endParaRPr lang="pt-BR" kern="0" dirty="0" smtClean="0"/>
-          </a:p>
-        </p:txBody>
-      </p:sp>
+        </p:txBody>
+      </p:sp>
+      <p:pic>
+        <p:nvPicPr>
+          <p:cNvPr id="7" name="Picture 6"/>
+          <p:cNvPicPr/>
+          <p:nvPr/>
+        </p:nvPicPr>
+        <p:blipFill>
+          <a:blip r:embed="rId2">
+            <a:extLst>
+              <a:ext uri="{28A0092B-C50C-407E-A947-70E740481C1C}">
+                <a14:useLocalDpi xmlns:a14="http://schemas.microsoft.com/office/drawing/2010/main" val="0"/>
+              </a:ext>
+            </a:extLst>
+          </a:blip>
+          <a:srcRect/>
+          <a:stretch>
+            <a:fillRect/>
+          </a:stretch>
+        </p:blipFill>
+        <p:spPr bwMode="auto">
+          <a:xfrm>
+            <a:off x="484475" y="3604072"/>
+            <a:ext cx="3326695" cy="1337096"/>
+          </a:xfrm>
+          <a:prstGeom prst="rect">
+            <a:avLst/>
+          </a:prstGeom>
+          <a:noFill/>
+          <a:ln>
+            <a:noFill/>
+          </a:ln>
+        </p:spPr>
+      </p:pic>
     </p:spTree>
     <p:extLst>
       <p:ext uri="{BB962C8B-B14F-4D97-AF65-F5344CB8AC3E}">
@@ -8564,11 +10855,17 @@
             <p:ph type="title"/>
           </p:nvPr>
         </p:nvSpPr>
-        <p:spPr/>
+        <p:spPr>
+          <a:xfrm>
+            <a:off x="2483768" y="274638"/>
+            <a:ext cx="5328592" cy="1143000"/>
+          </a:xfrm>
+        </p:spPr>
         <p:txBody>
           <a:bodyPr/>
           <a:lstStyle/>
           <a:p>
+            <a:pPr algn="ctr"/>
             <a:r>
               <a:rPr lang="pt-BR" dirty="0" smtClean="0"/>
               <a:t>Alternativas ao Qt</a:t>
@@ -8662,59 +10959,107 @@
           </a:p>
         </p:txBody>
       </p:sp>
-      <p:sp>
-        <p:nvSpPr>
-          <p:cNvPr id="5" name="TextBox 4"/>
-          <p:cNvSpPr txBox="1"/>
+      <p:pic>
+        <p:nvPicPr>
+          <p:cNvPr id="1026" name="Picture 2" descr="http://www.codejobs.biz/www/lib/files/images/ce4b545d5b01a4e.png"/>
+          <p:cNvPicPr>
+            <a:picLocks noChangeAspect="1" noChangeArrowheads="1"/>
+          </p:cNvPicPr>
           <p:nvPr/>
-        </p:nvSpPr>
-        <p:spPr>
+        </p:nvPicPr>
+        <p:blipFill>
+          <a:blip r:embed="rId2" cstate="print">
+            <a:extLst>
+              <a:ext uri="{28A0092B-C50C-407E-A947-70E740481C1C}">
+                <a14:useLocalDpi xmlns:a14="http://schemas.microsoft.com/office/drawing/2010/main" val="0"/>
+              </a:ext>
+            </a:extLst>
+          </a:blip>
+          <a:srcRect/>
+          <a:stretch>
+            <a:fillRect/>
+          </a:stretch>
+        </p:blipFill>
+        <p:spPr bwMode="auto">
           <a:xfrm>
-            <a:off x="5086400" y="3540840"/>
-            <a:ext cx="3600400" cy="2585323"/>
+            <a:off x="5162029" y="4581129"/>
+            <a:ext cx="1570211" cy="1403769"/>
           </a:xfrm>
           <a:prstGeom prst="rect">
             <a:avLst/>
           </a:prstGeom>
           <a:noFill/>
-        </p:spPr>
-        <p:txBody>
-          <a:bodyPr wrap="square" rtlCol="0">
-            <a:spAutoFit/>
-          </a:bodyPr>
-          <a:lstStyle/>
-          <a:p>
-            <a:endParaRPr lang="pt-BR" dirty="0" smtClean="0"/>
-          </a:p>
-          <a:p>
-            <a:endParaRPr lang="pt-BR" dirty="0" smtClean="0"/>
-          </a:p>
-          <a:p>
-            <a:endParaRPr lang="pt-BR" dirty="0"/>
-          </a:p>
-          <a:p>
-            <a:endParaRPr lang="pt-BR" dirty="0"/>
-          </a:p>
-          <a:p>
-            <a:r>
-              <a:rPr lang="pt-BR" dirty="0" smtClean="0"/>
-              <a:t>&lt;fotos das alternativas ao Qt&gt;</a:t>
-            </a:r>
-          </a:p>
-          <a:p>
-            <a:endParaRPr lang="pt-BR" dirty="0"/>
-          </a:p>
-          <a:p>
-            <a:endParaRPr lang="pt-BR" dirty="0" smtClean="0"/>
-          </a:p>
-          <a:p>
-            <a:endParaRPr lang="pt-BR" dirty="0" smtClean="0"/>
-          </a:p>
-          <a:p>
-            <a:endParaRPr lang="pt-BR" dirty="0" smtClean="0"/>
-          </a:p>
-        </p:txBody>
-      </p:sp>
+          <a:extLst>
+            <a:ext uri="{909E8E84-426E-40DD-AFC4-6F175D3DCCD1}">
+              <a14:hiddenFill xmlns:a14="http://schemas.microsoft.com/office/drawing/2010/main">
+                <a:solidFill>
+                  <a:srgbClr val="FFFFFF"/>
+                </a:solidFill>
+              </a14:hiddenFill>
+            </a:ext>
+          </a:extLst>
+        </p:spPr>
+      </p:pic>
+      <p:pic>
+        <p:nvPicPr>
+          <p:cNvPr id="7" name="Picture 6"/>
+          <p:cNvPicPr>
+            <a:picLocks noChangeAspect="1"/>
+          </p:cNvPicPr>
+          <p:nvPr/>
+        </p:nvPicPr>
+        <p:blipFill>
+          <a:blip r:embed="rId3">
+            <a:extLst>
+              <a:ext uri="{28A0092B-C50C-407E-A947-70E740481C1C}">
+                <a14:useLocalDpi xmlns:a14="http://schemas.microsoft.com/office/drawing/2010/main" val="0"/>
+              </a:ext>
+            </a:extLst>
+          </a:blip>
+          <a:stretch>
+            <a:fillRect/>
+          </a:stretch>
+        </p:blipFill>
+        <p:spPr>
+          <a:xfrm>
+            <a:off x="7200679" y="4581128"/>
+            <a:ext cx="1403769" cy="1403769"/>
+          </a:xfrm>
+          <a:prstGeom prst="rect">
+            <a:avLst/>
+          </a:prstGeom>
+        </p:spPr>
+      </p:pic>
+      <p:pic>
+        <p:nvPicPr>
+          <p:cNvPr id="8" name="Picture 7"/>
+          <p:cNvPicPr>
+            <a:picLocks noChangeAspect="1"/>
+          </p:cNvPicPr>
+          <p:nvPr/>
+        </p:nvPicPr>
+        <p:blipFill>
+          <a:blip r:embed="rId4" cstate="print">
+            <a:extLst>
+              <a:ext uri="{28A0092B-C50C-407E-A947-70E740481C1C}">
+                <a14:useLocalDpi xmlns:a14="http://schemas.microsoft.com/office/drawing/2010/main" val="0"/>
+              </a:ext>
+            </a:extLst>
+          </a:blip>
+          <a:stretch>
+            <a:fillRect/>
+          </a:stretch>
+        </p:blipFill>
+        <p:spPr>
+          <a:xfrm>
+            <a:off x="7191611" y="2852936"/>
+            <a:ext cx="1421904" cy="1421904"/>
+          </a:xfrm>
+          <a:prstGeom prst="rect">
+            <a:avLst/>
+          </a:prstGeom>
+        </p:spPr>
+      </p:pic>
     </p:spTree>
     <p:extLst>
       <p:ext uri="{BB962C8B-B14F-4D97-AF65-F5344CB8AC3E}">

</xml_diff>

<commit_message>
02_12: Adicionada funcionalidade de receber mensagens pendentes (estado beta)
</commit_message>
<xml_diff>
--- a/documentos/Apresentação Banca.pptx
+++ b/documentos/Apresentação Banca.pptx
@@ -5,10 +5,10 @@
     <p:sldMasterId id="2147483649" r:id="rId1"/>
   </p:sldMasterIdLst>
   <p:notesMasterIdLst>
-    <p:notesMasterId r:id="rId35"/>
+    <p:notesMasterId r:id="rId39"/>
   </p:notesMasterIdLst>
   <p:handoutMasterIdLst>
-    <p:handoutMasterId r:id="rId36"/>
+    <p:handoutMasterId r:id="rId40"/>
   </p:handoutMasterIdLst>
   <p:sldIdLst>
     <p:sldId id="269" r:id="rId2"/>
@@ -16,34 +16,38 @@
     <p:sldId id="271" r:id="rId4"/>
     <p:sldId id="302" r:id="rId5"/>
     <p:sldId id="304" r:id="rId6"/>
-    <p:sldId id="272" r:id="rId7"/>
-    <p:sldId id="290" r:id="rId8"/>
-    <p:sldId id="273" r:id="rId9"/>
-    <p:sldId id="323" r:id="rId10"/>
-    <p:sldId id="289" r:id="rId11"/>
-    <p:sldId id="301" r:id="rId12"/>
-    <p:sldId id="307" r:id="rId13"/>
-    <p:sldId id="311" r:id="rId14"/>
-    <p:sldId id="308" r:id="rId15"/>
-    <p:sldId id="313" r:id="rId16"/>
-    <p:sldId id="305" r:id="rId17"/>
-    <p:sldId id="309" r:id="rId18"/>
-    <p:sldId id="314" r:id="rId19"/>
-    <p:sldId id="278" r:id="rId20"/>
-    <p:sldId id="280" r:id="rId21"/>
-    <p:sldId id="318" r:id="rId22"/>
-    <p:sldId id="316" r:id="rId23"/>
-    <p:sldId id="320" r:id="rId24"/>
-    <p:sldId id="319" r:id="rId25"/>
-    <p:sldId id="315" r:id="rId26"/>
-    <p:sldId id="321" r:id="rId27"/>
-    <p:sldId id="322" r:id="rId28"/>
-    <p:sldId id="279" r:id="rId29"/>
-    <p:sldId id="312" r:id="rId30"/>
-    <p:sldId id="284" r:id="rId31"/>
-    <p:sldId id="310" r:id="rId32"/>
-    <p:sldId id="286" r:id="rId33"/>
-    <p:sldId id="317" r:id="rId34"/>
+    <p:sldId id="327" r:id="rId7"/>
+    <p:sldId id="272" r:id="rId8"/>
+    <p:sldId id="290" r:id="rId9"/>
+    <p:sldId id="273" r:id="rId10"/>
+    <p:sldId id="323" r:id="rId11"/>
+    <p:sldId id="326" r:id="rId12"/>
+    <p:sldId id="289" r:id="rId13"/>
+    <p:sldId id="301" r:id="rId14"/>
+    <p:sldId id="307" r:id="rId15"/>
+    <p:sldId id="311" r:id="rId16"/>
+    <p:sldId id="308" r:id="rId17"/>
+    <p:sldId id="313" r:id="rId18"/>
+    <p:sldId id="305" r:id="rId19"/>
+    <p:sldId id="309" r:id="rId20"/>
+    <p:sldId id="314" r:id="rId21"/>
+    <p:sldId id="278" r:id="rId22"/>
+    <p:sldId id="280" r:id="rId23"/>
+    <p:sldId id="316" r:id="rId24"/>
+    <p:sldId id="320" r:id="rId25"/>
+    <p:sldId id="319" r:id="rId26"/>
+    <p:sldId id="315" r:id="rId27"/>
+    <p:sldId id="321" r:id="rId28"/>
+    <p:sldId id="322" r:id="rId29"/>
+    <p:sldId id="318" r:id="rId30"/>
+    <p:sldId id="324" r:id="rId31"/>
+    <p:sldId id="325" r:id="rId32"/>
+    <p:sldId id="279" r:id="rId33"/>
+    <p:sldId id="312" r:id="rId34"/>
+    <p:sldId id="284" r:id="rId35"/>
+    <p:sldId id="310" r:id="rId36"/>
+    <p:sldId id="286" r:id="rId37"/>
+    <p:sldId id="317" r:id="rId38"/>
   </p:sldIdLst>
   <p:sldSz cx="9144000" cy="6858000" type="screen4x3"/>
   <p:notesSz cx="6858000" cy="9144000"/>
@@ -303,7 +307,7 @@
               <a:pPr>
                 <a:defRPr/>
               </a:pPr>
-              <a:t>28/11/2014</a:t>
+              <a:t>01/12/2014</a:t>
             </a:fld>
             <a:endParaRPr lang="pt-BR"/>
           </a:p>
@@ -380,7 +384,7 @@
             <a:fld id="{6056FEC6-A726-453E-9966-3EB805A53A41}" type="slidenum">
               <a:rPr lang="pt-BR"/>
               <a:pPr/>
-              <a:t>‹nº›</a:t>
+              <a:t>‹#›</a:t>
             </a:fld>
             <a:endParaRPr lang="pt-BR"/>
           </a:p>
@@ -494,7 +498,7 @@
               <a:pPr>
                 <a:defRPr/>
               </a:pPr>
-              <a:t>28/11/2014</a:t>
+              <a:t>01/12/2014</a:t>
             </a:fld>
             <a:endParaRPr lang="pt-BR"/>
           </a:p>
@@ -667,7 +671,7 @@
             <a:fld id="{D79E4107-198F-4D08-9CF1-214B37DA899F}" type="slidenum">
               <a:rPr lang="pt-BR"/>
               <a:pPr/>
-              <a:t>‹nº›</a:t>
+              <a:t>‹#›</a:t>
             </a:fld>
             <a:endParaRPr lang="pt-BR"/>
           </a:p>
@@ -1135,15 +1139,7 @@
             </a:r>
             <a:r>
               <a:rPr lang="pt-BR" baseline="0" dirty="0" smtClean="0"/>
-              <a:t> permite a criação de interfaces nativas, que prometem </a:t>
-            </a:r>
-            <a:r>
-              <a:rPr lang="pt-BR" baseline="0" dirty="0" smtClean="0"/>
-              <a:t>ser mais intuitivas </a:t>
-            </a:r>
-            <a:r>
-              <a:rPr lang="pt-BR" baseline="0" dirty="0" smtClean="0"/>
-              <a:t>para o usuário e alto desempenho.</a:t>
+              <a:t> permite a criação de interfaces nativas, que prometem ser mais intuitivas para o usuário e alto desempenho.</a:t>
             </a:r>
             <a:endParaRPr lang="pt-BR" dirty="0"/>
           </a:p>
@@ -1167,7 +1163,7 @@
             <a:fld id="{D79E4107-198F-4D08-9CF1-214B37DA899F}" type="slidenum">
               <a:rPr lang="pt-BR" smtClean="0"/>
               <a:pPr/>
-              <a:t>11</a:t>
+              <a:t>13</a:t>
             </a:fld>
             <a:endParaRPr lang="pt-BR"/>
           </a:p>
@@ -1272,7 +1268,7 @@
             <a:fld id="{D79E4107-198F-4D08-9CF1-214B37DA899F}" type="slidenum">
               <a:rPr lang="pt-BR" smtClean="0"/>
               <a:pPr/>
-              <a:t>12</a:t>
+              <a:t>14</a:t>
             </a:fld>
             <a:endParaRPr lang="pt-BR"/>
           </a:p>
@@ -1372,7 +1368,7 @@
             <a:fld id="{D79E4107-198F-4D08-9CF1-214B37DA899F}" type="slidenum">
               <a:rPr lang="pt-BR" smtClean="0"/>
               <a:pPr/>
-              <a:t>13</a:t>
+              <a:t>15</a:t>
             </a:fld>
             <a:endParaRPr lang="pt-BR"/>
           </a:p>
@@ -1505,7 +1501,7 @@
             <a:fld id="{D79E4107-198F-4D08-9CF1-214B37DA899F}" type="slidenum">
               <a:rPr lang="pt-BR" smtClean="0"/>
               <a:pPr/>
-              <a:t>14</a:t>
+              <a:t>16</a:t>
             </a:fld>
             <a:endParaRPr lang="pt-BR"/>
           </a:p>
@@ -1606,7 +1602,7 @@
             <a:fld id="{D79E4107-198F-4D08-9CF1-214B37DA899F}" type="slidenum">
               <a:rPr lang="pt-BR" smtClean="0"/>
               <a:pPr/>
-              <a:t>15</a:t>
+              <a:t>17</a:t>
             </a:fld>
             <a:endParaRPr lang="pt-BR"/>
           </a:p>
@@ -1695,7 +1691,7 @@
             <a:fld id="{D79E4107-198F-4D08-9CF1-214B37DA899F}" type="slidenum">
               <a:rPr lang="pt-BR" smtClean="0"/>
               <a:pPr/>
-              <a:t>19</a:t>
+              <a:t>21</a:t>
             </a:fld>
             <a:endParaRPr lang="pt-BR"/>
           </a:p>
@@ -1788,7 +1784,7 @@
             <a:fld id="{D79E4107-198F-4D08-9CF1-214B37DA899F}" type="slidenum">
               <a:rPr lang="pt-BR" smtClean="0"/>
               <a:pPr/>
-              <a:t>20</a:t>
+              <a:t>22</a:t>
             </a:fld>
             <a:endParaRPr lang="pt-BR"/>
           </a:p>
@@ -1851,27 +1847,36 @@
           <a:bodyPr/>
           <a:lstStyle/>
           <a:p>
-            <a:r>
-              <a:rPr lang="pt-BR" dirty="0" smtClean="0"/>
-              <a:t>A partir do escopo original,</a:t>
-            </a:r>
+            <a:pPr marL="0" marR="0" indent="0" algn="l" defTabSz="914400" rtl="0" eaLnBrk="0" fontAlgn="base" latinLnBrk="0" hangingPunct="0">
+              <a:lnSpc>
+                <a:spcPct val="100000"/>
+              </a:lnSpc>
+              <a:spcBef>
+                <a:spcPct val="30000"/>
+              </a:spcBef>
+              <a:spcAft>
+                <a:spcPct val="0"/>
+              </a:spcAft>
+              <a:buClrTx/>
+              <a:buSzTx/>
+              <a:buFontTx/>
+              <a:buNone/>
+              <a:tabLst/>
+              <a:defRPr/>
+            </a:pPr>
             <a:r>
               <a:rPr lang="pt-BR" baseline="0" dirty="0" smtClean="0"/>
-              <a:t> houveram complicações que acabaram por limitar o que poderia ser implementado no protótipo.</a:t>
-            </a:r>
-          </a:p>
-          <a:p>
+              <a:t>O </a:t>
+            </a:r>
+            <a:r>
+              <a:rPr lang="pt-BR" baseline="0" dirty="0" err="1" smtClean="0"/>
+              <a:t>login</a:t>
+            </a:r>
             <a:r>
               <a:rPr lang="pt-BR" baseline="0" dirty="0" smtClean="0"/>
-              <a:t>Isso inclui a funcionalidade de conversas em grupo e o envio de mídias nas mensagens, sejam estas imagens, áudio ou vídeo.</a:t>
-            </a:r>
-          </a:p>
-          <a:p>
-            <a:r>
-              <a:rPr lang="pt-BR" baseline="0" dirty="0" smtClean="0"/>
-              <a:t>As funcionalidades implementadas foram:</a:t>
-            </a:r>
-            <a:endParaRPr lang="pt-BR" dirty="0"/>
+              <a:t> de usuários na aplicação-cliente</a:t>
+            </a:r>
+            <a:endParaRPr lang="pt-BR" dirty="0" smtClean="0"/>
           </a:p>
         </p:txBody>
       </p:sp>
@@ -1893,7 +1898,7 @@
             <a:fld id="{D79E4107-198F-4D08-9CF1-214B37DA899F}" type="slidenum">
               <a:rPr lang="pt-BR" smtClean="0"/>
               <a:pPr/>
-              <a:t>21</a:t>
+              <a:t>23</a:t>
             </a:fld>
             <a:endParaRPr lang="pt-BR"/>
           </a:p>
@@ -1902,7 +1907,7 @@
     </p:spTree>
     <p:extLst>
       <p:ext uri="{BB962C8B-B14F-4D97-AF65-F5344CB8AC3E}">
-        <p14:creationId xmlns:p14="http://schemas.microsoft.com/office/powerpoint/2010/main" val="1391540777"/>
+        <p14:creationId xmlns:p14="http://schemas.microsoft.com/office/powerpoint/2010/main" val="2745899995"/>
       </p:ext>
     </p:extLst>
   </p:cSld>
@@ -1975,15 +1980,7 @@
             </a:pPr>
             <a:r>
               <a:rPr lang="pt-BR" baseline="0" dirty="0" smtClean="0"/>
-              <a:t>O </a:t>
-            </a:r>
-            <a:r>
-              <a:rPr lang="pt-BR" baseline="0" dirty="0" err="1" smtClean="0"/>
-              <a:t>login</a:t>
-            </a:r>
-            <a:r>
-              <a:rPr lang="pt-BR" baseline="0" dirty="0" smtClean="0"/>
-              <a:t> de usuários na aplicação-cliente</a:t>
+              <a:t>O cadastro de novos usuários,</a:t>
             </a:r>
             <a:endParaRPr lang="pt-BR" dirty="0" smtClean="0"/>
           </a:p>
@@ -2007,7 +2004,7 @@
             <a:fld id="{D79E4107-198F-4D08-9CF1-214B37DA899F}" type="slidenum">
               <a:rPr lang="pt-BR" smtClean="0"/>
               <a:pPr/>
-              <a:t>22</a:t>
+              <a:t>24</a:t>
             </a:fld>
             <a:endParaRPr lang="pt-BR"/>
           </a:p>
@@ -2016,7 +2013,7 @@
     </p:spTree>
     <p:extLst>
       <p:ext uri="{BB962C8B-B14F-4D97-AF65-F5344CB8AC3E}">
-        <p14:creationId xmlns:p14="http://schemas.microsoft.com/office/powerpoint/2010/main" val="2745899995"/>
+        <p14:creationId xmlns:p14="http://schemas.microsoft.com/office/powerpoint/2010/main" val="1263866792"/>
       </p:ext>
     </p:extLst>
   </p:cSld>
@@ -2089,7 +2086,7 @@
             </a:pPr>
             <a:r>
               <a:rPr lang="pt-BR" baseline="0" dirty="0" smtClean="0"/>
-              <a:t>O cadastro de novos usuários,</a:t>
+              <a:t>Além da troca de mensagens de texto entre os clientes.</a:t>
             </a:r>
             <a:endParaRPr lang="pt-BR" dirty="0" smtClean="0"/>
           </a:p>
@@ -2113,7 +2110,7 @@
             <a:fld id="{D79E4107-198F-4D08-9CF1-214B37DA899F}" type="slidenum">
               <a:rPr lang="pt-BR" smtClean="0"/>
               <a:pPr/>
-              <a:t>23</a:t>
+              <a:t>25</a:t>
             </a:fld>
             <a:endParaRPr lang="pt-BR"/>
           </a:p>
@@ -2122,7 +2119,7 @@
     </p:spTree>
     <p:extLst>
       <p:ext uri="{BB962C8B-B14F-4D97-AF65-F5344CB8AC3E}">
-        <p14:creationId xmlns:p14="http://schemas.microsoft.com/office/powerpoint/2010/main" val="1263866792"/>
+        <p14:creationId xmlns:p14="http://schemas.microsoft.com/office/powerpoint/2010/main" val="886727717"/>
       </p:ext>
     </p:extLst>
   </p:cSld>
@@ -2261,28 +2258,21 @@
           <a:bodyPr/>
           <a:lstStyle/>
           <a:p>
-            <a:pPr marL="0" marR="0" indent="0" algn="l" defTabSz="914400" rtl="0" eaLnBrk="0" fontAlgn="base" latinLnBrk="0" hangingPunct="0">
-              <a:lnSpc>
-                <a:spcPct val="100000"/>
-              </a:lnSpc>
-              <a:spcBef>
-                <a:spcPct val="30000"/>
-              </a:spcBef>
-              <a:spcAft>
-                <a:spcPct val="0"/>
-              </a:spcAft>
-              <a:buClrTx/>
-              <a:buSzTx/>
-              <a:buFontTx/>
-              <a:buNone/>
-              <a:tabLst/>
-              <a:defRPr/>
-            </a:pPr>
+            <a:r>
+              <a:rPr lang="pt-BR" dirty="0" smtClean="0"/>
+              <a:t>A aplicação servidor é responsável por gerenciar</a:t>
+            </a:r>
             <a:r>
               <a:rPr lang="pt-BR" baseline="0" dirty="0" smtClean="0"/>
-              <a:t>Além da troca de mensagens de texto entre os clientes.</a:t>
-            </a:r>
-            <a:endParaRPr lang="pt-BR" dirty="0" smtClean="0"/>
+              <a:t> todo o tráfego de dados proveniente das diversas instâncias da aplicação-cliente.</a:t>
+            </a:r>
+          </a:p>
+          <a:p>
+            <a:r>
+              <a:rPr lang="pt-BR" baseline="0" dirty="0" smtClean="0"/>
+              <a:t>A aplicação gerencia as conexões dos diversos clientes simultaneamente, redirecionando cada pacote enviado por um cliente para o respectivo tratamento e retorno.</a:t>
+            </a:r>
+            <a:endParaRPr lang="pt-BR" dirty="0"/>
           </a:p>
         </p:txBody>
       </p:sp>
@@ -2304,7 +2294,7 @@
             <a:fld id="{D79E4107-198F-4D08-9CF1-214B37DA899F}" type="slidenum">
               <a:rPr lang="pt-BR" smtClean="0"/>
               <a:pPr/>
-              <a:t>24</a:t>
+              <a:t>26</a:t>
             </a:fld>
             <a:endParaRPr lang="pt-BR"/>
           </a:p>
@@ -2313,7 +2303,7 @@
     </p:spTree>
     <p:extLst>
       <p:ext uri="{BB962C8B-B14F-4D97-AF65-F5344CB8AC3E}">
-        <p14:creationId xmlns:p14="http://schemas.microsoft.com/office/powerpoint/2010/main" val="886727717"/>
+        <p14:creationId xmlns:p14="http://schemas.microsoft.com/office/powerpoint/2010/main" val="3007124474"/>
       </p:ext>
     </p:extLst>
   </p:cSld>
@@ -2369,17 +2359,11 @@
           <a:p>
             <a:r>
               <a:rPr lang="pt-BR" dirty="0" smtClean="0"/>
-              <a:t>A aplicação servidor é responsável por gerenciar</a:t>
+              <a:t>A aplicação</a:t>
             </a:r>
             <a:r>
               <a:rPr lang="pt-BR" baseline="0" dirty="0" smtClean="0"/>
-              <a:t> todo o tráfego de dados proveniente das diversas instâncias da aplicação-cliente.</a:t>
-            </a:r>
-          </a:p>
-          <a:p>
-            <a:r>
-              <a:rPr lang="pt-BR" baseline="0" dirty="0" smtClean="0"/>
-              <a:t>A aplicação gerencia as conexões dos diversos clientes simultaneamente, redirecionando cada pacote enviado por um cliente para o respectivo tratamento e retorno.</a:t>
+              <a:t>-servidor é também responsável por ser o único programar a acessar a base de dados da aplicação, servindo de intermédio entre os clientes e o banco de dados,</a:t>
             </a:r>
             <a:endParaRPr lang="pt-BR" dirty="0"/>
           </a:p>
@@ -2403,7 +2387,7 @@
             <a:fld id="{D79E4107-198F-4D08-9CF1-214B37DA899F}" type="slidenum">
               <a:rPr lang="pt-BR" smtClean="0"/>
               <a:pPr/>
-              <a:t>25</a:t>
+              <a:t>27</a:t>
             </a:fld>
             <a:endParaRPr lang="pt-BR"/>
           </a:p>
@@ -2412,7 +2396,7 @@
     </p:spTree>
     <p:extLst>
       <p:ext uri="{BB962C8B-B14F-4D97-AF65-F5344CB8AC3E}">
-        <p14:creationId xmlns:p14="http://schemas.microsoft.com/office/powerpoint/2010/main" val="3007124474"/>
+        <p14:creationId xmlns:p14="http://schemas.microsoft.com/office/powerpoint/2010/main" val="3930929528"/>
       </p:ext>
     </p:extLst>
   </p:cSld>
@@ -2468,11 +2452,11 @@
           <a:p>
             <a:r>
               <a:rPr lang="pt-BR" dirty="0" smtClean="0"/>
-              <a:t>A aplicação</a:t>
+              <a:t>Além de,</a:t>
             </a:r>
             <a:r>
               <a:rPr lang="pt-BR" baseline="0" dirty="0" smtClean="0"/>
-              <a:t>-servidor é também responsável por ser o único programar a acessar a base de dados da aplicação, servindo de intermédio entre os clientes e o banco de dados,</a:t>
+              <a:t> periodicamente, monitorar os status dos usuários, verificando a última vez que cada usuário se encontrava online, assim como exibir sua respectiva lista de contatos.</a:t>
             </a:r>
             <a:endParaRPr lang="pt-BR" dirty="0"/>
           </a:p>
@@ -2496,7 +2480,7 @@
             <a:fld id="{D79E4107-198F-4D08-9CF1-214B37DA899F}" type="slidenum">
               <a:rPr lang="pt-BR" smtClean="0"/>
               <a:pPr/>
-              <a:t>26</a:t>
+              <a:t>28</a:t>
             </a:fld>
             <a:endParaRPr lang="pt-BR"/>
           </a:p>
@@ -2505,7 +2489,7 @@
     </p:spTree>
     <p:extLst>
       <p:ext uri="{BB962C8B-B14F-4D97-AF65-F5344CB8AC3E}">
-        <p14:creationId xmlns:p14="http://schemas.microsoft.com/office/powerpoint/2010/main" val="3930929528"/>
+        <p14:creationId xmlns:p14="http://schemas.microsoft.com/office/powerpoint/2010/main" val="415152801"/>
       </p:ext>
     </p:extLst>
   </p:cSld>
@@ -2561,11 +2545,23 @@
           <a:p>
             <a:r>
               <a:rPr lang="pt-BR" dirty="0" smtClean="0"/>
-              <a:t>Além de,</a:t>
+              <a:t>A partir do escopo original,</a:t>
             </a:r>
             <a:r>
               <a:rPr lang="pt-BR" baseline="0" dirty="0" smtClean="0"/>
-              <a:t> periodicamente, monitorar os status dos usuários, verificando a última vez que cada usuário se encontrava online, assim como exibir sua respectiva lista de contatos.</a:t>
+              <a:t> houveram complicações que acabaram por limitar o que poderia ser implementado no protótipo.</a:t>
+            </a:r>
+          </a:p>
+          <a:p>
+            <a:r>
+              <a:rPr lang="pt-BR" baseline="0" dirty="0" smtClean="0"/>
+              <a:t>Isso inclui a funcionalidade de conversas em grupo e o envio de mídias nas mensagens, sejam estas imagens, áudio ou vídeo.</a:t>
+            </a:r>
+          </a:p>
+          <a:p>
+            <a:r>
+              <a:rPr lang="pt-BR" baseline="0" dirty="0" smtClean="0"/>
+              <a:t>As funcionalidades implementadas foram:</a:t>
             </a:r>
             <a:endParaRPr lang="pt-BR" dirty="0"/>
           </a:p>
@@ -2589,7 +2585,7 @@
             <a:fld id="{D79E4107-198F-4D08-9CF1-214B37DA899F}" type="slidenum">
               <a:rPr lang="pt-BR" smtClean="0"/>
               <a:pPr/>
-              <a:t>27</a:t>
+              <a:t>29</a:t>
             </a:fld>
             <a:endParaRPr lang="pt-BR"/>
           </a:p>
@@ -2598,7 +2594,7 @@
     </p:spTree>
     <p:extLst>
       <p:ext uri="{BB962C8B-B14F-4D97-AF65-F5344CB8AC3E}">
-        <p14:creationId xmlns:p14="http://schemas.microsoft.com/office/powerpoint/2010/main" val="415152801"/>
+        <p14:creationId xmlns:p14="http://schemas.microsoft.com/office/powerpoint/2010/main" val="1391540777"/>
       </p:ext>
     </p:extLst>
   </p:cSld>
@@ -2694,7 +2690,7 @@
             <a:fld id="{D79E4107-198F-4D08-9CF1-214B37DA899F}" type="slidenum">
               <a:rPr lang="pt-BR" smtClean="0"/>
               <a:pPr/>
-              <a:t>28</a:t>
+              <a:t>32</a:t>
             </a:fld>
             <a:endParaRPr lang="pt-BR"/>
           </a:p>
@@ -2809,7 +2805,7 @@
             <a:fld id="{D79E4107-198F-4D08-9CF1-214B37DA899F}" type="slidenum">
               <a:rPr lang="pt-BR" smtClean="0"/>
               <a:pPr/>
-              <a:t>29</a:t>
+              <a:t>33</a:t>
             </a:fld>
             <a:endParaRPr lang="pt-BR"/>
           </a:p>
@@ -2874,11 +2870,7 @@
           <a:p>
             <a:r>
               <a:rPr lang="pt-BR" dirty="0" smtClean="0"/>
-              <a:t>O cenário atual é o seguinte: Existem diversos sistemas operacionais, cada qual com sua arquitetura própria e ambiente de destino, seja ele desktop ou </a:t>
-            </a:r>
-            <a:r>
-              <a:rPr lang="pt-BR" dirty="0" smtClean="0"/>
-              <a:t>mobile.</a:t>
+              <a:t>O cenário atual é o seguinte: Existem diversos sistemas operacionais, cada qual com sua arquitetura própria e ambiente de destino, seja ele desktop ou mobile.</a:t>
             </a:r>
             <a:endParaRPr lang="pt-BR" dirty="0"/>
           </a:p>
@@ -3266,7 +3258,7 @@
             <a:fld id="{D79E4107-198F-4D08-9CF1-214B37DA899F}" type="slidenum">
               <a:rPr lang="pt-BR" smtClean="0"/>
               <a:pPr/>
-              <a:t>7</a:t>
+              <a:t>8</a:t>
             </a:fld>
             <a:endParaRPr lang="pt-BR"/>
           </a:p>
@@ -3359,11 +3351,7 @@
             </a:r>
             <a:r>
               <a:rPr lang="pt-BR" baseline="0" dirty="0" smtClean="0"/>
-              <a:t>, </a:t>
-            </a:r>
-            <a:r>
-              <a:rPr lang="pt-BR" baseline="0" dirty="0" smtClean="0"/>
-              <a:t>sua IDE. O módulo </a:t>
+              <a:t>, sua IDE. O módulo </a:t>
             </a:r>
             <a:r>
               <a:rPr lang="pt-BR" baseline="0" dirty="0" err="1" smtClean="0"/>
@@ -3403,7 +3391,7 @@
             <a:fld id="{D79E4107-198F-4D08-9CF1-214B37DA899F}" type="slidenum">
               <a:rPr lang="pt-BR" smtClean="0"/>
               <a:pPr/>
-              <a:t>8</a:t>
+              <a:t>9</a:t>
             </a:fld>
             <a:endParaRPr lang="pt-BR"/>
           </a:p>
@@ -3520,7 +3508,7 @@
             <a:fld id="{D79E4107-198F-4D08-9CF1-214B37DA899F}" type="slidenum">
               <a:rPr lang="pt-BR" smtClean="0"/>
               <a:pPr/>
-              <a:t>9</a:t>
+              <a:t>10</a:t>
             </a:fld>
             <a:endParaRPr lang="pt-BR"/>
           </a:p>
@@ -3629,7 +3617,7 @@
             <a:fld id="{D79E4107-198F-4D08-9CF1-214B37DA899F}" type="slidenum">
               <a:rPr lang="pt-BR" smtClean="0"/>
               <a:pPr/>
-              <a:t>10</a:t>
+              <a:t>12</a:t>
             </a:fld>
             <a:endParaRPr lang="pt-BR"/>
           </a:p>
@@ -3838,7 +3826,7 @@
             <a:fld id="{F7B3E5C2-E665-40E8-A738-C9AE30C3FAF2}" type="slidenum">
               <a:rPr lang="pt-BR"/>
               <a:pPr/>
-              <a:t>‹nº›</a:t>
+              <a:t>‹#›</a:t>
             </a:fld>
             <a:endParaRPr lang="pt-BR"/>
           </a:p>
@@ -4032,7 +4020,7 @@
             <a:fld id="{9895E8F0-F71E-4C5E-8F69-99CB3459B34D}" type="slidenum">
               <a:rPr lang="pt-BR"/>
               <a:pPr/>
-              <a:t>‹nº›</a:t>
+              <a:t>‹#›</a:t>
             </a:fld>
             <a:endParaRPr lang="pt-BR"/>
           </a:p>
@@ -4236,7 +4224,7 @@
             <a:fld id="{35242B5C-0ABF-4C4F-8920-2FE5B1D1FBE2}" type="slidenum">
               <a:rPr lang="pt-BR"/>
               <a:pPr/>
-              <a:t>‹nº›</a:t>
+              <a:t>‹#›</a:t>
             </a:fld>
             <a:endParaRPr lang="pt-BR"/>
           </a:p>
@@ -4472,7 +4460,7 @@
             <a:fld id="{75B5FC9A-82D6-4ABF-82CF-F56A69AA85D0}" type="slidenum">
               <a:rPr lang="pt-BR"/>
               <a:pPr/>
-              <a:t>‹nº›</a:t>
+              <a:t>‹#›</a:t>
             </a:fld>
             <a:endParaRPr lang="pt-BR"/>
           </a:p>
@@ -4688,7 +4676,7 @@
             <a:fld id="{24C2C55F-5BAB-4696-978B-700C24C70A25}" type="slidenum">
               <a:rPr lang="pt-BR"/>
               <a:pPr/>
-              <a:t>‹nº›</a:t>
+              <a:t>‹#›</a:t>
             </a:fld>
             <a:endParaRPr lang="pt-BR"/>
           </a:p>
@@ -5052,7 +5040,7 @@
             <a:fld id="{A07809F4-D6B1-4440-8249-F5B7D353A39A}" type="slidenum">
               <a:rPr lang="pt-BR"/>
               <a:pPr/>
-              <a:t>‹nº›</a:t>
+              <a:t>‹#›</a:t>
             </a:fld>
             <a:endParaRPr lang="pt-BR"/>
           </a:p>
@@ -5498,7 +5486,7 @@
             <a:fld id="{5A8E468B-49EF-472B-B623-AB78297268FB}" type="slidenum">
               <a:rPr lang="pt-BR"/>
               <a:pPr/>
-              <a:t>‹nº›</a:t>
+              <a:t>‹#›</a:t>
             </a:fld>
             <a:endParaRPr lang="pt-BR"/>
           </a:p>
@@ -5640,7 +5628,7 @@
             <a:fld id="{E58C0CB3-5780-4527-ACEF-D860C76F8F6A}" type="slidenum">
               <a:rPr lang="pt-BR"/>
               <a:pPr/>
-              <a:t>‹nº›</a:t>
+              <a:t>‹#›</a:t>
             </a:fld>
             <a:endParaRPr lang="pt-BR"/>
           </a:p>
@@ -5759,7 +5747,7 @@
             <a:fld id="{15069638-1CE3-4EFA-AAA1-0791F715AA24}" type="slidenum">
               <a:rPr lang="pt-BR"/>
               <a:pPr/>
-              <a:t>‹nº›</a:t>
+              <a:t>‹#›</a:t>
             </a:fld>
             <a:endParaRPr lang="pt-BR"/>
           </a:p>
@@ -6060,7 +6048,7 @@
             <a:fld id="{84DB2E3A-3B19-48EE-80C6-06E09B8D7A59}" type="slidenum">
               <a:rPr lang="pt-BR"/>
               <a:pPr/>
-              <a:t>‹nº›</a:t>
+              <a:t>‹#›</a:t>
             </a:fld>
             <a:endParaRPr lang="pt-BR"/>
           </a:p>
@@ -6338,7 +6326,7 @@
             <a:fld id="{44BB3D6A-C6F5-4901-83A1-1D733577A36E}" type="slidenum">
               <a:rPr lang="pt-BR"/>
               <a:pPr/>
-              <a:t>‹nº›</a:t>
+              <a:t>‹#›</a:t>
             </a:fld>
             <a:endParaRPr lang="pt-BR"/>
           </a:p>
@@ -6663,7 +6651,7 @@
             <a:fld id="{260F8726-E29F-4FF5-B5FD-9489C1FFA661}" type="slidenum">
               <a:rPr lang="pt-BR"/>
               <a:pPr/>
-              <a:t>‹nº›</a:t>
+              <a:t>‹#›</a:t>
             </a:fld>
             <a:endParaRPr lang="pt-BR"/>
           </a:p>
@@ -7266,15 +7254,7 @@
           <a:p>
             <a:r>
               <a:rPr lang="pt-BR" dirty="0" smtClean="0"/>
-              <a:t>Prof. </a:t>
-            </a:r>
-            <a:r>
-              <a:rPr lang="pt-BR" dirty="0" smtClean="0"/>
-              <a:t>Me. </a:t>
-            </a:r>
-            <a:r>
-              <a:rPr lang="pt-BR" dirty="0" smtClean="0"/>
-              <a:t>Eduardo </a:t>
+              <a:t>Prof. Me. Eduardo </a:t>
             </a:r>
             <a:r>
               <a:rPr lang="pt-BR" dirty="0" err="1" smtClean="0"/>
@@ -7340,7 +7320,146 @@
       </p:grpSpPr>
       <p:sp>
         <p:nvSpPr>
-          <p:cNvPr id="2" name="Título 1"/>
+          <p:cNvPr id="2" name="Title 1"/>
+          <p:cNvSpPr>
+            <a:spLocks noGrp="1"/>
+          </p:cNvSpPr>
+          <p:nvPr>
+            <p:ph type="title"/>
+          </p:nvPr>
+        </p:nvSpPr>
+        <p:spPr/>
+        <p:txBody>
+          <a:bodyPr/>
+          <a:lstStyle/>
+          <a:p>
+            <a:pPr algn="ctr"/>
+            <a:r>
+              <a:rPr lang="pt-BR" dirty="0" smtClean="0"/>
+              <a:t>Interfaces no Qt</a:t>
+            </a:r>
+            <a:endParaRPr lang="pt-BR" dirty="0"/>
+          </a:p>
+        </p:txBody>
+      </p:sp>
+      <p:sp>
+        <p:nvSpPr>
+          <p:cNvPr id="3" name="Content Placeholder 2"/>
+          <p:cNvSpPr>
+            <a:spLocks noGrp="1"/>
+          </p:cNvSpPr>
+          <p:nvPr>
+            <p:ph idx="1"/>
+          </p:nvPr>
+        </p:nvSpPr>
+        <p:spPr/>
+        <p:txBody>
+          <a:bodyPr/>
+          <a:lstStyle/>
+          <a:p>
+            <a:r>
+              <a:rPr lang="pt-BR" dirty="0" smtClean="0"/>
+              <a:t>Qt </a:t>
+            </a:r>
+            <a:r>
+              <a:rPr lang="pt-BR" dirty="0" err="1" smtClean="0"/>
+              <a:t>Quick</a:t>
+            </a:r>
+            <a:endParaRPr lang="pt-BR" dirty="0"/>
+          </a:p>
+        </p:txBody>
+      </p:sp>
+      <p:sp>
+        <p:nvSpPr>
+          <p:cNvPr id="4" name="Slide Number Placeholder 3"/>
+          <p:cNvSpPr>
+            <a:spLocks noGrp="1"/>
+          </p:cNvSpPr>
+          <p:nvPr>
+            <p:ph type="sldNum" sz="quarter" idx="12"/>
+          </p:nvPr>
+        </p:nvSpPr>
+        <p:spPr/>
+        <p:txBody>
+          <a:bodyPr/>
+          <a:lstStyle/>
+          <a:p>
+            <a:fld id="{75B5FC9A-82D6-4ABF-82CF-F56A69AA85D0}" type="slidenum">
+              <a:rPr lang="pt-BR" smtClean="0"/>
+              <a:pPr/>
+              <a:t>10</a:t>
+            </a:fld>
+            <a:endParaRPr lang="pt-BR"/>
+          </a:p>
+        </p:txBody>
+      </p:sp>
+      <p:pic>
+        <p:nvPicPr>
+          <p:cNvPr id="6" name="Picture 5"/>
+          <p:cNvPicPr>
+            <a:picLocks noChangeAspect="1"/>
+          </p:cNvPicPr>
+          <p:nvPr/>
+        </p:nvPicPr>
+        <p:blipFill>
+          <a:blip r:embed="rId3"/>
+          <a:stretch>
+            <a:fillRect/>
+          </a:stretch>
+        </p:blipFill>
+        <p:spPr>
+          <a:xfrm>
+            <a:off x="1133188" y="2173804"/>
+            <a:ext cx="6877624" cy="3952359"/>
+          </a:xfrm>
+          <a:prstGeom prst="rect">
+            <a:avLst/>
+          </a:prstGeom>
+        </p:spPr>
+      </p:pic>
+    </p:spTree>
+    <p:extLst>
+      <p:ext uri="{BB962C8B-B14F-4D97-AF65-F5344CB8AC3E}">
+        <p14:creationId xmlns:p14="http://schemas.microsoft.com/office/powerpoint/2010/main" val="850999151"/>
+      </p:ext>
+    </p:extLst>
+  </p:cSld>
+  <p:clrMapOvr>
+    <a:masterClrMapping/>
+  </p:clrMapOvr>
+  <p:transition>
+    <p:fade/>
+  </p:transition>
+  <p:timing>
+    <p:tnLst>
+      <p:par>
+        <p:cTn id="1" dur="indefinite" restart="never" nodeType="tmRoot"/>
+      </p:par>
+    </p:tnLst>
+  </p:timing>
+</p:sld>
+</file>
+
+<file path=ppt/slides/slide11.xml><?xml version="1.0" encoding="utf-8"?>
+<p:sld xmlns:a="http://schemas.openxmlformats.org/drawingml/2006/main" xmlns:r="http://schemas.openxmlformats.org/officeDocument/2006/relationships" xmlns:p="http://schemas.openxmlformats.org/presentationml/2006/main">
+  <p:cSld>
+    <p:spTree>
+      <p:nvGrpSpPr>
+        <p:cNvPr id="1" name=""/>
+        <p:cNvGrpSpPr/>
+        <p:nvPr/>
+      </p:nvGrpSpPr>
+      <p:grpSpPr>
+        <a:xfrm>
+          <a:off x="0" y="0"/>
+          <a:ext cx="0" cy="0"/>
+          <a:chOff x="0" y="0"/>
+          <a:chExt cx="0" cy="0"/>
+        </a:xfrm>
+      </p:grpSpPr>
+      <p:sp>
+        <p:nvSpPr>
+          <p:cNvPr id="2" name="Title 1"/>
           <p:cNvSpPr>
             <a:spLocks noGrp="1"/>
           </p:cNvSpPr>
@@ -7360,8 +7479,12 @@
           <a:p>
             <a:pPr algn="ctr"/>
             <a:r>
+              <a:rPr lang="pt-BR" dirty="0" err="1" smtClean="0"/>
+              <a:t>Signal</a:t>
+            </a:r>
+            <a:r>
               <a:rPr lang="pt-BR" dirty="0" smtClean="0"/>
-              <a:t>Alternativas ao Qt</a:t>
+              <a:t> e Slot</a:t>
             </a:r>
             <a:endParaRPr lang="pt-BR" dirty="0"/>
           </a:p>
@@ -7369,7 +7492,7 @@
       </p:sp>
       <p:sp>
         <p:nvSpPr>
-          <p:cNvPr id="3" name="Espaço Reservado para Conteúdo 2"/>
+          <p:cNvPr id="3" name="Content Placeholder 2"/>
           <p:cNvSpPr>
             <a:spLocks noGrp="1"/>
           </p:cNvSpPr>
@@ -7382,55 +7505,32 @@
           <a:bodyPr/>
           <a:lstStyle/>
           <a:p>
+            <a:endParaRPr lang="pt-BR" dirty="0" smtClean="0"/>
+          </a:p>
+          <a:p>
+            <a:endParaRPr lang="pt-BR" dirty="0"/>
+          </a:p>
+          <a:p>
             <a:r>
               <a:rPr lang="pt-BR" dirty="0" smtClean="0"/>
-              <a:t>Outros </a:t>
-            </a:r>
-            <a:r>
-              <a:rPr lang="pt-BR" i="1" dirty="0" smtClean="0"/>
-              <a:t>frameworks</a:t>
-            </a:r>
+              <a:t>Comunicação </a:t>
+            </a:r>
+          </a:p>
+          <a:p>
+            <a:pPr marL="0" indent="0">
+              <a:buNone/>
+            </a:pPr>
             <a:r>
               <a:rPr lang="pt-BR" dirty="0" smtClean="0"/>
-              <a:t> e/ou linguagens de programação </a:t>
-            </a:r>
-            <a:r>
-              <a:rPr lang="pt-BR" dirty="0" err="1" smtClean="0"/>
-              <a:t>multiplataforma</a:t>
-            </a:r>
-            <a:endParaRPr lang="pt-BR" dirty="0" smtClean="0"/>
-          </a:p>
-          <a:p>
+              <a:t>entre objetos</a:t>
+            </a:r>
             <a:endParaRPr lang="pt-BR" dirty="0"/>
           </a:p>
-          <a:p>
-            <a:pPr lvl="1"/>
-            <a:r>
-              <a:rPr lang="pt-BR" dirty="0" err="1" smtClean="0"/>
-              <a:t>Xamarin</a:t>
-            </a:r>
-            <a:endParaRPr lang="pt-BR" dirty="0" smtClean="0"/>
-          </a:p>
-          <a:p>
-            <a:pPr lvl="1"/>
-            <a:r>
-              <a:rPr lang="pt-BR" dirty="0" smtClean="0"/>
-              <a:t>Mono</a:t>
-            </a:r>
-          </a:p>
-          <a:p>
-            <a:pPr lvl="1"/>
-            <a:r>
-              <a:rPr lang="pt-BR" dirty="0" smtClean="0"/>
-              <a:t>Java</a:t>
-            </a:r>
-            <a:endParaRPr lang="pt-BR" dirty="0"/>
-          </a:p>
-        </p:txBody>
-      </p:sp>
-      <p:sp>
-        <p:nvSpPr>
-          <p:cNvPr id="4" name="Espaço Reservado para Número de Slide 3"/>
+        </p:txBody>
+      </p:sp>
+      <p:sp>
+        <p:nvSpPr>
+          <p:cNvPr id="4" name="Slide Number Placeholder 3"/>
           <p:cNvSpPr>
             <a:spLocks noGrp="1"/>
           </p:cNvSpPr>
@@ -7446,7 +7546,187 @@
             <a:fld id="{75B5FC9A-82D6-4ABF-82CF-F56A69AA85D0}" type="slidenum">
               <a:rPr lang="pt-BR" smtClean="0"/>
               <a:pPr/>
-              <a:t>10</a:t>
+              <a:t>11</a:t>
+            </a:fld>
+            <a:endParaRPr lang="pt-BR"/>
+          </a:p>
+        </p:txBody>
+      </p:sp>
+      <p:pic>
+        <p:nvPicPr>
+          <p:cNvPr id="5" name="Picture 4" descr="http://qt-project.org/doc/qt-4.8/images/abstract-connections.png"/>
+          <p:cNvPicPr/>
+          <p:nvPr/>
+        </p:nvPicPr>
+        <p:blipFill>
+          <a:blip r:embed="rId2">
+            <a:extLst>
+              <a:ext uri="{28A0092B-C50C-407E-A947-70E740481C1C}">
+                <a14:useLocalDpi xmlns:a14="http://schemas.microsoft.com/office/drawing/2010/main" val="0"/>
+              </a:ext>
+            </a:extLst>
+          </a:blip>
+          <a:srcRect/>
+          <a:stretch>
+            <a:fillRect/>
+          </a:stretch>
+        </p:blipFill>
+        <p:spPr bwMode="auto">
+          <a:xfrm>
+            <a:off x="3771900" y="1354138"/>
+            <a:ext cx="4914900" cy="4772025"/>
+          </a:xfrm>
+          <a:prstGeom prst="rect">
+            <a:avLst/>
+          </a:prstGeom>
+          <a:noFill/>
+          <a:ln>
+            <a:noFill/>
+          </a:ln>
+        </p:spPr>
+      </p:pic>
+    </p:spTree>
+    <p:extLst>
+      <p:ext uri="{BB962C8B-B14F-4D97-AF65-F5344CB8AC3E}">
+        <p14:creationId xmlns:p14="http://schemas.microsoft.com/office/powerpoint/2010/main" val="4271525917"/>
+      </p:ext>
+    </p:extLst>
+  </p:cSld>
+  <p:clrMapOvr>
+    <a:masterClrMapping/>
+  </p:clrMapOvr>
+  <p:transition>
+    <p:fade/>
+  </p:transition>
+</p:sld>
+</file>
+
+<file path=ppt/slides/slide12.xml><?xml version="1.0" encoding="utf-8"?>
+<p:sld xmlns:a="http://schemas.openxmlformats.org/drawingml/2006/main" xmlns:r="http://schemas.openxmlformats.org/officeDocument/2006/relationships" xmlns:p="http://schemas.openxmlformats.org/presentationml/2006/main">
+  <p:cSld>
+    <p:spTree>
+      <p:nvGrpSpPr>
+        <p:cNvPr id="1" name=""/>
+        <p:cNvGrpSpPr/>
+        <p:nvPr/>
+      </p:nvGrpSpPr>
+      <p:grpSpPr>
+        <a:xfrm>
+          <a:off x="0" y="0"/>
+          <a:ext cx="0" cy="0"/>
+          <a:chOff x="0" y="0"/>
+          <a:chExt cx="0" cy="0"/>
+        </a:xfrm>
+      </p:grpSpPr>
+      <p:sp>
+        <p:nvSpPr>
+          <p:cNvPr id="2" name="Título 1"/>
+          <p:cNvSpPr>
+            <a:spLocks noGrp="1"/>
+          </p:cNvSpPr>
+          <p:nvPr>
+            <p:ph type="title"/>
+          </p:nvPr>
+        </p:nvSpPr>
+        <p:spPr>
+          <a:xfrm>
+            <a:off x="2483768" y="274638"/>
+            <a:ext cx="5328592" cy="1143000"/>
+          </a:xfrm>
+        </p:spPr>
+        <p:txBody>
+          <a:bodyPr/>
+          <a:lstStyle/>
+          <a:p>
+            <a:pPr algn="ctr"/>
+            <a:r>
+              <a:rPr lang="pt-BR" dirty="0" smtClean="0"/>
+              <a:t>Alternativas ao Qt</a:t>
+            </a:r>
+            <a:endParaRPr lang="pt-BR" dirty="0"/>
+          </a:p>
+        </p:txBody>
+      </p:sp>
+      <p:sp>
+        <p:nvSpPr>
+          <p:cNvPr id="3" name="Espaço Reservado para Conteúdo 2"/>
+          <p:cNvSpPr>
+            <a:spLocks noGrp="1"/>
+          </p:cNvSpPr>
+          <p:nvPr>
+            <p:ph idx="1"/>
+          </p:nvPr>
+        </p:nvSpPr>
+        <p:spPr/>
+        <p:txBody>
+          <a:bodyPr/>
+          <a:lstStyle/>
+          <a:p>
+            <a:r>
+              <a:rPr lang="pt-BR" dirty="0" smtClean="0"/>
+              <a:t>Outros </a:t>
+            </a:r>
+            <a:r>
+              <a:rPr lang="pt-BR" i="1" dirty="0" smtClean="0"/>
+              <a:t>frameworks</a:t>
+            </a:r>
+            <a:r>
+              <a:rPr lang="pt-BR" dirty="0" smtClean="0"/>
+              <a:t> e/ou linguagens de programação </a:t>
+            </a:r>
+            <a:r>
+              <a:rPr lang="pt-BR" dirty="0" err="1" smtClean="0"/>
+              <a:t>multiplataforma</a:t>
+            </a:r>
+            <a:endParaRPr lang="pt-BR" dirty="0" smtClean="0"/>
+          </a:p>
+          <a:p>
+            <a:endParaRPr lang="pt-BR" dirty="0"/>
+          </a:p>
+          <a:p>
+            <a:pPr lvl="1"/>
+            <a:r>
+              <a:rPr lang="pt-BR" dirty="0" err="1" smtClean="0"/>
+              <a:t>Xamarin</a:t>
+            </a:r>
+            <a:endParaRPr lang="pt-BR" dirty="0" smtClean="0"/>
+          </a:p>
+          <a:p>
+            <a:pPr lvl="1"/>
+            <a:r>
+              <a:rPr lang="pt-BR" dirty="0" smtClean="0"/>
+              <a:t>Mono</a:t>
+            </a:r>
+          </a:p>
+          <a:p>
+            <a:pPr lvl="1"/>
+            <a:r>
+              <a:rPr lang="pt-BR" dirty="0" smtClean="0"/>
+              <a:t>Java</a:t>
+            </a:r>
+            <a:endParaRPr lang="pt-BR" dirty="0"/>
+          </a:p>
+        </p:txBody>
+      </p:sp>
+      <p:sp>
+        <p:nvSpPr>
+          <p:cNvPr id="4" name="Espaço Reservado para Número de Slide 3"/>
+          <p:cNvSpPr>
+            <a:spLocks noGrp="1"/>
+          </p:cNvSpPr>
+          <p:nvPr>
+            <p:ph type="sldNum" sz="quarter" idx="12"/>
+          </p:nvPr>
+        </p:nvSpPr>
+        <p:spPr/>
+        <p:txBody>
+          <a:bodyPr/>
+          <a:lstStyle/>
+          <a:p>
+            <a:fld id="{75B5FC9A-82D6-4ABF-82CF-F56A69AA85D0}" type="slidenum">
+              <a:rPr lang="pt-BR" smtClean="0"/>
+              <a:pPr/>
+              <a:t>12</a:t>
             </a:fld>
             <a:endParaRPr lang="pt-BR"/>
           </a:p>
@@ -7576,7 +7856,7 @@
 </p:sld>
 </file>
 
-<file path=ppt/slides/slide11.xml><?xml version="1.0" encoding="utf-8"?>
+<file path=ppt/slides/slide13.xml><?xml version="1.0" encoding="utf-8"?>
 <p:sld xmlns:a="http://schemas.openxmlformats.org/drawingml/2006/main" xmlns:r="http://schemas.openxmlformats.org/officeDocument/2006/relationships" xmlns:p="http://schemas.openxmlformats.org/presentationml/2006/main">
   <p:cSld>
     <p:spTree>
@@ -7685,7 +7965,7 @@
             <a:fld id="{75B5FC9A-82D6-4ABF-82CF-F56A69AA85D0}" type="slidenum">
               <a:rPr lang="pt-BR" smtClean="0"/>
               <a:pPr/>
-              <a:t>11</a:t>
+              <a:t>13</a:t>
             </a:fld>
             <a:endParaRPr lang="pt-BR"/>
           </a:p>
@@ -7749,7 +8029,7 @@
 </p:sld>
 </file>
 
-<file path=ppt/slides/slide12.xml><?xml version="1.0" encoding="utf-8"?>
+<file path=ppt/slides/slide14.xml><?xml version="1.0" encoding="utf-8"?>
 <p:sld xmlns:a="http://schemas.openxmlformats.org/drawingml/2006/main" xmlns:r="http://schemas.openxmlformats.org/officeDocument/2006/relationships" xmlns:p="http://schemas.openxmlformats.org/presentationml/2006/main">
   <p:cSld>
     <p:spTree>
@@ -7844,7 +8124,7 @@
             <a:fld id="{75B5FC9A-82D6-4ABF-82CF-F56A69AA85D0}" type="slidenum">
               <a:rPr lang="pt-BR" smtClean="0"/>
               <a:pPr/>
-              <a:t>12</a:t>
+              <a:t>14</a:t>
             </a:fld>
             <a:endParaRPr lang="pt-BR"/>
           </a:p>
@@ -7908,7 +8188,7 @@
 </p:sld>
 </file>
 
-<file path=ppt/slides/slide13.xml><?xml version="1.0" encoding="utf-8"?>
+<file path=ppt/slides/slide15.xml><?xml version="1.0" encoding="utf-8"?>
 <p:sld xmlns:a="http://schemas.openxmlformats.org/drawingml/2006/main" xmlns:r="http://schemas.openxmlformats.org/officeDocument/2006/relationships" xmlns:p="http://schemas.openxmlformats.org/presentationml/2006/main">
   <p:cSld>
     <p:spTree>
@@ -7998,7 +8278,7 @@
             <a:fld id="{75B5FC9A-82D6-4ABF-82CF-F56A69AA85D0}" type="slidenum">
               <a:rPr lang="pt-BR" smtClean="0"/>
               <a:pPr/>
-              <a:t>13</a:t>
+              <a:t>15</a:t>
             </a:fld>
             <a:endParaRPr lang="pt-BR"/>
           </a:p>
@@ -8062,7 +8342,7 @@
 </p:sld>
 </file>
 
-<file path=ppt/slides/slide14.xml><?xml version="1.0" encoding="utf-8"?>
+<file path=ppt/slides/slide16.xml><?xml version="1.0" encoding="utf-8"?>
 <p:sld xmlns:a="http://schemas.openxmlformats.org/drawingml/2006/main" xmlns:r="http://schemas.openxmlformats.org/officeDocument/2006/relationships" xmlns:p="http://schemas.openxmlformats.org/presentationml/2006/main">
   <p:cSld>
     <p:spTree>
@@ -8179,7 +8459,7 @@
             <a:fld id="{75B5FC9A-82D6-4ABF-82CF-F56A69AA85D0}" type="slidenum">
               <a:rPr lang="pt-BR" smtClean="0"/>
               <a:pPr/>
-              <a:t>14</a:t>
+              <a:t>16</a:t>
             </a:fld>
             <a:endParaRPr lang="pt-BR"/>
           </a:p>
@@ -8472,7 +8752,7 @@
 </p:sld>
 </file>
 
-<file path=ppt/slides/slide15.xml><?xml version="1.0" encoding="utf-8"?>
+<file path=ppt/slides/slide17.xml><?xml version="1.0" encoding="utf-8"?>
 <p:sld xmlns:a="http://schemas.openxmlformats.org/drawingml/2006/main" xmlns:r="http://schemas.openxmlformats.org/officeDocument/2006/relationships" xmlns:p="http://schemas.openxmlformats.org/presentationml/2006/main">
   <p:cSld>
     <p:spTree>
@@ -8555,7 +8835,7 @@
             <a:fld id="{75B5FC9A-82D6-4ABF-82CF-F56A69AA85D0}" type="slidenum">
               <a:rPr lang="pt-BR" smtClean="0"/>
               <a:pPr/>
-              <a:t>15</a:t>
+              <a:t>17</a:t>
             </a:fld>
             <a:endParaRPr lang="pt-BR"/>
           </a:p>
@@ -8625,7 +8905,7 @@
 </p:sld>
 </file>
 
-<file path=ppt/slides/slide16.xml><?xml version="1.0" encoding="utf-8"?>
+<file path=ppt/slides/slide18.xml><?xml version="1.0" encoding="utf-8"?>
 <p:sld xmlns:a="http://schemas.openxmlformats.org/drawingml/2006/main" xmlns:r="http://schemas.openxmlformats.org/officeDocument/2006/relationships" xmlns:p="http://schemas.openxmlformats.org/presentationml/2006/main">
   <p:cSld>
     <p:spTree>
@@ -8688,7 +8968,7 @@
           <a:p>
             <a:r>
               <a:rPr lang="pt-BR" sz="2400" dirty="0" smtClean="0"/>
-              <a:t>97% dos computadores do mundo usam Java (DEITEL; DEITEL, 2009)</a:t>
+              <a:t>97% dos computadores corporativos do mundo usam Java (JAVA, 2014)</a:t>
             </a:r>
           </a:p>
           <a:p>
@@ -8755,7 +9035,7 @@
             <a:fld id="{75B5FC9A-82D6-4ABF-82CF-F56A69AA85D0}" type="slidenum">
               <a:rPr lang="pt-BR" smtClean="0"/>
               <a:pPr/>
-              <a:t>16</a:t>
+              <a:t>18</a:t>
             </a:fld>
             <a:endParaRPr lang="pt-BR"/>
           </a:p>
@@ -8813,7 +9093,7 @@
 </p:sld>
 </file>
 
-<file path=ppt/slides/slide17.xml><?xml version="1.0" encoding="utf-8"?>
+<file path=ppt/slides/slide19.xml><?xml version="1.0" encoding="utf-8"?>
 <p:sld xmlns:a="http://schemas.openxmlformats.org/drawingml/2006/main" xmlns:r="http://schemas.openxmlformats.org/officeDocument/2006/relationships" xmlns:p="http://schemas.openxmlformats.org/presentationml/2006/main">
   <p:cSld>
     <p:spTree>
@@ -8896,7 +9176,7 @@
             <a:fld id="{75B5FC9A-82D6-4ABF-82CF-F56A69AA85D0}" type="slidenum">
               <a:rPr lang="pt-BR" smtClean="0"/>
               <a:pPr/>
-              <a:t>17</a:t>
+              <a:t>19</a:t>
             </a:fld>
             <a:endParaRPr lang="pt-BR"/>
           </a:p>
@@ -8966,7 +9246,7 @@
 </p:sld>
 </file>
 
-<file path=ppt/slides/slide18.xml><?xml version="1.0" encoding="utf-8"?>
+<file path=ppt/slides/slide2.xml><?xml version="1.0" encoding="utf-8"?>
 <p:sld xmlns:a="http://schemas.openxmlformats.org/drawingml/2006/main" xmlns:r="http://schemas.openxmlformats.org/officeDocument/2006/relationships" xmlns:p="http://schemas.openxmlformats.org/presentationml/2006/main">
   <p:cSld>
     <p:spTree>
@@ -8985,7 +9265,7 @@
       </p:grpSpPr>
       <p:sp>
         <p:nvSpPr>
-          <p:cNvPr id="2" name="Title 1"/>
+          <p:cNvPr id="2" name="Título 1"/>
           <p:cNvSpPr>
             <a:spLocks noGrp="1"/>
           </p:cNvSpPr>
@@ -9005,8 +9285,8 @@
           <a:p>
             <a:pPr algn="ctr"/>
             <a:r>
-              <a:rPr lang="pt-BR" dirty="0" err="1" smtClean="0"/>
-              <a:t>NetBeans</a:t>
+              <a:rPr lang="pt-BR" dirty="0" smtClean="0"/>
+              <a:t>Agenda</a:t>
             </a:r>
             <a:endParaRPr lang="pt-BR" dirty="0"/>
           </a:p>
@@ -9014,7 +9294,7 @@
       </p:sp>
       <p:sp>
         <p:nvSpPr>
-          <p:cNvPr id="3" name="Content Placeholder 2"/>
+          <p:cNvPr id="3" name="Espaço Reservado para Conteúdo 2"/>
           <p:cNvSpPr>
             <a:spLocks noGrp="1"/>
           </p:cNvSpPr>
@@ -9022,18 +9302,64 @@
             <p:ph idx="1"/>
           </p:nvPr>
         </p:nvSpPr>
-        <p:spPr/>
-        <p:txBody>
-          <a:bodyPr/>
-          <a:lstStyle/>
-          <a:p>
-            <a:endParaRPr lang="pt-BR"/>
-          </a:p>
-        </p:txBody>
-      </p:sp>
-      <p:sp>
-        <p:nvSpPr>
-          <p:cNvPr id="4" name="Slide Number Placeholder 3"/>
+        <p:spPr>
+          <a:xfrm>
+            <a:off x="457200" y="1417638"/>
+            <a:ext cx="8229600" cy="4525963"/>
+          </a:xfrm>
+        </p:spPr>
+        <p:txBody>
+          <a:bodyPr anchor="ctr"/>
+          <a:lstStyle/>
+          <a:p>
+            <a:r>
+              <a:rPr lang="pt-BR" sz="2800" dirty="0" smtClean="0"/>
+              <a:t>Introdução</a:t>
+            </a:r>
+          </a:p>
+          <a:p>
+            <a:r>
+              <a:rPr lang="pt-BR" sz="2800" dirty="0" smtClean="0"/>
+              <a:t>Qt</a:t>
+            </a:r>
+            <a:endParaRPr lang="pt-BR" sz="2800" dirty="0" smtClean="0"/>
+          </a:p>
+          <a:p>
+            <a:r>
+              <a:rPr lang="pt-BR" sz="2800" dirty="0" smtClean="0"/>
+              <a:t>Alternativas ao Qt</a:t>
+            </a:r>
+          </a:p>
+          <a:p>
+            <a:r>
+              <a:rPr lang="pt-BR" sz="2800" dirty="0" smtClean="0"/>
+              <a:t>Estudo de Caso</a:t>
+            </a:r>
+          </a:p>
+          <a:p>
+            <a:r>
+              <a:rPr lang="pt-BR" sz="2800" dirty="0" smtClean="0"/>
+              <a:t>Conclusão</a:t>
+            </a:r>
+          </a:p>
+          <a:p>
+            <a:r>
+              <a:rPr lang="pt-BR" sz="2800" dirty="0" smtClean="0"/>
+              <a:t>Trabalhos Futuros</a:t>
+            </a:r>
+          </a:p>
+          <a:p>
+            <a:r>
+              <a:rPr lang="pt-BR" sz="2800" dirty="0" smtClean="0"/>
+              <a:t>Agradecimentos</a:t>
+            </a:r>
+            <a:endParaRPr lang="pt-BR" sz="2800" dirty="0"/>
+          </a:p>
+        </p:txBody>
+      </p:sp>
+      <p:sp>
+        <p:nvSpPr>
+          <p:cNvPr id="5" name="Espaço Reservado para Número de Slide 4"/>
           <p:cNvSpPr>
             <a:spLocks noGrp="1"/>
           </p:cNvSpPr>
@@ -9049,7 +9375,119 @@
             <a:fld id="{75B5FC9A-82D6-4ABF-82CF-F56A69AA85D0}" type="slidenum">
               <a:rPr lang="pt-BR" smtClean="0"/>
               <a:pPr/>
-              <a:t>18</a:t>
+              <a:t>2</a:t>
+            </a:fld>
+            <a:endParaRPr lang="pt-BR"/>
+          </a:p>
+        </p:txBody>
+      </p:sp>
+    </p:spTree>
+    <p:extLst>
+      <p:ext uri="{BB962C8B-B14F-4D97-AF65-F5344CB8AC3E}">
+        <p14:creationId xmlns:p14="http://schemas.microsoft.com/office/powerpoint/2010/main" val="1452226090"/>
+      </p:ext>
+    </p:extLst>
+  </p:cSld>
+  <p:clrMapOvr>
+    <a:masterClrMapping/>
+  </p:clrMapOvr>
+  <p:transition>
+    <p:fade/>
+  </p:transition>
+  <p:timing>
+    <p:tnLst>
+      <p:par>
+        <p:cTn id="1" dur="indefinite" restart="never" nodeType="tmRoot"/>
+      </p:par>
+    </p:tnLst>
+  </p:timing>
+</p:sld>
+</file>
+
+<file path=ppt/slides/slide20.xml><?xml version="1.0" encoding="utf-8"?>
+<p:sld xmlns:a="http://schemas.openxmlformats.org/drawingml/2006/main" xmlns:r="http://schemas.openxmlformats.org/officeDocument/2006/relationships" xmlns:p="http://schemas.openxmlformats.org/presentationml/2006/main">
+  <p:cSld>
+    <p:spTree>
+      <p:nvGrpSpPr>
+        <p:cNvPr id="1" name=""/>
+        <p:cNvGrpSpPr/>
+        <p:nvPr/>
+      </p:nvGrpSpPr>
+      <p:grpSpPr>
+        <a:xfrm>
+          <a:off x="0" y="0"/>
+          <a:ext cx="0" cy="0"/>
+          <a:chOff x="0" y="0"/>
+          <a:chExt cx="0" cy="0"/>
+        </a:xfrm>
+      </p:grpSpPr>
+      <p:sp>
+        <p:nvSpPr>
+          <p:cNvPr id="2" name="Title 1"/>
+          <p:cNvSpPr>
+            <a:spLocks noGrp="1"/>
+          </p:cNvSpPr>
+          <p:nvPr>
+            <p:ph type="title"/>
+          </p:nvPr>
+        </p:nvSpPr>
+        <p:spPr>
+          <a:xfrm>
+            <a:off x="2483768" y="274638"/>
+            <a:ext cx="5328592" cy="1143000"/>
+          </a:xfrm>
+        </p:spPr>
+        <p:txBody>
+          <a:bodyPr/>
+          <a:lstStyle/>
+          <a:p>
+            <a:pPr algn="ctr"/>
+            <a:r>
+              <a:rPr lang="pt-BR" dirty="0" err="1" smtClean="0"/>
+              <a:t>NetBeans</a:t>
+            </a:r>
+            <a:endParaRPr lang="pt-BR" dirty="0"/>
+          </a:p>
+        </p:txBody>
+      </p:sp>
+      <p:sp>
+        <p:nvSpPr>
+          <p:cNvPr id="3" name="Content Placeholder 2"/>
+          <p:cNvSpPr>
+            <a:spLocks noGrp="1"/>
+          </p:cNvSpPr>
+          <p:nvPr>
+            <p:ph idx="1"/>
+          </p:nvPr>
+        </p:nvSpPr>
+        <p:spPr/>
+        <p:txBody>
+          <a:bodyPr/>
+          <a:lstStyle/>
+          <a:p>
+            <a:endParaRPr lang="pt-BR"/>
+          </a:p>
+        </p:txBody>
+      </p:sp>
+      <p:sp>
+        <p:nvSpPr>
+          <p:cNvPr id="4" name="Slide Number Placeholder 3"/>
+          <p:cNvSpPr>
+            <a:spLocks noGrp="1"/>
+          </p:cNvSpPr>
+          <p:nvPr>
+            <p:ph type="sldNum" sz="quarter" idx="12"/>
+          </p:nvPr>
+        </p:nvSpPr>
+        <p:spPr/>
+        <p:txBody>
+          <a:bodyPr/>
+          <a:lstStyle/>
+          <a:p>
+            <a:fld id="{75B5FC9A-82D6-4ABF-82CF-F56A69AA85D0}" type="slidenum">
+              <a:rPr lang="pt-BR" smtClean="0"/>
+              <a:pPr/>
+              <a:t>20</a:t>
             </a:fld>
             <a:endParaRPr lang="pt-BR"/>
           </a:p>
@@ -9102,7 +9540,7 @@
 </p:sld>
 </file>
 
-<file path=ppt/slides/slide19.xml><?xml version="1.0" encoding="utf-8"?>
+<file path=ppt/slides/slide21.xml><?xml version="1.0" encoding="utf-8"?>
 <p:sld xmlns:a="http://schemas.openxmlformats.org/drawingml/2006/main" xmlns:r="http://schemas.openxmlformats.org/officeDocument/2006/relationships" xmlns:p="http://schemas.openxmlformats.org/presentationml/2006/main">
   <p:cSld>
     <p:spTree>
@@ -9194,7 +9632,7 @@
             </a:r>
             <a:r>
               <a:rPr lang="pt-BR" sz="2400" dirty="0" smtClean="0"/>
-              <a:t>) – Visual Studio</a:t>
+              <a:t>) – Visual Studio - .NET Framework 4.0</a:t>
             </a:r>
           </a:p>
         </p:txBody>
@@ -9217,7 +9655,7 @@
             <a:fld id="{75B5FC9A-82D6-4ABF-82CF-F56A69AA85D0}" type="slidenum">
               <a:rPr lang="pt-BR" smtClean="0"/>
               <a:pPr/>
-              <a:t>19</a:t>
+              <a:t>21</a:t>
             </a:fld>
             <a:endParaRPr lang="pt-BR"/>
           </a:p>
@@ -9246,7 +9684,7 @@
 </p:sld>
 </file>
 
-<file path=ppt/slides/slide2.xml><?xml version="1.0" encoding="utf-8"?>
+<file path=ppt/slides/slide22.xml><?xml version="1.0" encoding="utf-8"?>
 <p:sld xmlns:a="http://schemas.openxmlformats.org/drawingml/2006/main" xmlns:r="http://schemas.openxmlformats.org/officeDocument/2006/relationships" xmlns:p="http://schemas.openxmlformats.org/presentationml/2006/main">
   <p:cSld>
     <p:spTree>
@@ -9286,7 +9724,7 @@
             <a:pPr algn="ctr"/>
             <a:r>
               <a:rPr lang="pt-BR" dirty="0" smtClean="0"/>
-              <a:t>Agenda</a:t>
+              <a:t>Arquitetura do Sistema</a:t>
             </a:r>
             <a:endParaRPr lang="pt-BR" dirty="0"/>
           </a:p>
@@ -9294,7 +9732,7 @@
       </p:sp>
       <p:sp>
         <p:nvSpPr>
-          <p:cNvPr id="3" name="Espaço Reservado para Conteúdo 2"/>
+          <p:cNvPr id="6" name="Content Placeholder 5"/>
           <p:cNvSpPr>
             <a:spLocks noGrp="1"/>
           </p:cNvSpPr>
@@ -9302,87 +9740,18 @@
             <p:ph idx="1"/>
           </p:nvPr>
         </p:nvSpPr>
-        <p:spPr>
-          <a:xfrm>
-            <a:off x="457200" y="1417638"/>
-            <a:ext cx="8229600" cy="4525963"/>
-          </a:xfrm>
-        </p:spPr>
-        <p:txBody>
-          <a:bodyPr/>
-          <a:lstStyle/>
-          <a:p>
-            <a:r>
-              <a:rPr lang="pt-BR" sz="2000" dirty="0" smtClean="0"/>
-              <a:t>Introdução</a:t>
-            </a:r>
-          </a:p>
-          <a:p>
-            <a:r>
-              <a:rPr lang="pt-BR" sz="2000" dirty="0" smtClean="0"/>
-              <a:t>Metodologia</a:t>
-            </a:r>
-          </a:p>
-          <a:p>
-            <a:r>
-              <a:rPr lang="pt-BR" sz="2000" dirty="0" smtClean="0"/>
-              <a:t>Qt</a:t>
-            </a:r>
-          </a:p>
-          <a:p>
-            <a:r>
-              <a:rPr lang="pt-BR" sz="2000" dirty="0" smtClean="0"/>
-              <a:t>Alternativas ao Qt</a:t>
-            </a:r>
-          </a:p>
-          <a:p>
-            <a:r>
-              <a:rPr lang="pt-BR" sz="2000" dirty="0" smtClean="0"/>
-              <a:t>Estudo de Caso</a:t>
-            </a:r>
-          </a:p>
-          <a:p>
-            <a:r>
-              <a:rPr lang="pt-BR" sz="2000" dirty="0" smtClean="0"/>
-              <a:t>Limitações do Projeto</a:t>
-            </a:r>
-          </a:p>
-          <a:p>
-            <a:r>
-              <a:rPr lang="pt-BR" sz="2000" dirty="0" smtClean="0"/>
-              <a:t>Aplicação Cliente</a:t>
-            </a:r>
-          </a:p>
-          <a:p>
-            <a:r>
-              <a:rPr lang="pt-BR" sz="2000" dirty="0" smtClean="0"/>
-              <a:t>Aplicação Servidor</a:t>
-            </a:r>
-          </a:p>
-          <a:p>
-            <a:r>
-              <a:rPr lang="pt-BR" sz="2000" dirty="0" smtClean="0"/>
-              <a:t>Conclusão</a:t>
-            </a:r>
-          </a:p>
-          <a:p>
-            <a:r>
-              <a:rPr lang="pt-BR" sz="2000" dirty="0" smtClean="0"/>
-              <a:t>Trabalhos Futuros</a:t>
-            </a:r>
-          </a:p>
-          <a:p>
-            <a:r>
-              <a:rPr lang="pt-BR" sz="2000" dirty="0" smtClean="0"/>
-              <a:t>Agradecimentos</a:t>
-            </a:r>
-            <a:endParaRPr lang="pt-BR" sz="2000" dirty="0"/>
-          </a:p>
-        </p:txBody>
-      </p:sp>
-      <p:sp>
-        <p:nvSpPr>
-          <p:cNvPr id="5" name="Espaço Reservado para Número de Slide 4"/>
+        <p:spPr/>
+        <p:txBody>
+          <a:bodyPr/>
+          <a:lstStyle/>
+          <a:p>
+            <a:endParaRPr lang="pt-BR" dirty="0"/>
+          </a:p>
+        </p:txBody>
+      </p:sp>
+      <p:sp>
+        <p:nvSpPr>
+          <p:cNvPr id="4" name="Espaço Reservado para Número de Slide 3"/>
           <p:cNvSpPr>
             <a:spLocks noGrp="1"/>
           </p:cNvSpPr>
@@ -9398,119 +9767,7 @@
             <a:fld id="{75B5FC9A-82D6-4ABF-82CF-F56A69AA85D0}" type="slidenum">
               <a:rPr lang="pt-BR" smtClean="0"/>
               <a:pPr/>
-              <a:t>2</a:t>
-            </a:fld>
-            <a:endParaRPr lang="pt-BR"/>
-          </a:p>
-        </p:txBody>
-      </p:sp>
-    </p:spTree>
-    <p:extLst>
-      <p:ext uri="{BB962C8B-B14F-4D97-AF65-F5344CB8AC3E}">
-        <p14:creationId xmlns:p14="http://schemas.microsoft.com/office/powerpoint/2010/main" val="1452226090"/>
-      </p:ext>
-    </p:extLst>
-  </p:cSld>
-  <p:clrMapOvr>
-    <a:masterClrMapping/>
-  </p:clrMapOvr>
-  <p:transition>
-    <p:fade/>
-  </p:transition>
-  <p:timing>
-    <p:tnLst>
-      <p:par>
-        <p:cTn id="1" dur="indefinite" restart="never" nodeType="tmRoot"/>
-      </p:par>
-    </p:tnLst>
-  </p:timing>
-</p:sld>
-</file>
-
-<file path=ppt/slides/slide20.xml><?xml version="1.0" encoding="utf-8"?>
-<p:sld xmlns:a="http://schemas.openxmlformats.org/drawingml/2006/main" xmlns:r="http://schemas.openxmlformats.org/officeDocument/2006/relationships" xmlns:p="http://schemas.openxmlformats.org/presentationml/2006/main">
-  <p:cSld>
-    <p:spTree>
-      <p:nvGrpSpPr>
-        <p:cNvPr id="1" name=""/>
-        <p:cNvGrpSpPr/>
-        <p:nvPr/>
-      </p:nvGrpSpPr>
-      <p:grpSpPr>
-        <a:xfrm>
-          <a:off x="0" y="0"/>
-          <a:ext cx="0" cy="0"/>
-          <a:chOff x="0" y="0"/>
-          <a:chExt cx="0" cy="0"/>
-        </a:xfrm>
-      </p:grpSpPr>
-      <p:sp>
-        <p:nvSpPr>
-          <p:cNvPr id="2" name="Título 1"/>
-          <p:cNvSpPr>
-            <a:spLocks noGrp="1"/>
-          </p:cNvSpPr>
-          <p:nvPr>
-            <p:ph type="title"/>
-          </p:nvPr>
-        </p:nvSpPr>
-        <p:spPr>
-          <a:xfrm>
-            <a:off x="2483768" y="274638"/>
-            <a:ext cx="5328592" cy="1143000"/>
-          </a:xfrm>
-        </p:spPr>
-        <p:txBody>
-          <a:bodyPr/>
-          <a:lstStyle/>
-          <a:p>
-            <a:pPr algn="ctr"/>
-            <a:r>
-              <a:rPr lang="pt-BR" dirty="0" smtClean="0"/>
-              <a:t>Arquitetura do Sistema</a:t>
-            </a:r>
-            <a:endParaRPr lang="pt-BR" dirty="0"/>
-          </a:p>
-        </p:txBody>
-      </p:sp>
-      <p:sp>
-        <p:nvSpPr>
-          <p:cNvPr id="6" name="Content Placeholder 5"/>
-          <p:cNvSpPr>
-            <a:spLocks noGrp="1"/>
-          </p:cNvSpPr>
-          <p:nvPr>
-            <p:ph idx="1"/>
-          </p:nvPr>
-        </p:nvSpPr>
-        <p:spPr/>
-        <p:txBody>
-          <a:bodyPr/>
-          <a:lstStyle/>
-          <a:p>
-            <a:endParaRPr lang="pt-BR" dirty="0"/>
-          </a:p>
-        </p:txBody>
-      </p:sp>
-      <p:sp>
-        <p:nvSpPr>
-          <p:cNvPr id="4" name="Espaço Reservado para Número de Slide 3"/>
-          <p:cNvSpPr>
-            <a:spLocks noGrp="1"/>
-          </p:cNvSpPr>
-          <p:nvPr>
-            <p:ph type="sldNum" sz="quarter" idx="12"/>
-          </p:nvPr>
-        </p:nvSpPr>
-        <p:spPr/>
-        <p:txBody>
-          <a:bodyPr/>
-          <a:lstStyle/>
-          <a:p>
-            <a:fld id="{75B5FC9A-82D6-4ABF-82CF-F56A69AA85D0}" type="slidenum">
-              <a:rPr lang="pt-BR" smtClean="0"/>
-              <a:pPr/>
-              <a:t>20</a:t>
+              <a:t>22</a:t>
             </a:fld>
             <a:endParaRPr lang="pt-BR"/>
           </a:p>
@@ -9572,7 +9829,7 @@
 </p:sld>
 </file>
 
-<file path=ppt/slides/slide21.xml><?xml version="1.0" encoding="utf-8"?>
+<file path=ppt/slides/slide23.xml><?xml version="1.0" encoding="utf-8"?>
 <p:sld xmlns:a="http://schemas.openxmlformats.org/drawingml/2006/main" xmlns:r="http://schemas.openxmlformats.org/officeDocument/2006/relationships" xmlns:p="http://schemas.openxmlformats.org/presentationml/2006/main">
   <p:cSld>
     <p:spTree>
@@ -9612,7 +9869,7 @@
             <a:pPr algn="ctr"/>
             <a:r>
               <a:rPr lang="pt-BR" dirty="0" smtClean="0"/>
-              <a:t>Limitações do Projeto</a:t>
+              <a:t>Cliente (QTCC)</a:t>
             </a:r>
             <a:endParaRPr lang="pt-BR" dirty="0"/>
           </a:p>
@@ -9628,63 +9885,18 @@
             <p:ph idx="1"/>
           </p:nvPr>
         </p:nvSpPr>
-        <p:spPr>
-          <a:xfrm>
-            <a:off x="457200" y="1600201"/>
-            <a:ext cx="8229600" cy="2692896"/>
-          </a:xfrm>
-        </p:spPr>
-        <p:txBody>
-          <a:bodyPr numCol="2"/>
-          <a:lstStyle/>
-          <a:p>
-            <a:pPr algn="l"/>
-            <a:r>
-              <a:rPr lang="pt-BR" dirty="0" smtClean="0"/>
-              <a:t>O que foi implementado:</a:t>
-            </a:r>
-          </a:p>
-          <a:p>
-            <a:pPr lvl="1" algn="l"/>
+        <p:spPr/>
+        <p:txBody>
+          <a:bodyPr/>
+          <a:lstStyle/>
+          <a:p>
             <a:r>
               <a:rPr lang="pt-BR" dirty="0" err="1" smtClean="0"/>
               <a:t>Login</a:t>
             </a:r>
-            <a:endParaRPr lang="pt-BR" dirty="0" smtClean="0"/>
-          </a:p>
-          <a:p>
-            <a:pPr lvl="1" algn="l"/>
             <a:r>
               <a:rPr lang="pt-BR" dirty="0" smtClean="0"/>
-              <a:t>Cadastro</a:t>
-            </a:r>
-          </a:p>
-          <a:p>
-            <a:pPr lvl="1" algn="l"/>
-            <a:r>
-              <a:rPr lang="pt-BR" dirty="0" smtClean="0"/>
-              <a:t>Troca de Mensagens de Texto</a:t>
-            </a:r>
-          </a:p>
-          <a:p>
-            <a:pPr algn="l"/>
-            <a:r>
-              <a:rPr lang="pt-BR" dirty="0" smtClean="0"/>
-              <a:t>O que não foi implementado:</a:t>
-            </a:r>
-          </a:p>
-          <a:p>
-            <a:pPr lvl="1" algn="l"/>
-            <a:r>
-              <a:rPr lang="pt-BR" dirty="0" smtClean="0"/>
-              <a:t>Grupos</a:t>
-            </a:r>
-          </a:p>
-          <a:p>
-            <a:pPr lvl="1" algn="l"/>
-            <a:r>
-              <a:rPr lang="pt-BR" dirty="0" smtClean="0"/>
-              <a:t>Envio de Mídia</a:t>
+              <a:t> de Usuários</a:t>
             </a:r>
             <a:endParaRPr lang="pt-BR" dirty="0"/>
           </a:p>
@@ -9708,188 +9920,7 @@
             <a:fld id="{75B5FC9A-82D6-4ABF-82CF-F56A69AA85D0}" type="slidenum">
               <a:rPr lang="pt-BR" smtClean="0"/>
               <a:pPr/>
-              <a:t>21</a:t>
-            </a:fld>
-            <a:endParaRPr lang="pt-BR"/>
-          </a:p>
-        </p:txBody>
-      </p:sp>
-      <p:sp>
-        <p:nvSpPr>
-          <p:cNvPr id="5" name="TextBox 4"/>
-          <p:cNvSpPr txBox="1"/>
-          <p:nvPr/>
-        </p:nvSpPr>
-        <p:spPr>
-          <a:xfrm>
-            <a:off x="575556" y="4767897"/>
-            <a:ext cx="7992888" cy="1477328"/>
-          </a:xfrm>
-          <a:prstGeom prst="rect">
-            <a:avLst/>
-          </a:prstGeom>
-          <a:noFill/>
-        </p:spPr>
-        <p:txBody>
-          <a:bodyPr wrap="square" rtlCol="0">
-            <a:spAutoFit/>
-          </a:bodyPr>
-          <a:lstStyle/>
-          <a:p>
-            <a:r>
-              <a:rPr lang="pt-BR" sz="3000" dirty="0" smtClean="0"/>
-              <a:t>Plataformas Testadas:</a:t>
-            </a:r>
-          </a:p>
-          <a:p>
-            <a:pPr marL="342900" indent="-342900">
-              <a:buFont typeface="Arial" panose="020B0604020202020204" pitchFamily="34" charset="0"/>
-              <a:buChar char="•"/>
-            </a:pPr>
-            <a:r>
-              <a:rPr lang="pt-BR" sz="2000" dirty="0" smtClean="0"/>
-              <a:t>Windows</a:t>
-            </a:r>
-          </a:p>
-          <a:p>
-            <a:pPr marL="342900" indent="-342900">
-              <a:buFont typeface="Arial" panose="020B0604020202020204" pitchFamily="34" charset="0"/>
-              <a:buChar char="•"/>
-            </a:pPr>
-            <a:r>
-              <a:rPr lang="pt-BR" sz="2000" dirty="0" err="1" smtClean="0"/>
-              <a:t>Android</a:t>
-            </a:r>
-            <a:endParaRPr lang="pt-BR" sz="2000" dirty="0" smtClean="0"/>
-          </a:p>
-          <a:p>
-            <a:pPr marL="342900" indent="-342900">
-              <a:buFont typeface="Arial" panose="020B0604020202020204" pitchFamily="34" charset="0"/>
-              <a:buChar char="•"/>
-            </a:pPr>
-            <a:r>
-              <a:rPr lang="pt-BR" sz="2000" dirty="0" smtClean="0"/>
-              <a:t>Linux</a:t>
-            </a:r>
-            <a:endParaRPr lang="pt-BR" sz="2000" dirty="0"/>
-          </a:p>
-        </p:txBody>
-      </p:sp>
-    </p:spTree>
-    <p:extLst>
-      <p:ext uri="{BB962C8B-B14F-4D97-AF65-F5344CB8AC3E}">
-        <p14:creationId xmlns:p14="http://schemas.microsoft.com/office/powerpoint/2010/main" val="1428006623"/>
-      </p:ext>
-    </p:extLst>
-  </p:cSld>
-  <p:clrMapOvr>
-    <a:masterClrMapping/>
-  </p:clrMapOvr>
-  <p:transition>
-    <p:fade/>
-  </p:transition>
-  <p:timing>
-    <p:tnLst>
-      <p:par>
-        <p:cTn id="1" dur="indefinite" restart="never" nodeType="tmRoot"/>
-      </p:par>
-    </p:tnLst>
-  </p:timing>
-</p:sld>
-</file>
-
-<file path=ppt/slides/slide22.xml><?xml version="1.0" encoding="utf-8"?>
-<p:sld xmlns:a="http://schemas.openxmlformats.org/drawingml/2006/main" xmlns:r="http://schemas.openxmlformats.org/officeDocument/2006/relationships" xmlns:p="http://schemas.openxmlformats.org/presentationml/2006/main">
-  <p:cSld>
-    <p:spTree>
-      <p:nvGrpSpPr>
-        <p:cNvPr id="1" name=""/>
-        <p:cNvGrpSpPr/>
-        <p:nvPr/>
-      </p:nvGrpSpPr>
-      <p:grpSpPr>
-        <a:xfrm>
-          <a:off x="0" y="0"/>
-          <a:ext cx="0" cy="0"/>
-          <a:chOff x="0" y="0"/>
-          <a:chExt cx="0" cy="0"/>
-        </a:xfrm>
-      </p:grpSpPr>
-      <p:sp>
-        <p:nvSpPr>
-          <p:cNvPr id="2" name="Title 1"/>
-          <p:cNvSpPr>
-            <a:spLocks noGrp="1"/>
-          </p:cNvSpPr>
-          <p:nvPr>
-            <p:ph type="title"/>
-          </p:nvPr>
-        </p:nvSpPr>
-        <p:spPr>
-          <a:xfrm>
-            <a:off x="2483768" y="274638"/>
-            <a:ext cx="5328592" cy="1143000"/>
-          </a:xfrm>
-        </p:spPr>
-        <p:txBody>
-          <a:bodyPr/>
-          <a:lstStyle/>
-          <a:p>
-            <a:pPr algn="ctr"/>
-            <a:r>
-              <a:rPr lang="pt-BR" dirty="0" smtClean="0"/>
-              <a:t>Cliente (QTCC)</a:t>
-            </a:r>
-            <a:endParaRPr lang="pt-BR" dirty="0"/>
-          </a:p>
-        </p:txBody>
-      </p:sp>
-      <p:sp>
-        <p:nvSpPr>
-          <p:cNvPr id="3" name="Content Placeholder 2"/>
-          <p:cNvSpPr>
-            <a:spLocks noGrp="1"/>
-          </p:cNvSpPr>
-          <p:nvPr>
-            <p:ph idx="1"/>
-          </p:nvPr>
-        </p:nvSpPr>
-        <p:spPr/>
-        <p:txBody>
-          <a:bodyPr/>
-          <a:lstStyle/>
-          <a:p>
-            <a:r>
-              <a:rPr lang="pt-BR" dirty="0" err="1" smtClean="0"/>
-              <a:t>Login</a:t>
-            </a:r>
-            <a:r>
-              <a:rPr lang="pt-BR" dirty="0" smtClean="0"/>
-              <a:t> de Usuários</a:t>
-            </a:r>
-            <a:endParaRPr lang="pt-BR" dirty="0"/>
-          </a:p>
-        </p:txBody>
-      </p:sp>
-      <p:sp>
-        <p:nvSpPr>
-          <p:cNvPr id="4" name="Slide Number Placeholder 3"/>
-          <p:cNvSpPr>
-            <a:spLocks noGrp="1"/>
-          </p:cNvSpPr>
-          <p:nvPr>
-            <p:ph type="sldNum" sz="quarter" idx="12"/>
-          </p:nvPr>
-        </p:nvSpPr>
-        <p:spPr/>
-        <p:txBody>
-          <a:bodyPr/>
-          <a:lstStyle/>
-          <a:p>
-            <a:fld id="{75B5FC9A-82D6-4ABF-82CF-F56A69AA85D0}" type="slidenum">
-              <a:rPr lang="pt-BR" smtClean="0"/>
-              <a:pPr/>
-              <a:t>22</a:t>
+              <a:t>23</a:t>
             </a:fld>
             <a:endParaRPr lang="pt-BR"/>
           </a:p>
@@ -9942,7 +9973,7 @@
 </p:sld>
 </file>
 
-<file path=ppt/slides/slide23.xml><?xml version="1.0" encoding="utf-8"?>
+<file path=ppt/slides/slide24.xml><?xml version="1.0" encoding="utf-8"?>
 <p:sld xmlns:a="http://schemas.openxmlformats.org/drawingml/2006/main" xmlns:r="http://schemas.openxmlformats.org/officeDocument/2006/relationships" xmlns:p="http://schemas.openxmlformats.org/presentationml/2006/main">
   <p:cSld>
     <p:spTree>
@@ -10041,7 +10072,7 @@
             <a:fld id="{75B5FC9A-82D6-4ABF-82CF-F56A69AA85D0}" type="slidenum">
               <a:rPr lang="pt-BR" smtClean="0"/>
               <a:pPr/>
-              <a:t>23</a:t>
+              <a:t>24</a:t>
             </a:fld>
             <a:endParaRPr lang="pt-BR"/>
           </a:p>
@@ -10094,7 +10125,7 @@
 </p:sld>
 </file>
 
-<file path=ppt/slides/slide24.xml><?xml version="1.0" encoding="utf-8"?>
+<file path=ppt/slides/slide25.xml><?xml version="1.0" encoding="utf-8"?>
 <p:sld xmlns:a="http://schemas.openxmlformats.org/drawingml/2006/main" xmlns:r="http://schemas.openxmlformats.org/officeDocument/2006/relationships" xmlns:p="http://schemas.openxmlformats.org/presentationml/2006/main">
   <p:cSld>
     <p:spTree>
@@ -10181,7 +10212,7 @@
             <a:fld id="{75B5FC9A-82D6-4ABF-82CF-F56A69AA85D0}" type="slidenum">
               <a:rPr lang="pt-BR" smtClean="0"/>
               <a:pPr/>
-              <a:t>24</a:t>
+              <a:t>25</a:t>
             </a:fld>
             <a:endParaRPr lang="pt-BR"/>
           </a:p>
@@ -10234,7 +10265,7 @@
 </p:sld>
 </file>
 
-<file path=ppt/slides/slide25.xml><?xml version="1.0" encoding="utf-8"?>
+<file path=ppt/slides/slide26.xml><?xml version="1.0" encoding="utf-8"?>
 <p:sld xmlns:a="http://schemas.openxmlformats.org/drawingml/2006/main" xmlns:r="http://schemas.openxmlformats.org/officeDocument/2006/relationships" xmlns:p="http://schemas.openxmlformats.org/presentationml/2006/main">
   <p:cSld>
     <p:spTree>
@@ -10304,8 +10335,12 @@
           <a:lstStyle/>
           <a:p>
             <a:r>
+              <a:rPr lang="pt-BR" dirty="0" smtClean="0"/>
+              <a:t>Gerenciar </a:t>
+            </a:r>
+            <a:r>
               <a:rPr lang="pt-BR" dirty="0"/>
-              <a:t>Gerencia o tráfego de </a:t>
+              <a:t>o tráfego de </a:t>
             </a:r>
             <a:r>
               <a:rPr lang="pt-BR" dirty="0" smtClean="0"/>
@@ -10333,7 +10368,7 @@
             <a:fld id="{75B5FC9A-82D6-4ABF-82CF-F56A69AA85D0}" type="slidenum">
               <a:rPr lang="pt-BR" smtClean="0"/>
               <a:pPr/>
-              <a:t>25</a:t>
+              <a:t>26</a:t>
             </a:fld>
             <a:endParaRPr lang="pt-BR"/>
           </a:p>
@@ -10386,7 +10421,7 @@
 </p:sld>
 </file>
 
-<file path=ppt/slides/slide26.xml><?xml version="1.0" encoding="utf-8"?>
+<file path=ppt/slides/slide27.xml><?xml version="1.0" encoding="utf-8"?>
 <p:sld xmlns:a="http://schemas.openxmlformats.org/drawingml/2006/main" xmlns:r="http://schemas.openxmlformats.org/officeDocument/2006/relationships" xmlns:p="http://schemas.openxmlformats.org/presentationml/2006/main">
   <p:cSld>
     <p:spTree>
@@ -10485,7 +10520,7 @@
             <a:fld id="{75B5FC9A-82D6-4ABF-82CF-F56A69AA85D0}" type="slidenum">
               <a:rPr lang="pt-BR" smtClean="0"/>
               <a:pPr/>
-              <a:t>26</a:t>
+              <a:t>27</a:t>
             </a:fld>
             <a:endParaRPr lang="pt-BR"/>
           </a:p>
@@ -10538,7 +10573,7 @@
 </p:sld>
 </file>
 
-<file path=ppt/slides/slide27.xml><?xml version="1.0" encoding="utf-8"?>
+<file path=ppt/slides/slide28.xml><?xml version="1.0" encoding="utf-8"?>
 <p:sld xmlns:a="http://schemas.openxmlformats.org/drawingml/2006/main" xmlns:r="http://schemas.openxmlformats.org/officeDocument/2006/relationships" xmlns:p="http://schemas.openxmlformats.org/presentationml/2006/main">
   <p:cSld>
     <p:spTree>
@@ -10637,7 +10672,7 @@
             <a:fld id="{75B5FC9A-82D6-4ABF-82CF-F56A69AA85D0}" type="slidenum">
               <a:rPr lang="pt-BR" smtClean="0"/>
               <a:pPr/>
-              <a:t>27</a:t>
+              <a:t>28</a:t>
             </a:fld>
             <a:endParaRPr lang="pt-BR"/>
           </a:p>
@@ -10690,7 +10725,7 @@
 </p:sld>
 </file>
 
-<file path=ppt/slides/slide28.xml><?xml version="1.0" encoding="utf-8"?>
+<file path=ppt/slides/slide29.xml><?xml version="1.0" encoding="utf-8"?>
 <p:sld xmlns:a="http://schemas.openxmlformats.org/drawingml/2006/main" xmlns:r="http://schemas.openxmlformats.org/officeDocument/2006/relationships" xmlns:p="http://schemas.openxmlformats.org/presentationml/2006/main">
   <p:cSld>
     <p:spTree>
@@ -10709,7 +10744,7 @@
       </p:grpSpPr>
       <p:sp>
         <p:nvSpPr>
-          <p:cNvPr id="2" name="Título 1"/>
+          <p:cNvPr id="2" name="Title 1"/>
           <p:cNvSpPr>
             <a:spLocks noGrp="1"/>
           </p:cNvSpPr>
@@ -10730,6 +10765,671 @@
             <a:pPr algn="ctr"/>
             <a:r>
               <a:rPr lang="pt-BR" dirty="0" smtClean="0"/>
+              <a:t>Limitações do Projeto</a:t>
+            </a:r>
+            <a:endParaRPr lang="pt-BR" dirty="0"/>
+          </a:p>
+        </p:txBody>
+      </p:sp>
+      <p:sp>
+        <p:nvSpPr>
+          <p:cNvPr id="3" name="Content Placeholder 2"/>
+          <p:cNvSpPr>
+            <a:spLocks noGrp="1"/>
+          </p:cNvSpPr>
+          <p:nvPr>
+            <p:ph idx="1"/>
+          </p:nvPr>
+        </p:nvSpPr>
+        <p:spPr>
+          <a:xfrm>
+            <a:off x="457200" y="1600201"/>
+            <a:ext cx="8229600" cy="2692896"/>
+          </a:xfrm>
+        </p:spPr>
+        <p:txBody>
+          <a:bodyPr numCol="2"/>
+          <a:lstStyle/>
+          <a:p>
+            <a:pPr algn="l"/>
+            <a:r>
+              <a:rPr lang="pt-BR" dirty="0" smtClean="0"/>
+              <a:t>O que foi implementado:</a:t>
+            </a:r>
+          </a:p>
+          <a:p>
+            <a:pPr lvl="1" algn="l"/>
+            <a:r>
+              <a:rPr lang="pt-BR" dirty="0" err="1" smtClean="0"/>
+              <a:t>Login</a:t>
+            </a:r>
+            <a:endParaRPr lang="pt-BR" dirty="0" smtClean="0"/>
+          </a:p>
+          <a:p>
+            <a:pPr lvl="1" algn="l"/>
+            <a:r>
+              <a:rPr lang="pt-BR" dirty="0" smtClean="0"/>
+              <a:t>Cadastro</a:t>
+            </a:r>
+          </a:p>
+          <a:p>
+            <a:pPr lvl="1" algn="l"/>
+            <a:r>
+              <a:rPr lang="pt-BR" dirty="0" smtClean="0"/>
+              <a:t>Troca de Mensagens de Texto</a:t>
+            </a:r>
+          </a:p>
+          <a:p>
+            <a:pPr algn="l"/>
+            <a:r>
+              <a:rPr lang="pt-BR" dirty="0" smtClean="0"/>
+              <a:t>O que não foi implementado:</a:t>
+            </a:r>
+          </a:p>
+          <a:p>
+            <a:pPr lvl="1" algn="l"/>
+            <a:r>
+              <a:rPr lang="pt-BR" dirty="0" smtClean="0"/>
+              <a:t>Grupos</a:t>
+            </a:r>
+          </a:p>
+          <a:p>
+            <a:pPr lvl="1" algn="l"/>
+            <a:r>
+              <a:rPr lang="pt-BR" dirty="0" smtClean="0"/>
+              <a:t>Envio de Mídia</a:t>
+            </a:r>
+            <a:endParaRPr lang="pt-BR" dirty="0"/>
+          </a:p>
+        </p:txBody>
+      </p:sp>
+      <p:sp>
+        <p:nvSpPr>
+          <p:cNvPr id="4" name="Slide Number Placeholder 3"/>
+          <p:cNvSpPr>
+            <a:spLocks noGrp="1"/>
+          </p:cNvSpPr>
+          <p:nvPr>
+            <p:ph type="sldNum" sz="quarter" idx="12"/>
+          </p:nvPr>
+        </p:nvSpPr>
+        <p:spPr/>
+        <p:txBody>
+          <a:bodyPr/>
+          <a:lstStyle/>
+          <a:p>
+            <a:fld id="{75B5FC9A-82D6-4ABF-82CF-F56A69AA85D0}" type="slidenum">
+              <a:rPr lang="pt-BR" smtClean="0"/>
+              <a:pPr/>
+              <a:t>29</a:t>
+            </a:fld>
+            <a:endParaRPr lang="pt-BR"/>
+          </a:p>
+        </p:txBody>
+      </p:sp>
+      <p:sp>
+        <p:nvSpPr>
+          <p:cNvPr id="5" name="TextBox 4"/>
+          <p:cNvSpPr txBox="1"/>
+          <p:nvPr/>
+        </p:nvSpPr>
+        <p:spPr>
+          <a:xfrm>
+            <a:off x="575556" y="4767897"/>
+            <a:ext cx="7992888" cy="1477328"/>
+          </a:xfrm>
+          <a:prstGeom prst="rect">
+            <a:avLst/>
+          </a:prstGeom>
+          <a:noFill/>
+        </p:spPr>
+        <p:txBody>
+          <a:bodyPr wrap="square" rtlCol="0">
+            <a:spAutoFit/>
+          </a:bodyPr>
+          <a:lstStyle/>
+          <a:p>
+            <a:r>
+              <a:rPr lang="pt-BR" sz="3000" dirty="0" smtClean="0"/>
+              <a:t>Plataformas Testadas:</a:t>
+            </a:r>
+          </a:p>
+          <a:p>
+            <a:pPr marL="342900" indent="-342900">
+              <a:buFont typeface="Arial" panose="020B0604020202020204" pitchFamily="34" charset="0"/>
+              <a:buChar char="•"/>
+            </a:pPr>
+            <a:r>
+              <a:rPr lang="pt-BR" sz="2000" dirty="0" smtClean="0"/>
+              <a:t>Windows</a:t>
+            </a:r>
+          </a:p>
+          <a:p>
+            <a:pPr marL="342900" indent="-342900">
+              <a:buFont typeface="Arial" panose="020B0604020202020204" pitchFamily="34" charset="0"/>
+              <a:buChar char="•"/>
+            </a:pPr>
+            <a:r>
+              <a:rPr lang="pt-BR" sz="2000" dirty="0" err="1" smtClean="0"/>
+              <a:t>Android</a:t>
+            </a:r>
+            <a:endParaRPr lang="pt-BR" sz="2000" dirty="0" smtClean="0"/>
+          </a:p>
+          <a:p>
+            <a:pPr marL="342900" indent="-342900">
+              <a:buFont typeface="Arial" panose="020B0604020202020204" pitchFamily="34" charset="0"/>
+              <a:buChar char="•"/>
+            </a:pPr>
+            <a:r>
+              <a:rPr lang="pt-BR" sz="2000" dirty="0" smtClean="0"/>
+              <a:t>Linux</a:t>
+            </a:r>
+            <a:endParaRPr lang="pt-BR" sz="2000" dirty="0"/>
+          </a:p>
+        </p:txBody>
+      </p:sp>
+    </p:spTree>
+    <p:extLst>
+      <p:ext uri="{BB962C8B-B14F-4D97-AF65-F5344CB8AC3E}">
+        <p14:creationId xmlns:p14="http://schemas.microsoft.com/office/powerpoint/2010/main" val="1428006623"/>
+      </p:ext>
+    </p:extLst>
+  </p:cSld>
+  <p:clrMapOvr>
+    <a:masterClrMapping/>
+  </p:clrMapOvr>
+  <p:transition>
+    <p:fade/>
+  </p:transition>
+  <p:timing>
+    <p:tnLst>
+      <p:par>
+        <p:cTn id="1" dur="indefinite" restart="never" nodeType="tmRoot"/>
+      </p:par>
+    </p:tnLst>
+  </p:timing>
+</p:sld>
+</file>
+
+<file path=ppt/slides/slide3.xml><?xml version="1.0" encoding="utf-8"?>
+<p:sld xmlns:a="http://schemas.openxmlformats.org/drawingml/2006/main" xmlns:r="http://schemas.openxmlformats.org/officeDocument/2006/relationships" xmlns:p="http://schemas.openxmlformats.org/presentationml/2006/main">
+  <p:cSld>
+    <p:spTree>
+      <p:nvGrpSpPr>
+        <p:cNvPr id="1" name=""/>
+        <p:cNvGrpSpPr/>
+        <p:nvPr/>
+      </p:nvGrpSpPr>
+      <p:grpSpPr>
+        <a:xfrm>
+          <a:off x="0" y="0"/>
+          <a:ext cx="0" cy="0"/>
+          <a:chOff x="0" y="0"/>
+          <a:chExt cx="0" cy="0"/>
+        </a:xfrm>
+      </p:grpSpPr>
+      <p:sp>
+        <p:nvSpPr>
+          <p:cNvPr id="2" name="Título 1"/>
+          <p:cNvSpPr>
+            <a:spLocks noGrp="1"/>
+          </p:cNvSpPr>
+          <p:nvPr>
+            <p:ph type="title"/>
+          </p:nvPr>
+        </p:nvSpPr>
+        <p:spPr>
+          <a:xfrm>
+            <a:off x="2483768" y="274638"/>
+            <a:ext cx="5330670" cy="1143000"/>
+          </a:xfrm>
+        </p:spPr>
+        <p:txBody>
+          <a:bodyPr/>
+          <a:lstStyle/>
+          <a:p>
+            <a:pPr algn="ctr"/>
+            <a:r>
+              <a:rPr lang="pt-BR" dirty="0" smtClean="0"/>
+              <a:t>Introdução</a:t>
+            </a:r>
+            <a:endParaRPr lang="pt-BR" dirty="0"/>
+          </a:p>
+        </p:txBody>
+      </p:sp>
+      <p:sp>
+        <p:nvSpPr>
+          <p:cNvPr id="3" name="Espaço Reservado para Conteúdo 2"/>
+          <p:cNvSpPr>
+            <a:spLocks noGrp="1"/>
+          </p:cNvSpPr>
+          <p:nvPr>
+            <p:ph idx="1"/>
+          </p:nvPr>
+        </p:nvSpPr>
+        <p:spPr>
+          <a:xfrm>
+            <a:off x="457200" y="1600200"/>
+            <a:ext cx="8229600" cy="4493095"/>
+          </a:xfrm>
+        </p:spPr>
+        <p:txBody>
+          <a:bodyPr/>
+          <a:lstStyle/>
+          <a:p>
+            <a:pPr marL="0" indent="0">
+              <a:buNone/>
+            </a:pPr>
+            <a:r>
+              <a:rPr lang="pt-BR" dirty="0" smtClean="0"/>
+              <a:t>Cenário atual:</a:t>
+            </a:r>
+          </a:p>
+        </p:txBody>
+      </p:sp>
+      <p:sp>
+        <p:nvSpPr>
+          <p:cNvPr id="5" name="Espaço Reservado para Número de Slide 4"/>
+          <p:cNvSpPr>
+            <a:spLocks noGrp="1"/>
+          </p:cNvSpPr>
+          <p:nvPr>
+            <p:ph type="sldNum" sz="quarter" idx="12"/>
+          </p:nvPr>
+        </p:nvSpPr>
+        <p:spPr/>
+        <p:txBody>
+          <a:bodyPr/>
+          <a:lstStyle/>
+          <a:p>
+            <a:fld id="{75B5FC9A-82D6-4ABF-82CF-F56A69AA85D0}" type="slidenum">
+              <a:rPr lang="pt-BR" smtClean="0"/>
+              <a:pPr/>
+              <a:t>3</a:t>
+            </a:fld>
+            <a:endParaRPr lang="pt-BR"/>
+          </a:p>
+        </p:txBody>
+      </p:sp>
+      <p:pic>
+        <p:nvPicPr>
+          <p:cNvPr id="4" name="Picture 3"/>
+          <p:cNvPicPr>
+            <a:picLocks noChangeAspect="1"/>
+          </p:cNvPicPr>
+          <p:nvPr/>
+        </p:nvPicPr>
+        <p:blipFill>
+          <a:blip r:embed="rId3"/>
+          <a:stretch>
+            <a:fillRect/>
+          </a:stretch>
+        </p:blipFill>
+        <p:spPr>
+          <a:xfrm>
+            <a:off x="1329561" y="2261245"/>
+            <a:ext cx="6484877" cy="3802996"/>
+          </a:xfrm>
+          <a:prstGeom prst="rect">
+            <a:avLst/>
+          </a:prstGeom>
+        </p:spPr>
+      </p:pic>
+    </p:spTree>
+    <p:extLst>
+      <p:ext uri="{BB962C8B-B14F-4D97-AF65-F5344CB8AC3E}">
+        <p14:creationId xmlns:p14="http://schemas.microsoft.com/office/powerpoint/2010/main" val="4246874667"/>
+      </p:ext>
+    </p:extLst>
+  </p:cSld>
+  <p:clrMapOvr>
+    <a:masterClrMapping/>
+  </p:clrMapOvr>
+  <p:transition>
+    <p:fade/>
+  </p:transition>
+  <p:timing>
+    <p:tnLst>
+      <p:par>
+        <p:cTn id="1" dur="indefinite" restart="never" nodeType="tmRoot"/>
+      </p:par>
+    </p:tnLst>
+  </p:timing>
+</p:sld>
+</file>
+
+<file path=ppt/slides/slide30.xml><?xml version="1.0" encoding="utf-8"?>
+<p:sld xmlns:a="http://schemas.openxmlformats.org/drawingml/2006/main" xmlns:r="http://schemas.openxmlformats.org/officeDocument/2006/relationships" xmlns:p="http://schemas.openxmlformats.org/presentationml/2006/main">
+  <p:cSld>
+    <p:spTree>
+      <p:nvGrpSpPr>
+        <p:cNvPr id="1" name=""/>
+        <p:cNvGrpSpPr/>
+        <p:nvPr/>
+      </p:nvGrpSpPr>
+      <p:grpSpPr>
+        <a:xfrm>
+          <a:off x="0" y="0"/>
+          <a:ext cx="0" cy="0"/>
+          <a:chOff x="0" y="0"/>
+          <a:chExt cx="0" cy="0"/>
+        </a:xfrm>
+      </p:grpSpPr>
+      <p:sp>
+        <p:nvSpPr>
+          <p:cNvPr id="2" name="Title 1"/>
+          <p:cNvSpPr>
+            <a:spLocks noGrp="1"/>
+          </p:cNvSpPr>
+          <p:nvPr>
+            <p:ph type="title"/>
+          </p:nvPr>
+        </p:nvSpPr>
+        <p:spPr>
+          <a:xfrm>
+            <a:off x="2483768" y="274638"/>
+            <a:ext cx="5328592" cy="1143000"/>
+          </a:xfrm>
+        </p:spPr>
+        <p:txBody>
+          <a:bodyPr/>
+          <a:lstStyle/>
+          <a:p>
+            <a:pPr algn="ctr"/>
+            <a:r>
+              <a:rPr lang="pt-BR" dirty="0" smtClean="0"/>
+              <a:t>Comunicação por Rede</a:t>
+            </a:r>
+            <a:endParaRPr lang="pt-BR" dirty="0"/>
+          </a:p>
+        </p:txBody>
+      </p:sp>
+      <p:sp>
+        <p:nvSpPr>
+          <p:cNvPr id="3" name="Content Placeholder 2"/>
+          <p:cNvSpPr>
+            <a:spLocks noGrp="1"/>
+          </p:cNvSpPr>
+          <p:nvPr>
+            <p:ph idx="1"/>
+          </p:nvPr>
+        </p:nvSpPr>
+        <p:spPr/>
+        <p:txBody>
+          <a:bodyPr/>
+          <a:lstStyle/>
+          <a:p>
+            <a:endParaRPr lang="pt-BR" dirty="0" smtClean="0"/>
+          </a:p>
+          <a:p>
+            <a:r>
+              <a:rPr lang="pt-BR" dirty="0" smtClean="0"/>
+              <a:t>Utilizado protocolo TCP/IP</a:t>
+            </a:r>
+          </a:p>
+          <a:p>
+            <a:endParaRPr lang="pt-BR" dirty="0"/>
+          </a:p>
+          <a:p>
+            <a:r>
+              <a:rPr lang="pt-BR" dirty="0" smtClean="0"/>
+              <a:t>Comunicação realizada por </a:t>
+            </a:r>
+            <a:r>
+              <a:rPr lang="pt-BR" i="1" dirty="0" smtClean="0"/>
+              <a:t>sockets</a:t>
+            </a:r>
+            <a:endParaRPr lang="pt-BR" dirty="0" smtClean="0"/>
+          </a:p>
+          <a:p>
+            <a:endParaRPr lang="pt-BR" dirty="0" smtClean="0"/>
+          </a:p>
+          <a:p>
+            <a:r>
+              <a:rPr lang="pt-BR" dirty="0" smtClean="0"/>
+              <a:t>Garantia de envio e recebimento</a:t>
+            </a:r>
+          </a:p>
+        </p:txBody>
+      </p:sp>
+      <p:sp>
+        <p:nvSpPr>
+          <p:cNvPr id="4" name="Slide Number Placeholder 3"/>
+          <p:cNvSpPr>
+            <a:spLocks noGrp="1"/>
+          </p:cNvSpPr>
+          <p:nvPr>
+            <p:ph type="sldNum" sz="quarter" idx="12"/>
+          </p:nvPr>
+        </p:nvSpPr>
+        <p:spPr/>
+        <p:txBody>
+          <a:bodyPr/>
+          <a:lstStyle/>
+          <a:p>
+            <a:fld id="{75B5FC9A-82D6-4ABF-82CF-F56A69AA85D0}" type="slidenum">
+              <a:rPr lang="pt-BR" smtClean="0"/>
+              <a:pPr/>
+              <a:t>30</a:t>
+            </a:fld>
+            <a:endParaRPr lang="pt-BR"/>
+          </a:p>
+        </p:txBody>
+      </p:sp>
+    </p:spTree>
+    <p:extLst>
+      <p:ext uri="{BB962C8B-B14F-4D97-AF65-F5344CB8AC3E}">
+        <p14:creationId xmlns:p14="http://schemas.microsoft.com/office/powerpoint/2010/main" val="1104737531"/>
+      </p:ext>
+    </p:extLst>
+  </p:cSld>
+  <p:clrMapOvr>
+    <a:masterClrMapping/>
+  </p:clrMapOvr>
+  <p:transition>
+    <p:fade/>
+  </p:transition>
+</p:sld>
+</file>
+
+<file path=ppt/slides/slide31.xml><?xml version="1.0" encoding="utf-8"?>
+<p:sld xmlns:a="http://schemas.openxmlformats.org/drawingml/2006/main" xmlns:r="http://schemas.openxmlformats.org/officeDocument/2006/relationships" xmlns:p="http://schemas.openxmlformats.org/presentationml/2006/main">
+  <p:cSld>
+    <p:spTree>
+      <p:nvGrpSpPr>
+        <p:cNvPr id="1" name=""/>
+        <p:cNvGrpSpPr/>
+        <p:nvPr/>
+      </p:nvGrpSpPr>
+      <p:grpSpPr>
+        <a:xfrm>
+          <a:off x="0" y="0"/>
+          <a:ext cx="0" cy="0"/>
+          <a:chOff x="0" y="0"/>
+          <a:chExt cx="0" cy="0"/>
+        </a:xfrm>
+      </p:grpSpPr>
+      <p:sp>
+        <p:nvSpPr>
+          <p:cNvPr id="2" name="Title 1"/>
+          <p:cNvSpPr>
+            <a:spLocks noGrp="1"/>
+          </p:cNvSpPr>
+          <p:nvPr>
+            <p:ph type="title"/>
+          </p:nvPr>
+        </p:nvSpPr>
+        <p:spPr>
+          <a:xfrm>
+            <a:off x="2483768" y="274638"/>
+            <a:ext cx="5328592" cy="1143000"/>
+          </a:xfrm>
+        </p:spPr>
+        <p:txBody>
+          <a:bodyPr/>
+          <a:lstStyle/>
+          <a:p>
+            <a:pPr algn="ctr"/>
+            <a:r>
+              <a:rPr lang="pt-BR" dirty="0" smtClean="0"/>
+              <a:t>Serialização JSON</a:t>
+            </a:r>
+            <a:endParaRPr lang="pt-BR" dirty="0"/>
+          </a:p>
+        </p:txBody>
+      </p:sp>
+      <p:sp>
+        <p:nvSpPr>
+          <p:cNvPr id="3" name="Content Placeholder 2"/>
+          <p:cNvSpPr>
+            <a:spLocks noGrp="1"/>
+          </p:cNvSpPr>
+          <p:nvPr>
+            <p:ph idx="1"/>
+          </p:nvPr>
+        </p:nvSpPr>
+        <p:spPr>
+          <a:xfrm>
+            <a:off x="457200" y="1600200"/>
+            <a:ext cx="5679306" cy="4525963"/>
+          </a:xfrm>
+        </p:spPr>
+        <p:txBody>
+          <a:bodyPr/>
+          <a:lstStyle/>
+          <a:p>
+            <a:r>
+              <a:rPr lang="pt-BR" dirty="0" smtClean="0"/>
+              <a:t>Formato de envio de dados</a:t>
+            </a:r>
+          </a:p>
+          <a:p>
+            <a:r>
+              <a:rPr lang="pt-BR" dirty="0" smtClean="0"/>
+              <a:t>Substitui o XML</a:t>
+            </a:r>
+          </a:p>
+          <a:p>
+            <a:endParaRPr lang="pt-BR" dirty="0"/>
+          </a:p>
+          <a:p>
+            <a:r>
+              <a:rPr lang="pt-BR" dirty="0" smtClean="0"/>
+              <a:t>Utilizado no envio de pacotes via rede</a:t>
+            </a:r>
+          </a:p>
+        </p:txBody>
+      </p:sp>
+      <p:sp>
+        <p:nvSpPr>
+          <p:cNvPr id="4" name="Slide Number Placeholder 3"/>
+          <p:cNvSpPr>
+            <a:spLocks noGrp="1"/>
+          </p:cNvSpPr>
+          <p:nvPr>
+            <p:ph type="sldNum" sz="quarter" idx="12"/>
+          </p:nvPr>
+        </p:nvSpPr>
+        <p:spPr/>
+        <p:txBody>
+          <a:bodyPr/>
+          <a:lstStyle/>
+          <a:p>
+            <a:fld id="{75B5FC9A-82D6-4ABF-82CF-F56A69AA85D0}" type="slidenum">
+              <a:rPr lang="pt-BR" smtClean="0"/>
+              <a:pPr/>
+              <a:t>31</a:t>
+            </a:fld>
+            <a:endParaRPr lang="pt-BR"/>
+          </a:p>
+        </p:txBody>
+      </p:sp>
+      <p:pic>
+        <p:nvPicPr>
+          <p:cNvPr id="6" name="Picture 5"/>
+          <p:cNvPicPr>
+            <a:picLocks noChangeAspect="1"/>
+          </p:cNvPicPr>
+          <p:nvPr/>
+        </p:nvPicPr>
+        <p:blipFill>
+          <a:blip r:embed="rId2" cstate="print">
+            <a:extLst>
+              <a:ext uri="{28A0092B-C50C-407E-A947-70E740481C1C}">
+                <a14:useLocalDpi xmlns:a14="http://schemas.microsoft.com/office/drawing/2010/main" val="0"/>
+              </a:ext>
+            </a:extLst>
+          </a:blip>
+          <a:stretch>
+            <a:fillRect/>
+          </a:stretch>
+        </p:blipFill>
+        <p:spPr>
+          <a:xfrm>
+            <a:off x="6136506" y="3575869"/>
+            <a:ext cx="2550294" cy="2550294"/>
+          </a:xfrm>
+          <a:prstGeom prst="rect">
+            <a:avLst/>
+          </a:prstGeom>
+        </p:spPr>
+      </p:pic>
+    </p:spTree>
+    <p:extLst>
+      <p:ext uri="{BB962C8B-B14F-4D97-AF65-F5344CB8AC3E}">
+        <p14:creationId xmlns:p14="http://schemas.microsoft.com/office/powerpoint/2010/main" val="2287436108"/>
+      </p:ext>
+    </p:extLst>
+  </p:cSld>
+  <p:clrMapOvr>
+    <a:masterClrMapping/>
+  </p:clrMapOvr>
+  <p:transition>
+    <p:fade/>
+  </p:transition>
+</p:sld>
+</file>
+
+<file path=ppt/slides/slide32.xml><?xml version="1.0" encoding="utf-8"?>
+<p:sld xmlns:a="http://schemas.openxmlformats.org/drawingml/2006/main" xmlns:r="http://schemas.openxmlformats.org/officeDocument/2006/relationships" xmlns:p="http://schemas.openxmlformats.org/presentationml/2006/main">
+  <p:cSld>
+    <p:spTree>
+      <p:nvGrpSpPr>
+        <p:cNvPr id="1" name=""/>
+        <p:cNvGrpSpPr/>
+        <p:nvPr/>
+      </p:nvGrpSpPr>
+      <p:grpSpPr>
+        <a:xfrm>
+          <a:off x="0" y="0"/>
+          <a:ext cx="0" cy="0"/>
+          <a:chOff x="0" y="0"/>
+          <a:chExt cx="0" cy="0"/>
+        </a:xfrm>
+      </p:grpSpPr>
+      <p:sp>
+        <p:nvSpPr>
+          <p:cNvPr id="2" name="Título 1"/>
+          <p:cNvSpPr>
+            <a:spLocks noGrp="1"/>
+          </p:cNvSpPr>
+          <p:nvPr>
+            <p:ph type="title"/>
+          </p:nvPr>
+        </p:nvSpPr>
+        <p:spPr>
+          <a:xfrm>
+            <a:off x="2483768" y="274638"/>
+            <a:ext cx="5328592" cy="1143000"/>
+          </a:xfrm>
+        </p:spPr>
+        <p:txBody>
+          <a:bodyPr/>
+          <a:lstStyle/>
+          <a:p>
+            <a:pPr algn="ctr"/>
+            <a:r>
+              <a:rPr lang="pt-BR" dirty="0" smtClean="0"/>
               <a:t>Tecnologias Utilizadas</a:t>
             </a:r>
             <a:endParaRPr lang="pt-BR" dirty="0"/>
@@ -10782,7 +11482,7 @@
             <a:fld id="{75B5FC9A-82D6-4ABF-82CF-F56A69AA85D0}" type="slidenum">
               <a:rPr lang="pt-BR" smtClean="0"/>
               <a:pPr/>
-              <a:t>28</a:t>
+              <a:t>32</a:t>
             </a:fld>
             <a:endParaRPr lang="pt-BR"/>
           </a:p>
@@ -11302,7 +12002,7 @@
 </p:sld>
 </file>
 
-<file path=ppt/slides/slide29.xml><?xml version="1.0" encoding="utf-8"?>
+<file path=ppt/slides/slide33.xml><?xml version="1.0" encoding="utf-8"?>
 <p:sld xmlns:a="http://schemas.openxmlformats.org/drawingml/2006/main" xmlns:r="http://schemas.openxmlformats.org/officeDocument/2006/relationships" xmlns:p="http://schemas.openxmlformats.org/presentationml/2006/main">
   <p:cSld>
     <p:spTree>
@@ -11395,7 +12095,7 @@
             <a:fld id="{75B5FC9A-82D6-4ABF-82CF-F56A69AA85D0}" type="slidenum">
               <a:rPr lang="pt-BR" smtClean="0"/>
               <a:pPr/>
-              <a:t>29</a:t>
+              <a:t>33</a:t>
             </a:fld>
             <a:endParaRPr lang="pt-BR"/>
           </a:p>
@@ -11898,7 +12598,7 @@
 </p:sld>
 </file>
 
-<file path=ppt/slides/slide3.xml><?xml version="1.0" encoding="utf-8"?>
+<file path=ppt/slides/slide34.xml><?xml version="1.0" encoding="utf-8"?>
 <p:sld xmlns:a="http://schemas.openxmlformats.org/drawingml/2006/main" xmlns:r="http://schemas.openxmlformats.org/officeDocument/2006/relationships" xmlns:p="http://schemas.openxmlformats.org/presentationml/2006/main">
   <p:cSld>
     <p:spTree>
@@ -11928,7 +12628,7 @@
         <p:spPr>
           <a:xfrm>
             <a:off x="2483768" y="274638"/>
-            <a:ext cx="5330670" cy="1143000"/>
+            <a:ext cx="5328592" cy="1143000"/>
           </a:xfrm>
         </p:spPr>
         <p:txBody>
@@ -11938,7 +12638,7 @@
             <a:pPr algn="ctr"/>
             <a:r>
               <a:rPr lang="pt-BR" dirty="0" smtClean="0"/>
-              <a:t>Introdução</a:t>
+              <a:t>Conclusão</a:t>
             </a:r>
             <a:endParaRPr lang="pt-BR" dirty="0"/>
           </a:p>
@@ -11954,29 +12654,44 @@
             <p:ph idx="1"/>
           </p:nvPr>
         </p:nvSpPr>
-        <p:spPr>
-          <a:xfrm>
-            <a:off x="457200" y="1600200"/>
-            <a:ext cx="8229600" cy="4493095"/>
-          </a:xfrm>
-        </p:spPr>
-        <p:txBody>
-          <a:bodyPr/>
-          <a:lstStyle/>
-          <a:p>
-            <a:pPr marL="0" indent="0">
-              <a:buNone/>
-            </a:pPr>
+        <p:spPr/>
+        <p:txBody>
+          <a:bodyPr/>
+          <a:lstStyle/>
+          <a:p>
             <a:r>
               <a:rPr lang="pt-BR" dirty="0" smtClean="0"/>
-              <a:t>Cenário atual:</a:t>
-            </a:r>
-          </a:p>
-        </p:txBody>
-      </p:sp>
-      <p:sp>
-        <p:nvSpPr>
-          <p:cNvPr id="5" name="Espaço Reservado para Número de Slide 4"/>
+              <a:t>O desenvolvimento </a:t>
+            </a:r>
+            <a:r>
+              <a:rPr lang="pt-BR" dirty="0" err="1" smtClean="0"/>
+              <a:t>multiplataforma</a:t>
+            </a:r>
+            <a:r>
+              <a:rPr lang="pt-BR" dirty="0" smtClean="0"/>
+              <a:t> utilizando Qt é viável.</a:t>
+            </a:r>
+          </a:p>
+          <a:p>
+            <a:r>
+              <a:rPr lang="pt-BR" dirty="0" err="1" smtClean="0"/>
+              <a:t>Refatoração</a:t>
+            </a:r>
+            <a:r>
+              <a:rPr lang="pt-BR" dirty="0" smtClean="0"/>
+              <a:t> próxima </a:t>
+            </a:r>
+            <a:r>
+              <a:rPr lang="pt-BR" smtClean="0"/>
+              <a:t>de zero.</a:t>
+            </a:r>
+            <a:endParaRPr lang="pt-BR" dirty="0"/>
+          </a:p>
+        </p:txBody>
+      </p:sp>
+      <p:sp>
+        <p:nvSpPr>
+          <p:cNvPr id="4" name="Espaço Reservado para Número de Slide 3"/>
           <p:cNvSpPr>
             <a:spLocks noGrp="1"/>
           </p:cNvSpPr>
@@ -11992,169 +12707,7 @@
             <a:fld id="{75B5FC9A-82D6-4ABF-82CF-F56A69AA85D0}" type="slidenum">
               <a:rPr lang="pt-BR" smtClean="0"/>
               <a:pPr/>
-              <a:t>3</a:t>
-            </a:fld>
-            <a:endParaRPr lang="pt-BR"/>
-          </a:p>
-        </p:txBody>
-      </p:sp>
-      <p:pic>
-        <p:nvPicPr>
-          <p:cNvPr id="4" name="Picture 3"/>
-          <p:cNvPicPr>
-            <a:picLocks noChangeAspect="1"/>
-          </p:cNvPicPr>
-          <p:nvPr/>
-        </p:nvPicPr>
-        <p:blipFill>
-          <a:blip r:embed="rId3"/>
-          <a:stretch>
-            <a:fillRect/>
-          </a:stretch>
-        </p:blipFill>
-        <p:spPr>
-          <a:xfrm>
-            <a:off x="1329561" y="2261245"/>
-            <a:ext cx="6484877" cy="3802996"/>
-          </a:xfrm>
-          <a:prstGeom prst="rect">
-            <a:avLst/>
-          </a:prstGeom>
-        </p:spPr>
-      </p:pic>
-    </p:spTree>
-    <p:extLst>
-      <p:ext uri="{BB962C8B-B14F-4D97-AF65-F5344CB8AC3E}">
-        <p14:creationId xmlns:p14="http://schemas.microsoft.com/office/powerpoint/2010/main" val="4246874667"/>
-      </p:ext>
-    </p:extLst>
-  </p:cSld>
-  <p:clrMapOvr>
-    <a:masterClrMapping/>
-  </p:clrMapOvr>
-  <p:transition>
-    <p:fade/>
-  </p:transition>
-  <p:timing>
-    <p:tnLst>
-      <p:par>
-        <p:cTn id="1" dur="indefinite" restart="never" nodeType="tmRoot"/>
-      </p:par>
-    </p:tnLst>
-  </p:timing>
-</p:sld>
-</file>
-
-<file path=ppt/slides/slide30.xml><?xml version="1.0" encoding="utf-8"?>
-<p:sld xmlns:a="http://schemas.openxmlformats.org/drawingml/2006/main" xmlns:r="http://schemas.openxmlformats.org/officeDocument/2006/relationships" xmlns:p="http://schemas.openxmlformats.org/presentationml/2006/main">
-  <p:cSld>
-    <p:spTree>
-      <p:nvGrpSpPr>
-        <p:cNvPr id="1" name=""/>
-        <p:cNvGrpSpPr/>
-        <p:nvPr/>
-      </p:nvGrpSpPr>
-      <p:grpSpPr>
-        <a:xfrm>
-          <a:off x="0" y="0"/>
-          <a:ext cx="0" cy="0"/>
-          <a:chOff x="0" y="0"/>
-          <a:chExt cx="0" cy="0"/>
-        </a:xfrm>
-      </p:grpSpPr>
-      <p:sp>
-        <p:nvSpPr>
-          <p:cNvPr id="2" name="Título 1"/>
-          <p:cNvSpPr>
-            <a:spLocks noGrp="1"/>
-          </p:cNvSpPr>
-          <p:nvPr>
-            <p:ph type="title"/>
-          </p:nvPr>
-        </p:nvSpPr>
-        <p:spPr>
-          <a:xfrm>
-            <a:off x="2483768" y="274638"/>
-            <a:ext cx="5328592" cy="1143000"/>
-          </a:xfrm>
-        </p:spPr>
-        <p:txBody>
-          <a:bodyPr/>
-          <a:lstStyle/>
-          <a:p>
-            <a:pPr algn="ctr"/>
-            <a:r>
-              <a:rPr lang="pt-BR" dirty="0" smtClean="0"/>
-              <a:t>Conclusão</a:t>
-            </a:r>
-            <a:endParaRPr lang="pt-BR" dirty="0"/>
-          </a:p>
-        </p:txBody>
-      </p:sp>
-      <p:sp>
-        <p:nvSpPr>
-          <p:cNvPr id="3" name="Espaço Reservado para Conteúdo 2"/>
-          <p:cNvSpPr>
-            <a:spLocks noGrp="1"/>
-          </p:cNvSpPr>
-          <p:nvPr>
-            <p:ph idx="1"/>
-          </p:nvPr>
-        </p:nvSpPr>
-        <p:spPr/>
-        <p:txBody>
-          <a:bodyPr/>
-          <a:lstStyle/>
-          <a:p>
-            <a:r>
-              <a:rPr lang="pt-BR" dirty="0" smtClean="0"/>
-              <a:t>O desenvolvimento </a:t>
-            </a:r>
-            <a:r>
-              <a:rPr lang="pt-BR" dirty="0" err="1" smtClean="0"/>
-              <a:t>multiplataforma</a:t>
-            </a:r>
-            <a:r>
-              <a:rPr lang="pt-BR" dirty="0" smtClean="0"/>
-              <a:t> utilizando Qt é viável.</a:t>
-            </a:r>
-          </a:p>
-          <a:p>
-            <a:r>
-              <a:rPr lang="pt-BR" dirty="0" err="1" smtClean="0"/>
-              <a:t>Refatoração</a:t>
-            </a:r>
-            <a:r>
-              <a:rPr lang="pt-BR" dirty="0" smtClean="0"/>
-              <a:t> próxima </a:t>
-            </a:r>
-            <a:r>
-              <a:rPr lang="pt-BR" smtClean="0"/>
-              <a:t>de zero.</a:t>
-            </a:r>
-            <a:endParaRPr lang="pt-BR" dirty="0"/>
-          </a:p>
-        </p:txBody>
-      </p:sp>
-      <p:sp>
-        <p:nvSpPr>
-          <p:cNvPr id="4" name="Espaço Reservado para Número de Slide 3"/>
-          <p:cNvSpPr>
-            <a:spLocks noGrp="1"/>
-          </p:cNvSpPr>
-          <p:nvPr>
-            <p:ph type="sldNum" sz="quarter" idx="12"/>
-          </p:nvPr>
-        </p:nvSpPr>
-        <p:spPr/>
-        <p:txBody>
-          <a:bodyPr/>
-          <a:lstStyle/>
-          <a:p>
-            <a:fld id="{75B5FC9A-82D6-4ABF-82CF-F56A69AA85D0}" type="slidenum">
-              <a:rPr lang="pt-BR" smtClean="0"/>
-              <a:pPr/>
-              <a:t>30</a:t>
+              <a:t>34</a:t>
             </a:fld>
             <a:endParaRPr lang="pt-BR"/>
           </a:p>
@@ -12183,7 +12736,7 @@
 </p:sld>
 </file>
 
-<file path=ppt/slides/slide31.xml><?xml version="1.0" encoding="utf-8"?>
+<file path=ppt/slides/slide35.xml><?xml version="1.0" encoding="utf-8"?>
 <p:sld xmlns:a="http://schemas.openxmlformats.org/drawingml/2006/main" xmlns:r="http://schemas.openxmlformats.org/officeDocument/2006/relationships" xmlns:p="http://schemas.openxmlformats.org/presentationml/2006/main">
   <p:cSld>
     <p:spTree>
@@ -12288,7 +12841,7 @@
             <a:fld id="{75B5FC9A-82D6-4ABF-82CF-F56A69AA85D0}" type="slidenum">
               <a:rPr lang="pt-BR" smtClean="0"/>
               <a:pPr/>
-              <a:t>31</a:t>
+              <a:t>35</a:t>
             </a:fld>
             <a:endParaRPr lang="pt-BR"/>
           </a:p>
@@ -12317,7 +12870,7 @@
 </p:sld>
 </file>
 
-<file path=ppt/slides/slide32.xml><?xml version="1.0" encoding="utf-8"?>
+<file path=ppt/slides/slide36.xml><?xml version="1.0" encoding="utf-8"?>
 <p:sld xmlns:a="http://schemas.openxmlformats.org/drawingml/2006/main" xmlns:r="http://schemas.openxmlformats.org/officeDocument/2006/relationships" xmlns:p="http://schemas.openxmlformats.org/presentationml/2006/main">
   <p:cSld>
     <p:spTree>
@@ -12425,7 +12978,7 @@
             <a:fld id="{75B5FC9A-82D6-4ABF-82CF-F56A69AA85D0}" type="slidenum">
               <a:rPr lang="pt-BR" smtClean="0"/>
               <a:pPr/>
-              <a:t>32</a:t>
+              <a:t>36</a:t>
             </a:fld>
             <a:endParaRPr lang="pt-BR"/>
           </a:p>
@@ -12454,7 +13007,7 @@
 </p:sld>
 </file>
 
-<file path=ppt/slides/slide33.xml><?xml version="1.0" encoding="utf-8"?>
+<file path=ppt/slides/slide37.xml><?xml version="1.0" encoding="utf-8"?>
 <p:sld xmlns:a="http://schemas.openxmlformats.org/drawingml/2006/main" xmlns:r="http://schemas.openxmlformats.org/officeDocument/2006/relationships" xmlns:p="http://schemas.openxmlformats.org/presentationml/2006/main">
   <p:cSld>
     <p:spTree>
@@ -12517,15 +13070,15 @@
           <a:p>
             <a:r>
               <a:rPr lang="pt-BR" dirty="0" smtClean="0"/>
-              <a:t>DEITEL H., DEITEL P.; </a:t>
+              <a:t>JAVA; </a:t>
             </a:r>
             <a:r>
               <a:rPr lang="pt-BR" i="1" dirty="0" smtClean="0"/>
-              <a:t>Java: Como Programar, </a:t>
+              <a:t>Obtenha Informações sobre a Tecnologia Java</a:t>
             </a:r>
             <a:r>
               <a:rPr lang="pt-BR" dirty="0" smtClean="0"/>
-              <a:t>Oitava Edição, 2009.</a:t>
+              <a:t>, 2014. Disponível em: &lt;https://www.java.com/pt_BR/about/&gt;.</a:t>
             </a:r>
             <a:endParaRPr lang="pt-BR" dirty="0"/>
           </a:p>
@@ -12549,7 +13102,7 @@
             <a:fld id="{75B5FC9A-82D6-4ABF-82CF-F56A69AA85D0}" type="slidenum">
               <a:rPr lang="pt-BR" smtClean="0"/>
               <a:pPr/>
-              <a:t>33</a:t>
+              <a:t>37</a:t>
             </a:fld>
             <a:endParaRPr lang="pt-BR"/>
           </a:p>
@@ -12634,7 +13187,12 @@
             <p:ph idx="1"/>
           </p:nvPr>
         </p:nvSpPr>
-        <p:spPr/>
+        <p:spPr>
+          <a:xfrm>
+            <a:off x="429669" y="1417638"/>
+            <a:ext cx="8229600" cy="4525963"/>
+          </a:xfrm>
+        </p:spPr>
         <p:txBody>
           <a:bodyPr/>
           <a:lstStyle/>
@@ -12933,7 +13491,7 @@
       </p:grpSpPr>
       <p:sp>
         <p:nvSpPr>
-          <p:cNvPr id="2" name="Título 1"/>
+          <p:cNvPr id="2" name="Title 1"/>
           <p:cNvSpPr>
             <a:spLocks noGrp="1"/>
           </p:cNvSpPr>
@@ -12954,7 +13512,7 @@
             <a:pPr algn="ctr"/>
             <a:r>
               <a:rPr lang="pt-BR" dirty="0" smtClean="0"/>
-              <a:t>Metodologia</a:t>
+              <a:t>Objetivo</a:t>
             </a:r>
             <a:endParaRPr lang="pt-BR" dirty="0"/>
           </a:p>
@@ -12962,7 +13520,7 @@
       </p:sp>
       <p:sp>
         <p:nvSpPr>
-          <p:cNvPr id="3" name="Espaço Reservado para Conteúdo 2"/>
+          <p:cNvPr id="3" name="Content Placeholder 2"/>
           <p:cNvSpPr>
             <a:spLocks noGrp="1"/>
           </p:cNvSpPr>
@@ -12975,9 +13533,20 @@
           <a:bodyPr/>
           <a:lstStyle/>
           <a:p>
+            <a:endParaRPr lang="pt-BR" dirty="0" smtClean="0"/>
+          </a:p>
+          <a:p>
             <a:r>
               <a:rPr lang="pt-BR" dirty="0" smtClean="0"/>
-              <a:t>Levantamento bibliográfico</a:t>
+              <a:t>Estudar o Qt, sua viabilidade e necessidade de </a:t>
+            </a:r>
+            <a:r>
+              <a:rPr lang="pt-BR" dirty="0" err="1" smtClean="0"/>
+              <a:t>refatoração</a:t>
+            </a:r>
+            <a:r>
+              <a:rPr lang="pt-BR" dirty="0" smtClean="0"/>
+              <a:t> de código em uma aplicação</a:t>
             </a:r>
           </a:p>
           <a:p>
@@ -12986,28 +13555,15 @@
           <a:p>
             <a:r>
               <a:rPr lang="pt-BR" dirty="0" smtClean="0"/>
-              <a:t>Documentação própria do </a:t>
-            </a:r>
-            <a:r>
-              <a:rPr lang="pt-BR" i="1" dirty="0" smtClean="0"/>
-              <a:t>framework</a:t>
-            </a:r>
-            <a:endParaRPr lang="pt-BR" dirty="0" smtClean="0"/>
-          </a:p>
-          <a:p>
+              <a:t>Desenvolver um protótipo de aplicação de troca de mensagens instantâneas</a:t>
+            </a:r>
             <a:endParaRPr lang="pt-BR" dirty="0"/>
           </a:p>
-          <a:p>
-            <a:r>
-              <a:rPr lang="pt-BR" dirty="0" smtClean="0"/>
-              <a:t>Estudo de Caso (aplicação de troca de mensagens de texto)</a:t>
-            </a:r>
-          </a:p>
-        </p:txBody>
-      </p:sp>
-      <p:sp>
-        <p:nvSpPr>
-          <p:cNvPr id="5" name="Espaço Reservado para Número de Slide 4"/>
+        </p:txBody>
+      </p:sp>
+      <p:sp>
+        <p:nvSpPr>
+          <p:cNvPr id="4" name="Slide Number Placeholder 3"/>
           <p:cNvSpPr>
             <a:spLocks noGrp="1"/>
           </p:cNvSpPr>
@@ -13024,6 +13580,137 @@
               <a:rPr lang="pt-BR" smtClean="0"/>
               <a:pPr/>
               <a:t>6</a:t>
+            </a:fld>
+            <a:endParaRPr lang="pt-BR"/>
+          </a:p>
+        </p:txBody>
+      </p:sp>
+    </p:spTree>
+    <p:extLst>
+      <p:ext uri="{BB962C8B-B14F-4D97-AF65-F5344CB8AC3E}">
+        <p14:creationId xmlns:p14="http://schemas.microsoft.com/office/powerpoint/2010/main" val="3863649358"/>
+      </p:ext>
+    </p:extLst>
+  </p:cSld>
+  <p:clrMapOvr>
+    <a:masterClrMapping/>
+  </p:clrMapOvr>
+  <p:transition>
+    <p:fade/>
+  </p:transition>
+</p:sld>
+</file>
+
+<file path=ppt/slides/slide7.xml><?xml version="1.0" encoding="utf-8"?>
+<p:sld xmlns:a="http://schemas.openxmlformats.org/drawingml/2006/main" xmlns:r="http://schemas.openxmlformats.org/officeDocument/2006/relationships" xmlns:p="http://schemas.openxmlformats.org/presentationml/2006/main">
+  <p:cSld>
+    <p:spTree>
+      <p:nvGrpSpPr>
+        <p:cNvPr id="1" name=""/>
+        <p:cNvGrpSpPr/>
+        <p:nvPr/>
+      </p:nvGrpSpPr>
+      <p:grpSpPr>
+        <a:xfrm>
+          <a:off x="0" y="0"/>
+          <a:ext cx="0" cy="0"/>
+          <a:chOff x="0" y="0"/>
+          <a:chExt cx="0" cy="0"/>
+        </a:xfrm>
+      </p:grpSpPr>
+      <p:sp>
+        <p:nvSpPr>
+          <p:cNvPr id="2" name="Título 1"/>
+          <p:cNvSpPr>
+            <a:spLocks noGrp="1"/>
+          </p:cNvSpPr>
+          <p:nvPr>
+            <p:ph type="title"/>
+          </p:nvPr>
+        </p:nvSpPr>
+        <p:spPr>
+          <a:xfrm>
+            <a:off x="2483768" y="274638"/>
+            <a:ext cx="5328592" cy="1143000"/>
+          </a:xfrm>
+        </p:spPr>
+        <p:txBody>
+          <a:bodyPr/>
+          <a:lstStyle/>
+          <a:p>
+            <a:pPr algn="ctr"/>
+            <a:r>
+              <a:rPr lang="pt-BR" dirty="0" smtClean="0"/>
+              <a:t>Metodologia</a:t>
+            </a:r>
+            <a:endParaRPr lang="pt-BR" dirty="0"/>
+          </a:p>
+        </p:txBody>
+      </p:sp>
+      <p:sp>
+        <p:nvSpPr>
+          <p:cNvPr id="3" name="Espaço Reservado para Conteúdo 2"/>
+          <p:cNvSpPr>
+            <a:spLocks noGrp="1"/>
+          </p:cNvSpPr>
+          <p:nvPr>
+            <p:ph idx="1"/>
+          </p:nvPr>
+        </p:nvSpPr>
+        <p:spPr/>
+        <p:txBody>
+          <a:bodyPr/>
+          <a:lstStyle/>
+          <a:p>
+            <a:r>
+              <a:rPr lang="pt-BR" dirty="0" smtClean="0"/>
+              <a:t>Levantamento bibliográfico</a:t>
+            </a:r>
+          </a:p>
+          <a:p>
+            <a:endParaRPr lang="pt-BR" dirty="0"/>
+          </a:p>
+          <a:p>
+            <a:r>
+              <a:rPr lang="pt-BR" dirty="0" smtClean="0"/>
+              <a:t>Documentação própria do </a:t>
+            </a:r>
+            <a:r>
+              <a:rPr lang="pt-BR" i="1" dirty="0" smtClean="0"/>
+              <a:t>framework</a:t>
+            </a:r>
+            <a:endParaRPr lang="pt-BR" dirty="0" smtClean="0"/>
+          </a:p>
+          <a:p>
+            <a:endParaRPr lang="pt-BR" dirty="0"/>
+          </a:p>
+          <a:p>
+            <a:r>
+              <a:rPr lang="pt-BR" dirty="0" smtClean="0"/>
+              <a:t>Estudo de Caso (aplicação de troca de mensagens de texto)</a:t>
+            </a:r>
+          </a:p>
+        </p:txBody>
+      </p:sp>
+      <p:sp>
+        <p:nvSpPr>
+          <p:cNvPr id="5" name="Espaço Reservado para Número de Slide 4"/>
+          <p:cNvSpPr>
+            <a:spLocks noGrp="1"/>
+          </p:cNvSpPr>
+          <p:nvPr>
+            <p:ph type="sldNum" sz="quarter" idx="12"/>
+          </p:nvPr>
+        </p:nvSpPr>
+        <p:spPr/>
+        <p:txBody>
+          <a:bodyPr/>
+          <a:lstStyle/>
+          <a:p>
+            <a:fld id="{75B5FC9A-82D6-4ABF-82CF-F56A69AA85D0}" type="slidenum">
+              <a:rPr lang="pt-BR" smtClean="0"/>
+              <a:pPr/>
+              <a:t>7</a:t>
             </a:fld>
             <a:endParaRPr lang="pt-BR"/>
           </a:p>
@@ -13052,7 +13739,7 @@
 </p:sld>
 </file>
 
-<file path=ppt/slides/slide7.xml><?xml version="1.0" encoding="utf-8"?>
+<file path=ppt/slides/slide8.xml><?xml version="1.0" encoding="utf-8"?>
 <p:sld xmlns:a="http://schemas.openxmlformats.org/drawingml/2006/main" xmlns:r="http://schemas.openxmlformats.org/officeDocument/2006/relationships" xmlns:p="http://schemas.openxmlformats.org/presentationml/2006/main">
   <p:cSld>
     <p:spTree>
@@ -13116,7 +13803,7 @@
             <a:fld id="{75B5FC9A-82D6-4ABF-82CF-F56A69AA85D0}" type="slidenum">
               <a:rPr lang="pt-BR" smtClean="0"/>
               <a:pPr/>
-              <a:t>7</a:t>
+              <a:t>8</a:t>
             </a:fld>
             <a:endParaRPr lang="pt-BR"/>
           </a:p>
@@ -13226,7 +13913,7 @@
 </p:sld>
 </file>
 
-<file path=ppt/slides/slide8.xml><?xml version="1.0" encoding="utf-8"?>
+<file path=ppt/slides/slide9.xml><?xml version="1.0" encoding="utf-8"?>
 <p:sld xmlns:a="http://schemas.openxmlformats.org/drawingml/2006/main" xmlns:r="http://schemas.openxmlformats.org/officeDocument/2006/relationships" xmlns:p="http://schemas.openxmlformats.org/presentationml/2006/main">
   <p:cSld>
     <p:spTree>
@@ -13323,7 +14010,7 @@
             <a:fld id="{75B5FC9A-82D6-4ABF-82CF-F56A69AA85D0}" type="slidenum">
               <a:rPr lang="pt-BR" smtClean="0"/>
               <a:pPr/>
-              <a:t>8</a:t>
+              <a:t>9</a:t>
             </a:fld>
             <a:endParaRPr lang="pt-BR"/>
           </a:p>
@@ -13357,145 +14044,6 @@
     <p:extLst>
       <p:ext uri="{BB962C8B-B14F-4D97-AF65-F5344CB8AC3E}">
         <p14:creationId xmlns:p14="http://schemas.microsoft.com/office/powerpoint/2010/main" val="2627129478"/>
-      </p:ext>
-    </p:extLst>
-  </p:cSld>
-  <p:clrMapOvr>
-    <a:masterClrMapping/>
-  </p:clrMapOvr>
-  <p:transition>
-    <p:fade/>
-  </p:transition>
-  <p:timing>
-    <p:tnLst>
-      <p:par>
-        <p:cTn id="1" dur="indefinite" restart="never" nodeType="tmRoot"/>
-      </p:par>
-    </p:tnLst>
-  </p:timing>
-</p:sld>
-</file>
-
-<file path=ppt/slides/slide9.xml><?xml version="1.0" encoding="utf-8"?>
-<p:sld xmlns:a="http://schemas.openxmlformats.org/drawingml/2006/main" xmlns:r="http://schemas.openxmlformats.org/officeDocument/2006/relationships" xmlns:p="http://schemas.openxmlformats.org/presentationml/2006/main">
-  <p:cSld>
-    <p:spTree>
-      <p:nvGrpSpPr>
-        <p:cNvPr id="1" name=""/>
-        <p:cNvGrpSpPr/>
-        <p:nvPr/>
-      </p:nvGrpSpPr>
-      <p:grpSpPr>
-        <a:xfrm>
-          <a:off x="0" y="0"/>
-          <a:ext cx="0" cy="0"/>
-          <a:chOff x="0" y="0"/>
-          <a:chExt cx="0" cy="0"/>
-        </a:xfrm>
-      </p:grpSpPr>
-      <p:sp>
-        <p:nvSpPr>
-          <p:cNvPr id="2" name="Title 1"/>
-          <p:cNvSpPr>
-            <a:spLocks noGrp="1"/>
-          </p:cNvSpPr>
-          <p:nvPr>
-            <p:ph type="title"/>
-          </p:nvPr>
-        </p:nvSpPr>
-        <p:spPr/>
-        <p:txBody>
-          <a:bodyPr/>
-          <a:lstStyle/>
-          <a:p>
-            <a:pPr algn="ctr"/>
-            <a:r>
-              <a:rPr lang="pt-BR" dirty="0" smtClean="0"/>
-              <a:t>Interfaces no Qt</a:t>
-            </a:r>
-            <a:endParaRPr lang="pt-BR" dirty="0"/>
-          </a:p>
-        </p:txBody>
-      </p:sp>
-      <p:sp>
-        <p:nvSpPr>
-          <p:cNvPr id="3" name="Content Placeholder 2"/>
-          <p:cNvSpPr>
-            <a:spLocks noGrp="1"/>
-          </p:cNvSpPr>
-          <p:nvPr>
-            <p:ph idx="1"/>
-          </p:nvPr>
-        </p:nvSpPr>
-        <p:spPr/>
-        <p:txBody>
-          <a:bodyPr/>
-          <a:lstStyle/>
-          <a:p>
-            <a:r>
-              <a:rPr lang="pt-BR" dirty="0" smtClean="0"/>
-              <a:t>Qt </a:t>
-            </a:r>
-            <a:r>
-              <a:rPr lang="pt-BR" dirty="0" err="1" smtClean="0"/>
-              <a:t>Quick</a:t>
-            </a:r>
-            <a:endParaRPr lang="pt-BR" dirty="0"/>
-          </a:p>
-        </p:txBody>
-      </p:sp>
-      <p:sp>
-        <p:nvSpPr>
-          <p:cNvPr id="4" name="Slide Number Placeholder 3"/>
-          <p:cNvSpPr>
-            <a:spLocks noGrp="1"/>
-          </p:cNvSpPr>
-          <p:nvPr>
-            <p:ph type="sldNum" sz="quarter" idx="12"/>
-          </p:nvPr>
-        </p:nvSpPr>
-        <p:spPr/>
-        <p:txBody>
-          <a:bodyPr/>
-          <a:lstStyle/>
-          <a:p>
-            <a:fld id="{75B5FC9A-82D6-4ABF-82CF-F56A69AA85D0}" type="slidenum">
-              <a:rPr lang="pt-BR" smtClean="0"/>
-              <a:pPr/>
-              <a:t>9</a:t>
-            </a:fld>
-            <a:endParaRPr lang="pt-BR"/>
-          </a:p>
-        </p:txBody>
-      </p:sp>
-      <p:pic>
-        <p:nvPicPr>
-          <p:cNvPr id="6" name="Picture 5"/>
-          <p:cNvPicPr>
-            <a:picLocks noChangeAspect="1"/>
-          </p:cNvPicPr>
-          <p:nvPr/>
-        </p:nvPicPr>
-        <p:blipFill>
-          <a:blip r:embed="rId3"/>
-          <a:stretch>
-            <a:fillRect/>
-          </a:stretch>
-        </p:blipFill>
-        <p:spPr>
-          <a:xfrm>
-            <a:off x="1133188" y="2173804"/>
-            <a:ext cx="6877624" cy="3952359"/>
-          </a:xfrm>
-          <a:prstGeom prst="rect">
-            <a:avLst/>
-          </a:prstGeom>
-        </p:spPr>
-      </p:pic>
-    </p:spTree>
-    <p:extLst>
-      <p:ext uri="{BB962C8B-B14F-4D97-AF65-F5344CB8AC3E}">
-        <p14:creationId xmlns:p14="http://schemas.microsoft.com/office/powerpoint/2010/main" val="850999151"/>
       </p:ext>
     </p:extLst>
   </p:cSld>

</xml_diff>

<commit_message>
03_12: Pós-banca de TCC
</commit_message>
<xml_diff>
--- a/documentos/Apresentação Banca.pptx
+++ b/documentos/Apresentação Banca.pptx
@@ -307,7 +307,7 @@
               <a:pPr>
                 <a:defRPr/>
               </a:pPr>
-              <a:t>01/12/2014</a:t>
+              <a:t>03/12/2014</a:t>
             </a:fld>
             <a:endParaRPr lang="pt-BR"/>
           </a:p>
@@ -498,7 +498,7 @@
               <a:pPr>
                 <a:defRPr/>
               </a:pPr>
-              <a:t>01/12/2014</a:t>
+              <a:t>03/12/2014</a:t>
             </a:fld>
             <a:endParaRPr lang="pt-BR"/>
           </a:p>
@@ -7505,24 +7505,10 @@
           <a:bodyPr/>
           <a:lstStyle/>
           <a:p>
-            <a:endParaRPr lang="pt-BR" dirty="0" smtClean="0"/>
-          </a:p>
-          <a:p>
-            <a:endParaRPr lang="pt-BR" dirty="0"/>
-          </a:p>
-          <a:p>
+            <a:pPr algn="ctr"/>
             <a:r>
               <a:rPr lang="pt-BR" dirty="0" smtClean="0"/>
-              <a:t>Comunicação </a:t>
-            </a:r>
-          </a:p>
-          <a:p>
-            <a:pPr marL="0" indent="0">
-              <a:buNone/>
-            </a:pPr>
-            <a:r>
-              <a:rPr lang="pt-BR" dirty="0" smtClean="0"/>
-              <a:t>entre objetos</a:t>
+              <a:t>Comunicação entre objetos</a:t>
             </a:r>
             <a:endParaRPr lang="pt-BR" dirty="0"/>
           </a:p>
@@ -7554,35 +7540,26 @@
       </p:sp>
       <p:pic>
         <p:nvPicPr>
-          <p:cNvPr id="5" name="Picture 4" descr="http://qt-project.org/doc/qt-4.8/images/abstract-connections.png"/>
-          <p:cNvPicPr/>
+          <p:cNvPr id="6" name="Picture 5"/>
+          <p:cNvPicPr>
+            <a:picLocks noChangeAspect="1"/>
+          </p:cNvPicPr>
           <p:nvPr/>
         </p:nvPicPr>
         <p:blipFill>
-          <a:blip r:embed="rId2">
-            <a:extLst>
-              <a:ext uri="{28A0092B-C50C-407E-A947-70E740481C1C}">
-                <a14:useLocalDpi xmlns:a14="http://schemas.microsoft.com/office/drawing/2010/main" val="0"/>
-              </a:ext>
-            </a:extLst>
-          </a:blip>
-          <a:srcRect/>
+          <a:blip r:embed="rId2"/>
           <a:stretch>
             <a:fillRect/>
           </a:stretch>
         </p:blipFill>
-        <p:spPr bwMode="auto">
+        <p:spPr>
           <a:xfrm>
-            <a:off x="3771900" y="1354138"/>
-            <a:ext cx="4914900" cy="4772025"/>
+            <a:off x="2598145" y="2220913"/>
+            <a:ext cx="3943350" cy="3905250"/>
           </a:xfrm>
           <a:prstGeom prst="rect">
             <a:avLst/>
           </a:prstGeom>
-          <a:noFill/>
-          <a:ln>
-            <a:noFill/>
-          </a:ln>
         </p:spPr>
       </p:pic>
     </p:spTree>
@@ -9322,7 +9299,6 @@
               <a:rPr lang="pt-BR" sz="2800" dirty="0" smtClean="0"/>
               <a:t>Qt</a:t>
             </a:r>
-            <a:endParaRPr lang="pt-BR" sz="2800" dirty="0" smtClean="0"/>
           </a:p>
           <a:p>
             <a:r>
@@ -10783,8 +10759,8 @@
         </p:nvSpPr>
         <p:spPr>
           <a:xfrm>
-            <a:off x="457200" y="1600201"/>
-            <a:ext cx="8229600" cy="2692896"/>
+            <a:off x="457200" y="1417638"/>
+            <a:ext cx="8229600" cy="3350259"/>
           </a:xfrm>
         </p:spPr>
         <p:txBody>
@@ -10794,8 +10770,26 @@
             <a:pPr algn="l"/>
             <a:r>
               <a:rPr lang="pt-BR" dirty="0" smtClean="0"/>
-              <a:t>O que foi implementado:</a:t>
-            </a:r>
+              <a:t>O que foi implementado</a:t>
+            </a:r>
+            <a:r>
+              <a:rPr lang="pt-BR" dirty="0" smtClean="0"/>
+              <a:t>:</a:t>
+            </a:r>
+          </a:p>
+          <a:p>
+            <a:pPr marL="0" indent="0" algn="l">
+              <a:buNone/>
+            </a:pPr>
+            <a:r>
+              <a:rPr lang="pt-BR" sz="2400" dirty="0"/>
+              <a:t> </a:t>
+            </a:r>
+            <a:r>
+              <a:rPr lang="pt-BR" sz="2400" dirty="0" smtClean="0"/>
+              <a:t>  (Cliente)</a:t>
+            </a:r>
+            <a:endParaRPr lang="pt-BR" sz="2400" dirty="0" smtClean="0"/>
           </a:p>
           <a:p>
             <a:pPr lvl="1" algn="l"/>
@@ -10809,8 +10803,9 @@
             <a:pPr lvl="1" algn="l"/>
             <a:r>
               <a:rPr lang="pt-BR" dirty="0" smtClean="0"/>
-              <a:t>Cadastro</a:t>
-            </a:r>
+              <a:t>Cadastro de usuários</a:t>
+            </a:r>
+            <a:endParaRPr lang="pt-BR" dirty="0" smtClean="0"/>
           </a:p>
           <a:p>
             <a:pPr lvl="1" algn="l"/>
@@ -10821,23 +10816,46 @@
           </a:p>
           <a:p>
             <a:pPr algn="l"/>
+            <a:endParaRPr lang="pt-BR" dirty="0" smtClean="0"/>
+          </a:p>
+          <a:p>
+            <a:pPr algn="l"/>
             <a:r>
               <a:rPr lang="pt-BR" dirty="0" smtClean="0"/>
-              <a:t>O que não foi implementado:</a:t>
+              <a:t>O que foi implementado: </a:t>
+            </a:r>
+            <a:r>
+              <a:rPr lang="pt-BR" sz="2400" dirty="0" smtClean="0"/>
+              <a:t>(Servidor)</a:t>
             </a:r>
           </a:p>
           <a:p>
             <a:pPr lvl="1" algn="l"/>
             <a:r>
               <a:rPr lang="pt-BR" dirty="0" smtClean="0"/>
-              <a:t>Grupos</a:t>
+              <a:t>Gerenciamento da rede</a:t>
             </a:r>
           </a:p>
           <a:p>
             <a:pPr lvl="1" algn="l"/>
             <a:r>
               <a:rPr lang="pt-BR" dirty="0" smtClean="0"/>
-              <a:t>Envio de Mídia</a:t>
+              <a:t>Acesso à base de dados</a:t>
+            </a:r>
+          </a:p>
+          <a:p>
+            <a:pPr lvl="1" algn="l"/>
+            <a:r>
+              <a:rPr lang="pt-BR" dirty="0" smtClean="0"/>
+              <a:t>Monitorar status </a:t>
+            </a:r>
+            <a:r>
+              <a:rPr lang="pt-BR" i="1" dirty="0" smtClean="0"/>
+              <a:t>online</a:t>
+            </a:r>
+            <a:r>
+              <a:rPr lang="pt-BR" dirty="0" smtClean="0"/>
+              <a:t> dos usuários</a:t>
             </a:r>
             <a:endParaRPr lang="pt-BR" dirty="0"/>
           </a:p>

</xml_diff>